<commit_message>
Update Root and Domestic
</commit_message>
<xml_diff>
--- a/On-CallFraudProcedures.pptx
+++ b/On-CallFraudProcedures.pptx
@@ -8,24 +8,26 @@
     <p:sldMasterId id="2147483703" r:id="rId4"/>
   </p:sldMasterIdLst>
   <p:notesMasterIdLst>
-    <p:notesMasterId r:id="rId15"/>
+    <p:notesMasterId r:id="rId17"/>
   </p:notesMasterIdLst>
   <p:sldIdLst>
     <p:sldId id="275" r:id="rId5"/>
     <p:sldId id="284" r:id="rId6"/>
     <p:sldId id="287" r:id="rId7"/>
-    <p:sldId id="285" r:id="rId8"/>
-    <p:sldId id="288" r:id="rId9"/>
-    <p:sldId id="289" r:id="rId10"/>
-    <p:sldId id="290" r:id="rId11"/>
-    <p:sldId id="291" r:id="rId12"/>
-    <p:sldId id="292" r:id="rId13"/>
-    <p:sldId id="293" r:id="rId14"/>
+    <p:sldId id="294" r:id="rId8"/>
+    <p:sldId id="295" r:id="rId9"/>
+    <p:sldId id="285" r:id="rId10"/>
+    <p:sldId id="288" r:id="rId11"/>
+    <p:sldId id="289" r:id="rId12"/>
+    <p:sldId id="290" r:id="rId13"/>
+    <p:sldId id="291" r:id="rId14"/>
+    <p:sldId id="292" r:id="rId15"/>
+    <p:sldId id="293" r:id="rId16"/>
   </p:sldIdLst>
   <p:sldSz cx="9144000" cy="6858000" type="screen4x3"/>
   <p:notesSz cx="7010400" cy="9296400"/>
   <p:custDataLst>
-    <p:tags r:id="rId16"/>
+    <p:tags r:id="rId18"/>
   </p:custDataLst>
   <p:defaultTextStyle>
     <a:defPPr>
@@ -14765,6 +14767,460 @@
           <a:lstStyle/>
           <a:p>
             <a:r>
+              <a:rPr lang="en-US" dirty="0"/>
+              <a:t>Investigation continued …</a:t>
+            </a:r>
+          </a:p>
+        </p:txBody>
+      </p:sp>
+      <p:sp>
+        <p:nvSpPr>
+          <p:cNvPr id="6" name="Content Placeholder 5"/>
+          <p:cNvSpPr>
+            <a:spLocks noGrp="1"/>
+          </p:cNvSpPr>
+          <p:nvPr>
+            <p:ph sz="half" idx="1"/>
+          </p:nvPr>
+        </p:nvSpPr>
+        <p:spPr/>
+        <p:txBody>
+          <a:bodyPr/>
+          <a:lstStyle/>
+          <a:p>
+            <a:pPr>
+              <a:buFont typeface="Wingdings" panose="05000000000000000000" pitchFamily="2" charset="2"/>
+              <a:buChar char="Ø"/>
+            </a:pPr>
+            <a:r>
+              <a:rPr lang="en-US" sz="1600" dirty="0" smtClean="0">
+                <a:latin typeface="Times New Roman" panose="02020603050405020304" pitchFamily="18" charset="0"/>
+                <a:cs typeface="Times New Roman" panose="02020603050405020304" pitchFamily="18" charset="0"/>
+              </a:rPr>
+              <a:t>Use a IP address look up tool (like infosniper.net) to look up the IP address of the </a:t>
+            </a:r>
+            <a:r>
+              <a:rPr lang="en-US" sz="1600" dirty="0">
+                <a:latin typeface="Times New Roman" panose="02020603050405020304" pitchFamily="18" charset="0"/>
+                <a:cs typeface="Times New Roman" panose="02020603050405020304" pitchFamily="18" charset="0"/>
+              </a:rPr>
+              <a:t>Initiator User </a:t>
+            </a:r>
+            <a:r>
+              <a:rPr lang="en-US" sz="1600" dirty="0" smtClean="0">
+                <a:latin typeface="Times New Roman" panose="02020603050405020304" pitchFamily="18" charset="0"/>
+                <a:cs typeface="Times New Roman" panose="02020603050405020304" pitchFamily="18" charset="0"/>
+              </a:rPr>
+              <a:t>Agent pay close attention to where these calls were place from. </a:t>
+            </a:r>
+          </a:p>
+          <a:p>
+            <a:pPr>
+              <a:buFont typeface="Wingdings" panose="05000000000000000000" pitchFamily="2" charset="2"/>
+              <a:buChar char="Ø"/>
+            </a:pPr>
+            <a:endParaRPr lang="en-US" sz="1600" dirty="0" smtClean="0">
+              <a:latin typeface="Times New Roman" panose="02020603050405020304" pitchFamily="18" charset="0"/>
+              <a:cs typeface="Times New Roman" panose="02020603050405020304" pitchFamily="18" charset="0"/>
+            </a:endParaRPr>
+          </a:p>
+          <a:p>
+            <a:pPr>
+              <a:buFont typeface="Wingdings" panose="05000000000000000000" pitchFamily="2" charset="2"/>
+              <a:buChar char="Ø"/>
+            </a:pPr>
+            <a:endParaRPr lang="en-US" sz="1600" dirty="0">
+              <a:latin typeface="Times New Roman" panose="02020603050405020304" pitchFamily="18" charset="0"/>
+              <a:cs typeface="Times New Roman" panose="02020603050405020304" pitchFamily="18" charset="0"/>
+            </a:endParaRPr>
+          </a:p>
+          <a:p>
+            <a:pPr>
+              <a:buFont typeface="Wingdings" panose="05000000000000000000" pitchFamily="2" charset="2"/>
+              <a:buChar char="Ø"/>
+            </a:pPr>
+            <a:endParaRPr lang="en-US" sz="1600" dirty="0" smtClean="0">
+              <a:latin typeface="Times New Roman" panose="02020603050405020304" pitchFamily="18" charset="0"/>
+              <a:cs typeface="Times New Roman" panose="02020603050405020304" pitchFamily="18" charset="0"/>
+            </a:endParaRPr>
+          </a:p>
+          <a:p>
+            <a:pPr>
+              <a:buFont typeface="Wingdings" panose="05000000000000000000" pitchFamily="2" charset="2"/>
+              <a:buChar char="Ø"/>
+            </a:pPr>
+            <a:endParaRPr lang="en-US" sz="1600" dirty="0">
+              <a:latin typeface="Times New Roman" panose="02020603050405020304" pitchFamily="18" charset="0"/>
+              <a:cs typeface="Times New Roman" panose="02020603050405020304" pitchFamily="18" charset="0"/>
+            </a:endParaRPr>
+          </a:p>
+          <a:p>
+            <a:pPr>
+              <a:buFont typeface="Wingdings" panose="05000000000000000000" pitchFamily="2" charset="2"/>
+              <a:buChar char="Ø"/>
+            </a:pPr>
+            <a:r>
+              <a:rPr lang="en-US" sz="1600" dirty="0" smtClean="0">
+                <a:latin typeface="Times New Roman" panose="02020603050405020304" pitchFamily="18" charset="0"/>
+                <a:cs typeface="Times New Roman" panose="02020603050405020304" pitchFamily="18" charset="0"/>
+              </a:rPr>
+              <a:t>You will also want to run an MTR to the </a:t>
+            </a:r>
+            <a:r>
+              <a:rPr lang="en-US" sz="1600" dirty="0">
+                <a:latin typeface="Times New Roman" panose="02020603050405020304" pitchFamily="18" charset="0"/>
+                <a:cs typeface="Times New Roman" panose="02020603050405020304" pitchFamily="18" charset="0"/>
+              </a:rPr>
+              <a:t>Initiator User </a:t>
+            </a:r>
+            <a:r>
+              <a:rPr lang="en-US" sz="1600" dirty="0" smtClean="0">
+                <a:latin typeface="Times New Roman" panose="02020603050405020304" pitchFamily="18" charset="0"/>
+                <a:cs typeface="Times New Roman" panose="02020603050405020304" pitchFamily="18" charset="0"/>
+              </a:rPr>
+              <a:t>Agent IP address . Look for any signs of High latency, Jitter, or Packet Loss.</a:t>
+            </a:r>
+          </a:p>
+        </p:txBody>
+      </p:sp>
+      <p:pic>
+        <p:nvPicPr>
+          <p:cNvPr id="9" name="Content Placeholder 8"/>
+          <p:cNvPicPr>
+            <a:picLocks noGrp="1" noChangeAspect="1"/>
+          </p:cNvPicPr>
+          <p:nvPr>
+            <p:ph sz="quarter" idx="2"/>
+          </p:nvPr>
+        </p:nvPicPr>
+        <p:blipFill>
+          <a:blip r:embed="rId2" cstate="print">
+            <a:extLst>
+              <a:ext uri="{BEBA8EAE-BF5A-486C-A8C5-ECC9F3942E4B}">
+                <a14:imgProps xmlns:a14="http://schemas.microsoft.com/office/drawing/2010/main">
+                  <a14:imgLayer r:embed="rId3">
+                    <a14:imgEffect>
+                      <a14:sharpenSoften amount="25000"/>
+                    </a14:imgEffect>
+                  </a14:imgLayer>
+                </a14:imgProps>
+              </a:ext>
+              <a:ext uri="{28A0092B-C50C-407E-A947-70E740481C1C}">
+                <a14:useLocalDpi xmlns:a14="http://schemas.microsoft.com/office/drawing/2010/main" val="0"/>
+              </a:ext>
+            </a:extLst>
+          </a:blip>
+          <a:stretch>
+            <a:fillRect/>
+          </a:stretch>
+        </p:blipFill>
+        <p:spPr>
+          <a:xfrm>
+            <a:off x="4495800" y="1293813"/>
+            <a:ext cx="4495800" cy="2308225"/>
+          </a:xfrm>
+        </p:spPr>
+      </p:pic>
+      <p:pic>
+        <p:nvPicPr>
+          <p:cNvPr id="10" name="Content Placeholder 9"/>
+          <p:cNvPicPr>
+            <a:picLocks noGrp="1" noChangeAspect="1"/>
+          </p:cNvPicPr>
+          <p:nvPr>
+            <p:ph sz="quarter" idx="3"/>
+          </p:nvPr>
+        </p:nvPicPr>
+        <p:blipFill>
+          <a:blip r:embed="rId4" cstate="print">
+            <a:extLst>
+              <a:ext uri="{BEBA8EAE-BF5A-486C-A8C5-ECC9F3942E4B}">
+                <a14:imgProps xmlns:a14="http://schemas.microsoft.com/office/drawing/2010/main">
+                  <a14:imgLayer r:embed="rId5">
+                    <a14:imgEffect>
+                      <a14:sharpenSoften amount="25000"/>
+                    </a14:imgEffect>
+                  </a14:imgLayer>
+                </a14:imgProps>
+              </a:ext>
+              <a:ext uri="{28A0092B-C50C-407E-A947-70E740481C1C}">
+                <a14:useLocalDpi xmlns:a14="http://schemas.microsoft.com/office/drawing/2010/main" val="0"/>
+              </a:ext>
+            </a:extLst>
+          </a:blip>
+          <a:stretch>
+            <a:fillRect/>
+          </a:stretch>
+        </p:blipFill>
+        <p:spPr>
+          <a:xfrm>
+            <a:off x="4495800" y="3789635"/>
+            <a:ext cx="4543108" cy="2555328"/>
+          </a:xfrm>
+        </p:spPr>
+      </p:pic>
+      <p:sp>
+        <p:nvSpPr>
+          <p:cNvPr id="5" name="Slide Number Placeholder 4"/>
+          <p:cNvSpPr>
+            <a:spLocks noGrp="1"/>
+          </p:cNvSpPr>
+          <p:nvPr>
+            <p:ph type="sldNum" sz="quarter" idx="10"/>
+          </p:nvPr>
+        </p:nvSpPr>
+        <p:spPr/>
+        <p:txBody>
+          <a:bodyPr/>
+          <a:lstStyle/>
+          <a:p>
+            <a:fld id="{71BC9C40-ACDD-4696-8BAF-E1591320CFED}" type="slidenum">
+              <a:rPr lang="en-US" smtClean="0"/>
+              <a:pPr/>
+              <a:t>10</a:t>
+            </a:fld>
+            <a:endParaRPr lang="en-US"/>
+          </a:p>
+        </p:txBody>
+      </p:sp>
+    </p:spTree>
+    <p:extLst>
+      <p:ext uri="{BB962C8B-B14F-4D97-AF65-F5344CB8AC3E}">
+        <p14:creationId xmlns:p14="http://schemas.microsoft.com/office/powerpoint/2010/main" val="4049503898"/>
+      </p:ext>
+    </p:extLst>
+  </p:cSld>
+  <p:clrMapOvr>
+    <a:masterClrMapping/>
+  </p:clrMapOvr>
+  <p:timing>
+    <p:tnLst>
+      <p:par>
+        <p:cTn id="1" dur="indefinite" restart="never" nodeType="tmRoot"/>
+      </p:par>
+    </p:tnLst>
+  </p:timing>
+</p:sld>
+</file>
+
+<file path=ppt/slides/slide11.xml><?xml version="1.0" encoding="utf-8"?>
+<p:sld xmlns:a="http://schemas.openxmlformats.org/drawingml/2006/main" xmlns:r="http://schemas.openxmlformats.org/officeDocument/2006/relationships" xmlns:p="http://schemas.openxmlformats.org/presentationml/2006/main">
+  <p:cSld>
+    <p:spTree>
+      <p:nvGrpSpPr>
+        <p:cNvPr id="1" name=""/>
+        <p:cNvGrpSpPr/>
+        <p:nvPr/>
+      </p:nvGrpSpPr>
+      <p:grpSpPr>
+        <a:xfrm>
+          <a:off x="0" y="0"/>
+          <a:ext cx="0" cy="0"/>
+          <a:chOff x="0" y="0"/>
+          <a:chExt cx="0" cy="0"/>
+        </a:xfrm>
+      </p:grpSpPr>
+      <p:sp>
+        <p:nvSpPr>
+          <p:cNvPr id="7" name="Title 6"/>
+          <p:cNvSpPr>
+            <a:spLocks noGrp="1"/>
+          </p:cNvSpPr>
+          <p:nvPr>
+            <p:ph type="title"/>
+          </p:nvPr>
+        </p:nvSpPr>
+        <p:spPr/>
+        <p:txBody>
+          <a:bodyPr/>
+          <a:lstStyle/>
+          <a:p>
+            <a:r>
+              <a:rPr lang="en-US" dirty="0"/>
+              <a:t>Investigation continued …</a:t>
+            </a:r>
+          </a:p>
+        </p:txBody>
+      </p:sp>
+      <p:sp>
+        <p:nvSpPr>
+          <p:cNvPr id="8" name="Content Placeholder 7"/>
+          <p:cNvSpPr>
+            <a:spLocks noGrp="1"/>
+          </p:cNvSpPr>
+          <p:nvPr>
+            <p:ph idx="1"/>
+          </p:nvPr>
+        </p:nvSpPr>
+        <p:spPr/>
+        <p:txBody>
+          <a:bodyPr/>
+          <a:lstStyle/>
+          <a:p>
+            <a:pPr>
+              <a:buFont typeface="Wingdings" panose="05000000000000000000" pitchFamily="2" charset="2"/>
+              <a:buChar char="Ø"/>
+            </a:pPr>
+            <a:r>
+              <a:rPr lang="en-US" sz="1800" dirty="0" smtClean="0">
+                <a:latin typeface="Times New Roman" panose="02020603050405020304" pitchFamily="18" charset="0"/>
+                <a:cs typeface="Times New Roman" panose="02020603050405020304" pitchFamily="18" charset="0"/>
+              </a:rPr>
+              <a:t>You will now want to look at the call logs again. This time look at calls made at least 2 weeks back from the same extension. </a:t>
+            </a:r>
+          </a:p>
+          <a:p>
+            <a:pPr>
+              <a:buFont typeface="Wingdings" panose="05000000000000000000" pitchFamily="2" charset="2"/>
+              <a:buChar char="Ø"/>
+            </a:pPr>
+            <a:r>
+              <a:rPr lang="en-US" sz="1800" dirty="0" smtClean="0">
+                <a:latin typeface="Times New Roman" panose="02020603050405020304" pitchFamily="18" charset="0"/>
+                <a:cs typeface="Times New Roman" panose="02020603050405020304" pitchFamily="18" charset="0"/>
+              </a:rPr>
+              <a:t>You will once again bring up the Log Analyzer from one of these earlier calls. </a:t>
+            </a:r>
+            <a:endParaRPr lang="en-US" sz="1800" dirty="0">
+              <a:latin typeface="Times New Roman" panose="02020603050405020304" pitchFamily="18" charset="0"/>
+              <a:cs typeface="Times New Roman" panose="02020603050405020304" pitchFamily="18" charset="0"/>
+            </a:endParaRPr>
+          </a:p>
+          <a:p>
+            <a:pPr>
+              <a:buFont typeface="Wingdings" panose="05000000000000000000" pitchFamily="2" charset="2"/>
+              <a:buChar char="Ø"/>
+            </a:pPr>
+            <a:r>
+              <a:rPr lang="en-US" sz="1800" dirty="0" smtClean="0">
+                <a:latin typeface="Times New Roman" panose="02020603050405020304" pitchFamily="18" charset="0"/>
+                <a:cs typeface="Times New Roman" panose="02020603050405020304" pitchFamily="18" charset="0"/>
+              </a:rPr>
+              <a:t>Compare the information here to the information from the Log Analyzer that set off the Alert. </a:t>
+            </a:r>
+          </a:p>
+          <a:p>
+            <a:pPr>
+              <a:buFont typeface="Wingdings" panose="05000000000000000000" pitchFamily="2" charset="2"/>
+              <a:buChar char="Ø"/>
+            </a:pPr>
+            <a:r>
+              <a:rPr lang="en-US" sz="1800" dirty="0" smtClean="0">
+                <a:latin typeface="Times New Roman" panose="02020603050405020304" pitchFamily="18" charset="0"/>
+                <a:cs typeface="Times New Roman" panose="02020603050405020304" pitchFamily="18" charset="0"/>
+              </a:rPr>
+              <a:t>Check to see if these calls were from a different device, at a different IP address. </a:t>
+            </a:r>
+          </a:p>
+          <a:p>
+            <a:pPr>
+              <a:buFont typeface="Wingdings" panose="05000000000000000000" pitchFamily="2" charset="2"/>
+              <a:buChar char="Ø"/>
+            </a:pPr>
+            <a:r>
+              <a:rPr lang="en-US" sz="1800" dirty="0" smtClean="0">
+                <a:latin typeface="Times New Roman" panose="02020603050405020304" pitchFamily="18" charset="0"/>
+                <a:cs typeface="Times New Roman" panose="02020603050405020304" pitchFamily="18" charset="0"/>
+              </a:rPr>
+              <a:t>If the Device and IP address are the same and there was high latency, jitter, or  packet loss this more than likely is a False Positive Alert.</a:t>
+            </a:r>
+          </a:p>
+          <a:p>
+            <a:pPr>
+              <a:buFont typeface="Wingdings" panose="05000000000000000000" pitchFamily="2" charset="2"/>
+              <a:buChar char="Ø"/>
+            </a:pPr>
+            <a:r>
+              <a:rPr lang="en-US" sz="1800" dirty="0" smtClean="0">
+                <a:latin typeface="Times New Roman" panose="02020603050405020304" pitchFamily="18" charset="0"/>
+                <a:cs typeface="Times New Roman" panose="02020603050405020304" pitchFamily="18" charset="0"/>
+              </a:rPr>
+              <a:t>If the Device is different and the location of the IP addresses are far and seem to be suspicious then this could potentially be a Fraud.  </a:t>
+            </a:r>
+            <a:endParaRPr lang="en-US" sz="1800" dirty="0">
+              <a:latin typeface="Times New Roman" panose="02020603050405020304" pitchFamily="18" charset="0"/>
+              <a:cs typeface="Times New Roman" panose="02020603050405020304" pitchFamily="18" charset="0"/>
+            </a:endParaRPr>
+          </a:p>
+        </p:txBody>
+      </p:sp>
+      <p:sp>
+        <p:nvSpPr>
+          <p:cNvPr id="6" name="Slide Number Placeholder 5"/>
+          <p:cNvSpPr>
+            <a:spLocks noGrp="1"/>
+          </p:cNvSpPr>
+          <p:nvPr>
+            <p:ph type="sldNum" sz="quarter" idx="10"/>
+          </p:nvPr>
+        </p:nvSpPr>
+        <p:spPr/>
+        <p:txBody>
+          <a:bodyPr/>
+          <a:lstStyle/>
+          <a:p>
+            <a:fld id="{51062DCB-C440-495D-8BB3-6798C4B87E5E}" type="slidenum">
+              <a:rPr lang="en-US" smtClean="0"/>
+              <a:pPr/>
+              <a:t>11</a:t>
+            </a:fld>
+            <a:endParaRPr lang="en-US"/>
+          </a:p>
+        </p:txBody>
+      </p:sp>
+    </p:spTree>
+    <p:extLst>
+      <p:ext uri="{BB962C8B-B14F-4D97-AF65-F5344CB8AC3E}">
+        <p14:creationId xmlns:p14="http://schemas.microsoft.com/office/powerpoint/2010/main" val="2860348354"/>
+      </p:ext>
+    </p:extLst>
+  </p:cSld>
+  <p:clrMapOvr>
+    <a:masterClrMapping/>
+  </p:clrMapOvr>
+  <p:timing>
+    <p:tnLst>
+      <p:par>
+        <p:cTn id="1" dur="indefinite" restart="never" nodeType="tmRoot"/>
+      </p:par>
+    </p:tnLst>
+  </p:timing>
+</p:sld>
+</file>
+
+<file path=ppt/slides/slide12.xml><?xml version="1.0" encoding="utf-8"?>
+<p:sld xmlns:a="http://schemas.openxmlformats.org/drawingml/2006/main" xmlns:r="http://schemas.openxmlformats.org/officeDocument/2006/relationships" xmlns:p="http://schemas.openxmlformats.org/presentationml/2006/main">
+  <p:cSld>
+    <p:spTree>
+      <p:nvGrpSpPr>
+        <p:cNvPr id="1" name=""/>
+        <p:cNvGrpSpPr/>
+        <p:nvPr/>
+      </p:nvGrpSpPr>
+      <p:grpSpPr>
+        <a:xfrm>
+          <a:off x="0" y="0"/>
+          <a:ext cx="0" cy="0"/>
+          <a:chOff x="0" y="0"/>
+          <a:chExt cx="0" cy="0"/>
+        </a:xfrm>
+      </p:grpSpPr>
+      <p:sp>
+        <p:nvSpPr>
+          <p:cNvPr id="2" name="Title 1"/>
+          <p:cNvSpPr>
+            <a:spLocks noGrp="1"/>
+          </p:cNvSpPr>
+          <p:nvPr>
+            <p:ph type="title"/>
+          </p:nvPr>
+        </p:nvSpPr>
+        <p:spPr/>
+        <p:txBody>
+          <a:bodyPr/>
+          <a:lstStyle/>
+          <a:p>
+            <a:r>
               <a:rPr lang="en-US" dirty="0" smtClean="0"/>
               <a:t>Other ways to investigate.</a:t>
             </a:r>
@@ -14886,7 +15342,7 @@
               <a:pPr>
                 <a:defRPr/>
               </a:pPr>
-              <a:t>10</a:t>
+              <a:t>12</a:t>
             </a:fld>
             <a:endParaRPr lang="en-US">
               <a:solidFill>
@@ -15156,100 +15612,44 @@
                 <a:latin typeface="Times New Roman" panose="02020603050405020304" pitchFamily="18" charset="0"/>
                 <a:cs typeface="Times New Roman" panose="02020603050405020304" pitchFamily="18" charset="0"/>
               </a:rPr>
-              <a:t>This happens with concurrent calls to any of the 48 </a:t>
-            </a:r>
+              <a:t>This happens with concurrent calls to any of the 48 states that are not usually rated (Alaska &amp; Hawaii)</a:t>
+            </a:r>
+            <a:endParaRPr lang="en-US" sz="1400" dirty="0">
+              <a:latin typeface="Times New Roman" panose="02020603050405020304" pitchFamily="18" charset="0"/>
+              <a:cs typeface="Times New Roman" panose="02020603050405020304" pitchFamily="18" charset="0"/>
+            </a:endParaRPr>
+          </a:p>
+          <a:p>
+            <a:r>
+              <a:rPr lang="en-US" sz="3200" dirty="0" smtClean="0">
+                <a:latin typeface="Times New Roman" panose="02020603050405020304" pitchFamily="18" charset="0"/>
+                <a:cs typeface="Times New Roman" panose="02020603050405020304" pitchFamily="18" charset="0"/>
+              </a:rPr>
+              <a:t>Vonage Alert </a:t>
+            </a:r>
+          </a:p>
+          <a:p>
+            <a:pPr marL="0" indent="0">
+              <a:buNone/>
+            </a:pPr>
             <a:r>
               <a:rPr lang="en-US" sz="1400" dirty="0" smtClean="0">
                 <a:latin typeface="Times New Roman" panose="02020603050405020304" pitchFamily="18" charset="0"/>
                 <a:cs typeface="Times New Roman" panose="02020603050405020304" pitchFamily="18" charset="0"/>
               </a:rPr>
-              <a:t>states that are not usually rated (Alaska </a:t>
-            </a:r>
-            <a:r>
-              <a:rPr lang="en-US" sz="1400" dirty="0" smtClean="0">
-                <a:latin typeface="Times New Roman" panose="02020603050405020304" pitchFamily="18" charset="0"/>
-                <a:cs typeface="Times New Roman" panose="02020603050405020304" pitchFamily="18" charset="0"/>
-              </a:rPr>
-              <a:t>&amp; </a:t>
-            </a:r>
-            <a:r>
-              <a:rPr lang="en-US" sz="1400" dirty="0" smtClean="0">
-                <a:latin typeface="Times New Roman" panose="02020603050405020304" pitchFamily="18" charset="0"/>
-                <a:cs typeface="Times New Roman" panose="02020603050405020304" pitchFamily="18" charset="0"/>
-              </a:rPr>
-              <a:t>Hawaii)</a:t>
-            </a:r>
-            <a:endParaRPr lang="en-US" sz="1400" dirty="0">
-              <a:latin typeface="Times New Roman" panose="02020603050405020304" pitchFamily="18" charset="0"/>
-              <a:cs typeface="Times New Roman" panose="02020603050405020304" pitchFamily="18" charset="0"/>
-            </a:endParaRPr>
-          </a:p>
-          <a:p>
+              <a:t>Carrier Alert which usually has very little info and commonly consists of calls to blacklisted regions or numbers.</a:t>
+            </a:r>
+          </a:p>
+          <a:p>
+            <a:pPr marL="0" indent="0">
+              <a:buNone/>
+            </a:pPr>
             <a:r>
               <a:rPr lang="en-US" sz="3200" dirty="0" smtClean="0">
                 <a:latin typeface="Times New Roman" panose="02020603050405020304" pitchFamily="18" charset="0"/>
                 <a:cs typeface="Times New Roman" panose="02020603050405020304" pitchFamily="18" charset="0"/>
               </a:rPr>
-              <a:t>Vonage </a:t>
-            </a:r>
-            <a:r>
-              <a:rPr lang="en-US" sz="3200" dirty="0" smtClean="0">
-                <a:latin typeface="Times New Roman" panose="02020603050405020304" pitchFamily="18" charset="0"/>
-                <a:cs typeface="Times New Roman" panose="02020603050405020304" pitchFamily="18" charset="0"/>
-              </a:rPr>
-              <a:t>Alert </a:t>
-            </a:r>
-          </a:p>
-          <a:p>
-            <a:pPr marL="0" indent="0">
-              <a:buNone/>
-            </a:pPr>
-            <a:r>
-              <a:rPr lang="en-US" sz="1400" dirty="0" smtClean="0">
-                <a:latin typeface="Times New Roman" panose="02020603050405020304" pitchFamily="18" charset="0"/>
-                <a:cs typeface="Times New Roman" panose="02020603050405020304" pitchFamily="18" charset="0"/>
-              </a:rPr>
-              <a:t>Carrier </a:t>
-            </a:r>
-            <a:r>
-              <a:rPr lang="en-US" sz="1400" dirty="0" smtClean="0">
-                <a:latin typeface="Times New Roman" panose="02020603050405020304" pitchFamily="18" charset="0"/>
-                <a:cs typeface="Times New Roman" panose="02020603050405020304" pitchFamily="18" charset="0"/>
-              </a:rPr>
-              <a:t>Alert </a:t>
-            </a:r>
-            <a:r>
-              <a:rPr lang="en-US" sz="1400" dirty="0" smtClean="0">
-                <a:latin typeface="Times New Roman" panose="02020603050405020304" pitchFamily="18" charset="0"/>
-                <a:cs typeface="Times New Roman" panose="02020603050405020304" pitchFamily="18" charset="0"/>
-              </a:rPr>
-              <a:t>which usually has very little </a:t>
-            </a:r>
-            <a:r>
-              <a:rPr lang="en-US" sz="1400" dirty="0" smtClean="0">
-                <a:latin typeface="Times New Roman" panose="02020603050405020304" pitchFamily="18" charset="0"/>
-                <a:cs typeface="Times New Roman" panose="02020603050405020304" pitchFamily="18" charset="0"/>
-              </a:rPr>
-              <a:t>info and commonly consists of calls to blacklisted regions or numbers.</a:t>
-            </a:r>
-          </a:p>
-          <a:p>
-            <a:pPr marL="0" indent="0">
-              <a:buNone/>
-            </a:pPr>
-            <a:r>
-              <a:rPr lang="en-US" sz="3200" dirty="0" smtClean="0">
-                <a:latin typeface="Times New Roman" panose="02020603050405020304" pitchFamily="18" charset="0"/>
-                <a:cs typeface="Times New Roman" panose="02020603050405020304" pitchFamily="18" charset="0"/>
-              </a:rPr>
-              <a:t>Spending </a:t>
-            </a:r>
-            <a:r>
-              <a:rPr lang="en-US" sz="3200" dirty="0" smtClean="0">
-                <a:latin typeface="Times New Roman" panose="02020603050405020304" pitchFamily="18" charset="0"/>
-                <a:cs typeface="Times New Roman" panose="02020603050405020304" pitchFamily="18" charset="0"/>
-              </a:rPr>
-              <a:t>Alert</a:t>
+              <a:t>Spending Alert</a:t>
             </a:r>
           </a:p>
           <a:p>
@@ -15363,7 +15763,7 @@
               <a:rPr lang="en-US" sz="4800" dirty="0" smtClean="0">
                 <a:latin typeface="Impact" panose="020B0806030902050204" pitchFamily="34" charset="0"/>
               </a:rPr>
-              <a:t>Investigation Steps</a:t>
+              <a:t>Root Alert</a:t>
             </a:r>
             <a:endParaRPr lang="en-US" sz="4800" dirty="0">
               <a:latin typeface="Impact" panose="020B0806030902050204" pitchFamily="34" charset="0"/>
@@ -15381,288 +15781,58 @@
             <p:ph idx="1"/>
           </p:nvPr>
         </p:nvSpPr>
-        <p:spPr/>
+        <p:spPr>
+          <a:xfrm>
+            <a:off x="354013" y="1293813"/>
+            <a:ext cx="8440737" cy="611187"/>
+          </a:xfrm>
+        </p:spPr>
         <p:txBody>
           <a:bodyPr/>
           <a:lstStyle/>
           <a:p>
-            <a:pPr marL="342900" indent="-342900">
-              <a:buFont typeface="+mj-lt"/>
-              <a:buAutoNum type="arabicPeriod"/>
+            <a:pPr marL="0" indent="0">
+              <a:buNone/>
             </a:pPr>
             <a:r>
-              <a:rPr lang="en-US" sz="1600" dirty="0">
+              <a:rPr lang="en-US" sz="1400" dirty="0" smtClean="0">
                 <a:latin typeface="Times New Roman" panose="02020603050405020304" pitchFamily="18" charset="0"/>
                 <a:cs typeface="Times New Roman" panose="02020603050405020304" pitchFamily="18" charset="0"/>
               </a:rPr>
-              <a:t>After the Fraud alert comes to the On-Call phone forward that email to yourself in Outlook</a:t>
-            </a:r>
-            <a:r>
-              <a:rPr lang="en-US" sz="1600" dirty="0" smtClean="0">
-                <a:latin typeface="Times New Roman" panose="02020603050405020304" pitchFamily="18" charset="0"/>
-                <a:cs typeface="Times New Roman" panose="02020603050405020304" pitchFamily="18" charset="0"/>
-              </a:rPr>
-              <a:t>.</a:t>
-            </a:r>
-            <a:endParaRPr lang="en-US" sz="1600" dirty="0">
-              <a:latin typeface="Times New Roman" panose="02020603050405020304" pitchFamily="18" charset="0"/>
-              <a:cs typeface="Times New Roman" panose="02020603050405020304" pitchFamily="18" charset="0"/>
-            </a:endParaRPr>
-          </a:p>
-          <a:p>
-            <a:pPr marL="342900" indent="-342900">
-              <a:buFont typeface="+mj-lt"/>
-              <a:buAutoNum type="arabicPeriod"/>
-            </a:pPr>
-            <a:r>
-              <a:rPr lang="en-US" sz="1600" dirty="0">
-                <a:latin typeface="Times New Roman" panose="02020603050405020304" pitchFamily="18" charset="0"/>
-                <a:cs typeface="Times New Roman" panose="02020603050405020304" pitchFamily="18" charset="0"/>
-              </a:rPr>
-              <a:t>From Outlook “Reply All” (Potential Fraud &amp; CCare On-Call 1) with “Investigating”. Make sure your reply includes your Outlook signature</a:t>
-            </a:r>
-            <a:r>
-              <a:rPr lang="en-US" sz="1600" dirty="0" smtClean="0">
-                <a:latin typeface="Times New Roman" panose="02020603050405020304" pitchFamily="18" charset="0"/>
-                <a:cs typeface="Times New Roman" panose="02020603050405020304" pitchFamily="18" charset="0"/>
-              </a:rPr>
-              <a:t>.</a:t>
-            </a:r>
-            <a:endParaRPr lang="en-US" sz="1600" dirty="0">
-              <a:latin typeface="Times New Roman" panose="02020603050405020304" pitchFamily="18" charset="0"/>
-              <a:cs typeface="Times New Roman" panose="02020603050405020304" pitchFamily="18" charset="0"/>
-            </a:endParaRPr>
-          </a:p>
-          <a:p>
-            <a:pPr marL="342900" indent="-342900">
-              <a:buFont typeface="+mj-lt"/>
-              <a:buAutoNum type="arabicPeriod"/>
-            </a:pPr>
-            <a:r>
-              <a:rPr lang="en-US" sz="1600" dirty="0">
-                <a:latin typeface="Times New Roman" panose="02020603050405020304" pitchFamily="18" charset="0"/>
-                <a:cs typeface="Times New Roman" panose="02020603050405020304" pitchFamily="18" charset="0"/>
-              </a:rPr>
-              <a:t>Check the Account and see if a ticket was created in Salesforce if not create one. Insure you change case owner to On-Call and place your name in the Tier 2 Rep field</a:t>
-            </a:r>
-            <a:r>
-              <a:rPr lang="en-US" sz="1600" dirty="0" smtClean="0">
-                <a:latin typeface="Times New Roman" panose="02020603050405020304" pitchFamily="18" charset="0"/>
-                <a:cs typeface="Times New Roman" panose="02020603050405020304" pitchFamily="18" charset="0"/>
-              </a:rPr>
-              <a:t>.</a:t>
-            </a:r>
-            <a:endParaRPr lang="en-US" sz="1600" dirty="0">
-              <a:latin typeface="Times New Roman" panose="02020603050405020304" pitchFamily="18" charset="0"/>
-              <a:cs typeface="Times New Roman" panose="02020603050405020304" pitchFamily="18" charset="0"/>
-            </a:endParaRPr>
-          </a:p>
-          <a:p>
-            <a:pPr marL="342900" indent="-342900">
-              <a:buFont typeface="+mj-lt"/>
-              <a:buAutoNum type="arabicPeriod"/>
-            </a:pPr>
-            <a:r>
-              <a:rPr lang="en-US" sz="1600" dirty="0">
-                <a:latin typeface="Times New Roman" panose="02020603050405020304" pitchFamily="18" charset="0"/>
-                <a:cs typeface="Times New Roman" panose="02020603050405020304" pitchFamily="18" charset="0"/>
-              </a:rPr>
-              <a:t>Copy the notes from the Alert and paste them into the Salesforce Description, be sure to include the type of Fraud Alert i.e.: Root, Domestic, Vonage, or Spending</a:t>
-            </a:r>
-            <a:r>
-              <a:rPr lang="en-US" sz="1600" dirty="0" smtClean="0">
-                <a:latin typeface="Times New Roman" panose="02020603050405020304" pitchFamily="18" charset="0"/>
-                <a:cs typeface="Times New Roman" panose="02020603050405020304" pitchFamily="18" charset="0"/>
-              </a:rPr>
-              <a:t>.</a:t>
-            </a:r>
-            <a:endParaRPr lang="en-US" sz="1600" dirty="0">
-              <a:latin typeface="Times New Roman" panose="02020603050405020304" pitchFamily="18" charset="0"/>
-              <a:cs typeface="Times New Roman" panose="02020603050405020304" pitchFamily="18" charset="0"/>
-            </a:endParaRPr>
-          </a:p>
-          <a:p>
-            <a:pPr marL="342900" indent="-342900">
-              <a:buFont typeface="+mj-lt"/>
-              <a:buAutoNum type="arabicPeriod"/>
-            </a:pPr>
-            <a:r>
-              <a:rPr lang="en-US" sz="1600" dirty="0">
-                <a:latin typeface="Times New Roman" panose="02020603050405020304" pitchFamily="18" charset="0"/>
-                <a:cs typeface="Times New Roman" panose="02020603050405020304" pitchFamily="18" charset="0"/>
-              </a:rPr>
-              <a:t>Thoroughly investigate the potential Fraud and make your determination whether it’s a False-Positive or Fraud</a:t>
-            </a:r>
-            <a:r>
-              <a:rPr lang="en-US" sz="1600" dirty="0" smtClean="0">
-                <a:latin typeface="Times New Roman" panose="02020603050405020304" pitchFamily="18" charset="0"/>
-                <a:cs typeface="Times New Roman" panose="02020603050405020304" pitchFamily="18" charset="0"/>
-              </a:rPr>
-              <a:t>.</a:t>
-            </a:r>
-            <a:endParaRPr lang="en-US" sz="1600" dirty="0">
-              <a:latin typeface="Times New Roman" panose="02020603050405020304" pitchFamily="18" charset="0"/>
-              <a:cs typeface="Times New Roman" panose="02020603050405020304" pitchFamily="18" charset="0"/>
-            </a:endParaRPr>
-          </a:p>
-          <a:p>
-            <a:pPr marL="342900" indent="-342900">
-              <a:buFont typeface="+mj-lt"/>
-              <a:buAutoNum type="arabicPeriod"/>
-            </a:pPr>
-            <a:r>
-              <a:rPr lang="en-US" sz="1600" dirty="0">
-                <a:latin typeface="Times New Roman" panose="02020603050405020304" pitchFamily="18" charset="0"/>
-                <a:cs typeface="Times New Roman" panose="02020603050405020304" pitchFamily="18" charset="0"/>
-              </a:rPr>
-              <a:t> From Outlook “Reply All” to the Alert with your investigation notes. (see examples below</a:t>
-            </a:r>
-            <a:r>
-              <a:rPr lang="en-US" sz="1600" dirty="0" smtClean="0">
-                <a:latin typeface="Times New Roman" panose="02020603050405020304" pitchFamily="18" charset="0"/>
-                <a:cs typeface="Times New Roman" panose="02020603050405020304" pitchFamily="18" charset="0"/>
-              </a:rPr>
-              <a:t>)</a:t>
-            </a:r>
-            <a:endParaRPr lang="en-US" sz="1600" dirty="0">
-              <a:latin typeface="Times New Roman" panose="02020603050405020304" pitchFamily="18" charset="0"/>
-              <a:cs typeface="Times New Roman" panose="02020603050405020304" pitchFamily="18" charset="0"/>
-            </a:endParaRPr>
-          </a:p>
-          <a:p>
-            <a:pPr marL="342900" indent="-342900">
-              <a:buFont typeface="+mj-lt"/>
-              <a:buAutoNum type="arabicPeriod"/>
-            </a:pPr>
-            <a:r>
-              <a:rPr lang="en-US" sz="1600" dirty="0">
-                <a:latin typeface="Times New Roman" panose="02020603050405020304" pitchFamily="18" charset="0"/>
-                <a:cs typeface="Times New Roman" panose="02020603050405020304" pitchFamily="18" charset="0"/>
-              </a:rPr>
-              <a:t>Update your salesforce ticket with your investigation notes in the “Log Call” section change Problem </a:t>
-            </a:r>
-            <a:r>
-              <a:rPr lang="en-US" sz="1600" dirty="0" smtClean="0">
-                <a:latin typeface="Times New Roman" panose="02020603050405020304" pitchFamily="18" charset="0"/>
-                <a:cs typeface="Times New Roman" panose="02020603050405020304" pitchFamily="18" charset="0"/>
-              </a:rPr>
-              <a:t>Code to “Fraud Alert” and Problem Code II to reflect </a:t>
-            </a:r>
-            <a:r>
-              <a:rPr lang="en-US" sz="1600" dirty="0">
-                <a:latin typeface="Times New Roman" panose="02020603050405020304" pitchFamily="18" charset="0"/>
-                <a:cs typeface="Times New Roman" panose="02020603050405020304" pitchFamily="18" charset="0"/>
-              </a:rPr>
-              <a:t>False-Positive or Fraud. Make sure case owner is set to On-Call and your name is in the Tier 2 Rep field or you will not be paid</a:t>
-            </a:r>
-            <a:r>
-              <a:rPr lang="en-US" sz="1600" dirty="0" smtClean="0">
-                <a:latin typeface="Times New Roman" panose="02020603050405020304" pitchFamily="18" charset="0"/>
-                <a:cs typeface="Times New Roman" panose="02020603050405020304" pitchFamily="18" charset="0"/>
-              </a:rPr>
-              <a:t>.</a:t>
-            </a:r>
-            <a:endParaRPr lang="en-US" sz="1600" dirty="0">
-              <a:latin typeface="Times New Roman" panose="02020603050405020304" pitchFamily="18" charset="0"/>
-              <a:cs typeface="Times New Roman" panose="02020603050405020304" pitchFamily="18" charset="0"/>
-            </a:endParaRPr>
-          </a:p>
-          <a:p>
-            <a:pPr marL="342900" indent="-342900">
-              <a:buFont typeface="+mj-lt"/>
-              <a:buAutoNum type="arabicPeriod"/>
-            </a:pPr>
-            <a:r>
-              <a:rPr lang="en-US" sz="1600" dirty="0">
-                <a:latin typeface="Times New Roman" panose="02020603050405020304" pitchFamily="18" charset="0"/>
-                <a:cs typeface="Times New Roman" panose="02020603050405020304" pitchFamily="18" charset="0"/>
-              </a:rPr>
-              <a:t>Close Ticket “Resolved</a:t>
-            </a:r>
-            <a:r>
-              <a:rPr lang="en-US" sz="1600" dirty="0" smtClean="0">
-                <a:latin typeface="Times New Roman" panose="02020603050405020304" pitchFamily="18" charset="0"/>
-                <a:cs typeface="Times New Roman" panose="02020603050405020304" pitchFamily="18" charset="0"/>
-              </a:rPr>
-              <a:t>”</a:t>
-            </a:r>
-            <a:endParaRPr lang="en-US" sz="1600" dirty="0">
-              <a:latin typeface="Times New Roman" panose="02020603050405020304" pitchFamily="18" charset="0"/>
-              <a:cs typeface="Times New Roman" panose="02020603050405020304" pitchFamily="18" charset="0"/>
-            </a:endParaRPr>
-          </a:p>
-          <a:p>
-            <a:pPr marL="342900" indent="-342900">
-              <a:buFont typeface="+mj-lt"/>
-              <a:buAutoNum type="arabicPeriod"/>
-            </a:pPr>
-            <a:r>
-              <a:rPr lang="en-US" sz="1600" dirty="0" smtClean="0">
-                <a:latin typeface="Times New Roman" panose="02020603050405020304" pitchFamily="18" charset="0"/>
-                <a:cs typeface="Times New Roman" panose="02020603050405020304" pitchFamily="18" charset="0"/>
-              </a:rPr>
-              <a:t>Send an </a:t>
-            </a:r>
-            <a:r>
-              <a:rPr lang="en-US" sz="1600" dirty="0">
-                <a:latin typeface="Times New Roman" panose="02020603050405020304" pitchFamily="18" charset="0"/>
-                <a:cs typeface="Times New Roman" panose="02020603050405020304" pitchFamily="18" charset="0"/>
-              </a:rPr>
-              <a:t>email to </a:t>
-            </a:r>
-            <a:r>
-              <a:rPr lang="en-US" sz="1600" dirty="0" smtClean="0">
-                <a:latin typeface="Times New Roman" panose="02020603050405020304" pitchFamily="18" charset="0"/>
-                <a:cs typeface="Times New Roman" panose="02020603050405020304" pitchFamily="18" charset="0"/>
-                <a:hlinkClick r:id="rId2"/>
-              </a:rPr>
-              <a:t>FraudandAbuseTeam-vb@vonage.com</a:t>
-            </a:r>
-            <a:r>
-              <a:rPr lang="en-US" sz="1600" dirty="0" smtClean="0">
-                <a:latin typeface="Times New Roman" panose="02020603050405020304" pitchFamily="18" charset="0"/>
-                <a:cs typeface="Times New Roman" panose="02020603050405020304" pitchFamily="18" charset="0"/>
-              </a:rPr>
-              <a:t> for</a:t>
-            </a:r>
-            <a:r>
-              <a:rPr lang="en-US" sz="1600" dirty="0" smtClean="0">
+              <a:t>Root Alerts are generated by calls exceeding account thresholds or are calls that either the customer or Vonage is being charged for.</a:t>
+            </a:r>
+            <a:r>
+              <a:rPr lang="en-US" sz="1400" dirty="0">
                 <a:latin typeface="Times New Roman" panose="02020603050405020304" pitchFamily="18" charset="0"/>
                 <a:cs typeface="Times New Roman" panose="02020603050405020304" pitchFamily="18" charset="0"/>
               </a:rPr>
               <a:t> </a:t>
             </a:r>
             <a:r>
-              <a:rPr lang="en-US" sz="1600" dirty="0">
+              <a:rPr lang="en-US" sz="1400" dirty="0" smtClean="0">
                 <a:latin typeface="Times New Roman" panose="02020603050405020304" pitchFamily="18" charset="0"/>
                 <a:cs typeface="Times New Roman" panose="02020603050405020304" pitchFamily="18" charset="0"/>
               </a:rPr>
-              <a:t>any actual Frauds </a:t>
-            </a:r>
-            <a:r>
-              <a:rPr lang="en-US" sz="1600" dirty="0" smtClean="0">
-                <a:latin typeface="Times New Roman" panose="02020603050405020304" pitchFamily="18" charset="0"/>
-                <a:cs typeface="Times New Roman" panose="02020603050405020304" pitchFamily="18" charset="0"/>
-              </a:rPr>
-              <a:t>at </a:t>
-            </a:r>
-            <a:r>
-              <a:rPr lang="en-US" sz="1600" dirty="0" smtClean="0">
-                <a:latin typeface="Times New Roman" panose="02020603050405020304" pitchFamily="18" charset="0"/>
-                <a:cs typeface="Times New Roman" panose="02020603050405020304" pitchFamily="18" charset="0"/>
-              </a:rPr>
-              <a:t>the </a:t>
-            </a:r>
-            <a:r>
-              <a:rPr lang="en-US" sz="1600" dirty="0">
-                <a:latin typeface="Times New Roman" panose="02020603050405020304" pitchFamily="18" charset="0"/>
-                <a:cs typeface="Times New Roman" panose="02020603050405020304" pitchFamily="18" charset="0"/>
-              </a:rPr>
-              <a:t>next day so the total charges can be calculated.</a:t>
-            </a:r>
-          </a:p>
-          <a:p>
-            <a:endParaRPr lang="en-US" dirty="0"/>
+              <a:t>Example:</a:t>
+            </a:r>
+          </a:p>
+          <a:p>
+            <a:pPr marL="0" indent="0">
+              <a:buNone/>
+            </a:pPr>
+            <a:endParaRPr lang="en-US" sz="1400" dirty="0" smtClean="0">
+              <a:latin typeface="Times New Roman" panose="02020603050405020304" pitchFamily="18" charset="0"/>
+              <a:cs typeface="Times New Roman" panose="02020603050405020304" pitchFamily="18" charset="0"/>
+            </a:endParaRPr>
+          </a:p>
+          <a:p>
+            <a:pPr marL="0" indent="0">
+              <a:buNone/>
+            </a:pPr>
+            <a:endParaRPr lang="en-US" sz="1400" dirty="0" smtClean="0">
+              <a:latin typeface="Times New Roman" panose="02020603050405020304" pitchFamily="18" charset="0"/>
+              <a:cs typeface="Times New Roman" panose="02020603050405020304" pitchFamily="18" charset="0"/>
+            </a:endParaRPr>
           </a:p>
         </p:txBody>
       </p:sp>
@@ -15703,10 +15873,40 @@
           </a:p>
         </p:txBody>
       </p:sp>
+      <p:pic>
+        <p:nvPicPr>
+          <p:cNvPr id="5" name="Picture 4"/>
+          <p:cNvPicPr>
+            <a:picLocks noChangeAspect="1"/>
+          </p:cNvPicPr>
+          <p:nvPr/>
+        </p:nvPicPr>
+        <p:blipFill>
+          <a:blip r:embed="rId2">
+            <a:extLst>
+              <a:ext uri="{28A0092B-C50C-407E-A947-70E740481C1C}">
+                <a14:useLocalDpi xmlns:a14="http://schemas.microsoft.com/office/drawing/2010/main" val="0"/>
+              </a:ext>
+            </a:extLst>
+          </a:blip>
+          <a:stretch>
+            <a:fillRect/>
+          </a:stretch>
+        </p:blipFill>
+        <p:spPr>
+          <a:xfrm>
+            <a:off x="381000" y="2133599"/>
+            <a:ext cx="8534400" cy="3930805"/>
+          </a:xfrm>
+          <a:prstGeom prst="rect">
+            <a:avLst/>
+          </a:prstGeom>
+        </p:spPr>
+      </p:pic>
     </p:spTree>
     <p:extLst>
       <p:ext uri="{BB962C8B-B14F-4D97-AF65-F5344CB8AC3E}">
-        <p14:creationId xmlns:p14="http://schemas.microsoft.com/office/powerpoint/2010/main" val="3464281621"/>
+        <p14:creationId xmlns:p14="http://schemas.microsoft.com/office/powerpoint/2010/main" val="4268856480"/>
       </p:ext>
     </p:extLst>
   </p:cSld>
@@ -15742,7 +15942,7 @@
       </p:grpSpPr>
       <p:sp>
         <p:nvSpPr>
-          <p:cNvPr id="6" name="Title 5"/>
+          <p:cNvPr id="2" name="Title 1"/>
           <p:cNvSpPr>
             <a:spLocks noGrp="1"/>
           </p:cNvSpPr>
@@ -15756,66 +15956,86 @@
           <a:lstStyle/>
           <a:p>
             <a:r>
-              <a:rPr lang="en-US" dirty="0" smtClean="0"/>
-              <a:t>Begin Your Investigation </a:t>
-            </a:r>
-            <a:endParaRPr lang="en-US" dirty="0"/>
-          </a:p>
-        </p:txBody>
-      </p:sp>
-      <p:sp>
-        <p:nvSpPr>
-          <p:cNvPr id="7" name="Content Placeholder 6"/>
+              <a:rPr lang="en-US" sz="4800" dirty="0" smtClean="0">
+                <a:latin typeface="Impact" panose="020B0806030902050204" pitchFamily="34" charset="0"/>
+              </a:rPr>
+              <a:t>Domestic Alert</a:t>
+            </a:r>
+            <a:endParaRPr lang="en-US" sz="4800" dirty="0">
+              <a:latin typeface="Impact" panose="020B0806030902050204" pitchFamily="34" charset="0"/>
+            </a:endParaRPr>
+          </a:p>
+        </p:txBody>
+      </p:sp>
+      <p:sp>
+        <p:nvSpPr>
+          <p:cNvPr id="3" name="Content Placeholder 2"/>
           <p:cNvSpPr>
             <a:spLocks noGrp="1"/>
           </p:cNvSpPr>
           <p:nvPr>
-            <p:ph sz="half" idx="1"/>
+            <p:ph idx="1"/>
           </p:nvPr>
         </p:nvSpPr>
         <p:spPr>
           <a:xfrm>
-            <a:off x="381001" y="1371600"/>
-            <a:ext cx="3505199" cy="4768850"/>
+            <a:off x="354013" y="1293813"/>
+            <a:ext cx="8440737" cy="611187"/>
           </a:xfrm>
         </p:spPr>
         <p:txBody>
           <a:bodyPr/>
           <a:lstStyle/>
           <a:p>
-            <a:pPr>
-              <a:buFont typeface="Wingdings" panose="05000000000000000000" pitchFamily="2" charset="2"/>
-              <a:buChar char="Ø"/>
+            <a:pPr marL="0" indent="0">
+              <a:buNone/>
             </a:pPr>
             <a:r>
-              <a:rPr lang="en-US" sz="1600" dirty="0" smtClean="0"/>
-              <a:t>You will begin you investigation by looking at the account registration page.</a:t>
-            </a:r>
-          </a:p>
-          <a:p>
-            <a:pPr>
-              <a:buFont typeface="Wingdings" panose="05000000000000000000" pitchFamily="2" charset="2"/>
-              <a:buChar char="Ø"/>
+              <a:rPr lang="en-US" sz="1400" dirty="0" smtClean="0">
+                <a:latin typeface="Times New Roman" panose="02020603050405020304" pitchFamily="18" charset="0"/>
+                <a:cs typeface="Times New Roman" panose="02020603050405020304" pitchFamily="18" charset="0"/>
+              </a:rPr>
+              <a:t>Domestic Alerts are generated by calls exceeding account thresholds or are calls that either the customer or Vonage is being charged for.</a:t>
+            </a:r>
+            <a:r>
+              <a:rPr lang="en-US" sz="1400" dirty="0">
+                <a:latin typeface="Times New Roman" panose="02020603050405020304" pitchFamily="18" charset="0"/>
+                <a:cs typeface="Times New Roman" panose="02020603050405020304" pitchFamily="18" charset="0"/>
+              </a:rPr>
+              <a:t> </a:t>
+            </a:r>
+            <a:r>
+              <a:rPr lang="en-US" sz="1400" dirty="0" err="1" smtClean="0">
+                <a:latin typeface="Times New Roman" panose="02020603050405020304" pitchFamily="18" charset="0"/>
+                <a:cs typeface="Times New Roman" panose="02020603050405020304" pitchFamily="18" charset="0"/>
+              </a:rPr>
+              <a:t>Exgitample</a:t>
+            </a:r>
+            <a:r>
+              <a:rPr lang="en-US" sz="1400" dirty="0" smtClean="0">
+                <a:latin typeface="Times New Roman" panose="02020603050405020304" pitchFamily="18" charset="0"/>
+                <a:cs typeface="Times New Roman" panose="02020603050405020304" pitchFamily="18" charset="0"/>
+              </a:rPr>
+              <a:t>:</a:t>
+            </a:r>
+          </a:p>
+          <a:p>
+            <a:pPr marL="0" indent="0">
+              <a:buNone/>
             </a:pPr>
-            <a:r>
-              <a:rPr lang="en-US" sz="1600" dirty="0" smtClean="0"/>
-              <a:t>From here you will want to check the IP addresses of any currently registering devices.</a:t>
-            </a:r>
-          </a:p>
-          <a:p>
-            <a:pPr>
-              <a:buFont typeface="Wingdings" panose="05000000000000000000" pitchFamily="2" charset="2"/>
-              <a:buChar char="Ø"/>
+            <a:endParaRPr lang="en-US" sz="1400" dirty="0" smtClean="0">
+              <a:latin typeface="Times New Roman" panose="02020603050405020304" pitchFamily="18" charset="0"/>
+              <a:cs typeface="Times New Roman" panose="02020603050405020304" pitchFamily="18" charset="0"/>
+            </a:endParaRPr>
+          </a:p>
+          <a:p>
+            <a:pPr marL="0" indent="0">
+              <a:buNone/>
             </a:pPr>
-            <a:r>
-              <a:rPr lang="en-US" sz="1600" dirty="0" smtClean="0"/>
-              <a:t>You will also want to see if there are any devices registering with duplicate </a:t>
-            </a:r>
-            <a:r>
-              <a:rPr lang="en-US" sz="1600" dirty="0" smtClean="0"/>
-              <a:t>SIP IDs.</a:t>
-            </a:r>
-            <a:endParaRPr lang="en-US" sz="1600" dirty="0"/>
+            <a:endParaRPr lang="en-US" sz="1400" dirty="0" smtClean="0">
+              <a:latin typeface="Times New Roman" panose="02020603050405020304" pitchFamily="18" charset="0"/>
+              <a:cs typeface="Times New Roman" panose="02020603050405020304" pitchFamily="18" charset="0"/>
+            </a:endParaRPr>
           </a:p>
         </p:txBody>
       </p:sp>
@@ -15837,7 +16057,7 @@
             <a:pPr>
               <a:defRPr/>
             </a:pPr>
-            <a:fld id="{D3208C8F-5341-4944-8C08-C55337151DB1}" type="slidenum">
+            <a:fld id="{16514749-0C09-4910-A1F5-A5A3B603506F}" type="slidenum">
               <a:rPr lang="en-US" smtClean="0">
                 <a:solidFill>
                   <a:srgbClr val="FFFFFF"/>
@@ -15848,7 +16068,7 @@
               </a:pPr>
               <a:t>5</a:t>
             </a:fld>
-            <a:endParaRPr lang="en-US" dirty="0">
+            <a:endParaRPr lang="en-US">
               <a:solidFill>
                 <a:srgbClr val="FFFFFF"/>
               </a:solidFill>
@@ -15858,26 +16078,15 @@
       </p:sp>
       <p:pic>
         <p:nvPicPr>
-          <p:cNvPr id="14" name="Content Placeholder 13"/>
+          <p:cNvPr id="5" name="Picture 4"/>
           <p:cNvPicPr>
-            <a:picLocks noGrp="1" noChangeAspect="1"/>
+            <a:picLocks noChangeAspect="1"/>
           </p:cNvPicPr>
-          <p:nvPr>
-            <p:ph sz="half" idx="2"/>
-          </p:nvPr>
+          <p:nvPr/>
         </p:nvPicPr>
         <p:blipFill>
-          <a:blip r:embed="rId2" cstate="print">
+          <a:blip r:embed="rId2">
             <a:extLst>
-              <a:ext uri="{BEBA8EAE-BF5A-486C-A8C5-ECC9F3942E4B}">
-                <a14:imgProps xmlns:a14="http://schemas.microsoft.com/office/drawing/2010/main">
-                  <a14:imgLayer r:embed="rId3">
-                    <a14:imgEffect>
-                      <a14:sharpenSoften amount="50000"/>
-                    </a14:imgEffect>
-                  </a14:imgLayer>
-                </a14:imgProps>
-              </a:ext>
               <a:ext uri="{28A0092B-C50C-407E-A947-70E740481C1C}">
                 <a14:useLocalDpi xmlns:a14="http://schemas.microsoft.com/office/drawing/2010/main" val="0"/>
               </a:ext>
@@ -15889,15 +16098,18 @@
         </p:blipFill>
         <p:spPr>
           <a:xfrm>
-            <a:off x="3886200" y="1447800"/>
-            <a:ext cx="4908550" cy="4724399"/>
+            <a:off x="381000" y="2133599"/>
+            <a:ext cx="8534400" cy="3930805"/>
           </a:xfrm>
+          <a:prstGeom prst="rect">
+            <a:avLst/>
+          </a:prstGeom>
         </p:spPr>
       </p:pic>
     </p:spTree>
     <p:extLst>
       <p:ext uri="{BB962C8B-B14F-4D97-AF65-F5344CB8AC3E}">
-        <p14:creationId xmlns:p14="http://schemas.microsoft.com/office/powerpoint/2010/main" val="1031350540"/>
+        <p14:creationId xmlns:p14="http://schemas.microsoft.com/office/powerpoint/2010/main" val="292283013"/>
       </p:ext>
     </p:extLst>
   </p:cSld>
@@ -15947,10 +16159,14 @@
           <a:lstStyle/>
           <a:p>
             <a:r>
-              <a:rPr lang="en-US" dirty="0" smtClean="0"/>
-              <a:t>Investigation continued …</a:t>
-            </a:r>
-            <a:endParaRPr lang="en-US" dirty="0"/>
+              <a:rPr lang="en-US" sz="4800" dirty="0" smtClean="0">
+                <a:latin typeface="Impact" panose="020B0806030902050204" pitchFamily="34" charset="0"/>
+              </a:rPr>
+              <a:t>Investigation Steps</a:t>
+            </a:r>
+            <a:endParaRPr lang="en-US" sz="4800" dirty="0">
+              <a:latin typeface="Impact" panose="020B0806030902050204" pitchFamily="34" charset="0"/>
+            </a:endParaRPr>
           </a:p>
         </p:txBody>
       </p:sp>
@@ -15961,100 +16177,283 @@
             <a:spLocks noGrp="1"/>
           </p:cNvSpPr>
           <p:nvPr>
-            <p:ph sz="half" idx="1"/>
-          </p:nvPr>
-        </p:nvSpPr>
-        <p:spPr>
-          <a:xfrm>
-            <a:off x="354013" y="1293813"/>
-            <a:ext cx="3379787" cy="4768850"/>
-          </a:xfrm>
-        </p:spPr>
+            <p:ph idx="1"/>
+          </p:nvPr>
+        </p:nvSpPr>
+        <p:spPr/>
         <p:txBody>
           <a:bodyPr/>
           <a:lstStyle/>
           <a:p>
-            <a:pPr>
-              <a:buFont typeface="Wingdings" panose="05000000000000000000" pitchFamily="2" charset="2"/>
-              <a:buChar char="Ø"/>
+            <a:pPr marL="342900" indent="-342900">
+              <a:buFont typeface="+mj-lt"/>
+              <a:buAutoNum type="arabicPeriod"/>
             </a:pPr>
+            <a:r>
+              <a:rPr lang="en-US" sz="1600" dirty="0">
+                <a:latin typeface="Times New Roman" panose="02020603050405020304" pitchFamily="18" charset="0"/>
+                <a:cs typeface="Times New Roman" panose="02020603050405020304" pitchFamily="18" charset="0"/>
+              </a:rPr>
+              <a:t>After the Fraud alert comes to the On-Call phone forward that email to yourself in Outlook</a:t>
+            </a:r>
             <a:r>
               <a:rPr lang="en-US" sz="1600" dirty="0" smtClean="0">
                 <a:latin typeface="Times New Roman" panose="02020603050405020304" pitchFamily="18" charset="0"/>
                 <a:cs typeface="Times New Roman" panose="02020603050405020304" pitchFamily="18" charset="0"/>
               </a:rPr>
-              <a:t>Next you will need to bring up the call logs of the extension that set off the Alert. </a:t>
-            </a:r>
-          </a:p>
-          <a:p>
-            <a:pPr>
-              <a:buFont typeface="Wingdings" panose="05000000000000000000" pitchFamily="2" charset="2"/>
-              <a:buChar char="Ø"/>
+              <a:t>.</a:t>
+            </a:r>
+            <a:endParaRPr lang="en-US" sz="1600" dirty="0">
+              <a:latin typeface="Times New Roman" panose="02020603050405020304" pitchFamily="18" charset="0"/>
+              <a:cs typeface="Times New Roman" panose="02020603050405020304" pitchFamily="18" charset="0"/>
+            </a:endParaRPr>
+          </a:p>
+          <a:p>
+            <a:pPr marL="342900" indent="-342900">
+              <a:buFont typeface="+mj-lt"/>
+              <a:buAutoNum type="arabicPeriod"/>
             </a:pPr>
+            <a:r>
+              <a:rPr lang="en-US" sz="1600" dirty="0">
+                <a:latin typeface="Times New Roman" panose="02020603050405020304" pitchFamily="18" charset="0"/>
+                <a:cs typeface="Times New Roman" panose="02020603050405020304" pitchFamily="18" charset="0"/>
+              </a:rPr>
+              <a:t>From Outlook “Reply All” (Potential Fraud &amp; CCare On-Call 1) with “Investigating”. Make sure your reply includes your Outlook signature</a:t>
+            </a:r>
             <a:r>
               <a:rPr lang="en-US" sz="1600" dirty="0" smtClean="0">
                 <a:latin typeface="Times New Roman" panose="02020603050405020304" pitchFamily="18" charset="0"/>
                 <a:cs typeface="Times New Roman" panose="02020603050405020304" pitchFamily="18" charset="0"/>
               </a:rPr>
-              <a:t>Search the call logs for the destination number or the terminated number.</a:t>
-            </a:r>
-          </a:p>
-          <a:p>
-            <a:pPr>
-              <a:buFont typeface="Wingdings" panose="05000000000000000000" pitchFamily="2" charset="2"/>
-              <a:buChar char="Ø"/>
+              <a:t>.</a:t>
+            </a:r>
+            <a:endParaRPr lang="en-US" sz="1600" dirty="0">
+              <a:latin typeface="Times New Roman" panose="02020603050405020304" pitchFamily="18" charset="0"/>
+              <a:cs typeface="Times New Roman" panose="02020603050405020304" pitchFamily="18" charset="0"/>
+            </a:endParaRPr>
+          </a:p>
+          <a:p>
+            <a:pPr marL="342900" indent="-342900">
+              <a:buFont typeface="+mj-lt"/>
+              <a:buAutoNum type="arabicPeriod"/>
             </a:pPr>
+            <a:r>
+              <a:rPr lang="en-US" sz="1600" dirty="0">
+                <a:latin typeface="Times New Roman" panose="02020603050405020304" pitchFamily="18" charset="0"/>
+                <a:cs typeface="Times New Roman" panose="02020603050405020304" pitchFamily="18" charset="0"/>
+              </a:rPr>
+              <a:t>Check the Account and see if a ticket was created in Salesforce if not create one. Insure you change case owner to On-Call and place your name in the Tier 2 Rep field</a:t>
+            </a:r>
             <a:r>
               <a:rPr lang="en-US" sz="1600" dirty="0" smtClean="0">
                 <a:latin typeface="Times New Roman" panose="02020603050405020304" pitchFamily="18" charset="0"/>
                 <a:cs typeface="Times New Roman" panose="02020603050405020304" pitchFamily="18" charset="0"/>
               </a:rPr>
-              <a:t>Pay close attention to the amount of times the same number was called and the duration of those calls. </a:t>
-            </a:r>
-          </a:p>
-        </p:txBody>
-      </p:sp>
-      <p:pic>
-        <p:nvPicPr>
-          <p:cNvPr id="6" name="Content Placeholder 5"/>
-          <p:cNvPicPr>
-            <a:picLocks noGrp="1" noChangeAspect="1"/>
-          </p:cNvPicPr>
-          <p:nvPr>
-            <p:ph sz="half" idx="2"/>
-          </p:nvPr>
-        </p:nvPicPr>
-        <p:blipFill>
-          <a:blip r:embed="rId2" cstate="print">
-            <a:extLst>
-              <a:ext uri="{BEBA8EAE-BF5A-486C-A8C5-ECC9F3942E4B}">
-                <a14:imgProps xmlns:a14="http://schemas.microsoft.com/office/drawing/2010/main">
-                  <a14:imgLayer r:embed="rId3">
-                    <a14:imgEffect>
-                      <a14:sharpenSoften amount="50000"/>
-                    </a14:imgEffect>
-                  </a14:imgLayer>
-                </a14:imgProps>
-              </a:ext>
-              <a:ext uri="{28A0092B-C50C-407E-A947-70E740481C1C}">
-                <a14:useLocalDpi xmlns:a14="http://schemas.microsoft.com/office/drawing/2010/main" val="0"/>
-              </a:ext>
-            </a:extLst>
-          </a:blip>
-          <a:stretch>
-            <a:fillRect/>
-          </a:stretch>
-        </p:blipFill>
-        <p:spPr>
-          <a:xfrm>
-            <a:off x="3886200" y="1447799"/>
-            <a:ext cx="4908550" cy="4856181"/>
-          </a:xfrm>
-        </p:spPr>
-      </p:pic>
-      <p:sp>
-        <p:nvSpPr>
-          <p:cNvPr id="5" name="Slide Number Placeholder 4"/>
+              <a:t>.</a:t>
+            </a:r>
+            <a:endParaRPr lang="en-US" sz="1600" dirty="0">
+              <a:latin typeface="Times New Roman" panose="02020603050405020304" pitchFamily="18" charset="0"/>
+              <a:cs typeface="Times New Roman" panose="02020603050405020304" pitchFamily="18" charset="0"/>
+            </a:endParaRPr>
+          </a:p>
+          <a:p>
+            <a:pPr marL="342900" indent="-342900">
+              <a:buFont typeface="+mj-lt"/>
+              <a:buAutoNum type="arabicPeriod"/>
+            </a:pPr>
+            <a:r>
+              <a:rPr lang="en-US" sz="1600" dirty="0">
+                <a:latin typeface="Times New Roman" panose="02020603050405020304" pitchFamily="18" charset="0"/>
+                <a:cs typeface="Times New Roman" panose="02020603050405020304" pitchFamily="18" charset="0"/>
+              </a:rPr>
+              <a:t>Copy the notes from the Alert and paste them into the Salesforce Description, be sure to include the type of Fraud Alert i.e.: Root, Domestic, Vonage, or Spending</a:t>
+            </a:r>
+            <a:r>
+              <a:rPr lang="en-US" sz="1600" dirty="0" smtClean="0">
+                <a:latin typeface="Times New Roman" panose="02020603050405020304" pitchFamily="18" charset="0"/>
+                <a:cs typeface="Times New Roman" panose="02020603050405020304" pitchFamily="18" charset="0"/>
+              </a:rPr>
+              <a:t>.</a:t>
+            </a:r>
+            <a:endParaRPr lang="en-US" sz="1600" dirty="0">
+              <a:latin typeface="Times New Roman" panose="02020603050405020304" pitchFamily="18" charset="0"/>
+              <a:cs typeface="Times New Roman" panose="02020603050405020304" pitchFamily="18" charset="0"/>
+            </a:endParaRPr>
+          </a:p>
+          <a:p>
+            <a:pPr marL="342900" indent="-342900">
+              <a:buFont typeface="+mj-lt"/>
+              <a:buAutoNum type="arabicPeriod"/>
+            </a:pPr>
+            <a:r>
+              <a:rPr lang="en-US" sz="1600" dirty="0">
+                <a:latin typeface="Times New Roman" panose="02020603050405020304" pitchFamily="18" charset="0"/>
+                <a:cs typeface="Times New Roman" panose="02020603050405020304" pitchFamily="18" charset="0"/>
+              </a:rPr>
+              <a:t>Thoroughly investigate the potential Fraud and make your determination whether it’s a False-Positive or Fraud</a:t>
+            </a:r>
+            <a:r>
+              <a:rPr lang="en-US" sz="1600" dirty="0" smtClean="0">
+                <a:latin typeface="Times New Roman" panose="02020603050405020304" pitchFamily="18" charset="0"/>
+                <a:cs typeface="Times New Roman" panose="02020603050405020304" pitchFamily="18" charset="0"/>
+              </a:rPr>
+              <a:t>.</a:t>
+            </a:r>
+            <a:endParaRPr lang="en-US" sz="1600" dirty="0">
+              <a:latin typeface="Times New Roman" panose="02020603050405020304" pitchFamily="18" charset="0"/>
+              <a:cs typeface="Times New Roman" panose="02020603050405020304" pitchFamily="18" charset="0"/>
+            </a:endParaRPr>
+          </a:p>
+          <a:p>
+            <a:pPr marL="342900" indent="-342900">
+              <a:buFont typeface="+mj-lt"/>
+              <a:buAutoNum type="arabicPeriod"/>
+            </a:pPr>
+            <a:r>
+              <a:rPr lang="en-US" sz="1600" dirty="0">
+                <a:latin typeface="Times New Roman" panose="02020603050405020304" pitchFamily="18" charset="0"/>
+                <a:cs typeface="Times New Roman" panose="02020603050405020304" pitchFamily="18" charset="0"/>
+              </a:rPr>
+              <a:t> From Outlook “Reply All” to the Alert with your investigation notes. (see examples below</a:t>
+            </a:r>
+            <a:r>
+              <a:rPr lang="en-US" sz="1600" dirty="0" smtClean="0">
+                <a:latin typeface="Times New Roman" panose="02020603050405020304" pitchFamily="18" charset="0"/>
+                <a:cs typeface="Times New Roman" panose="02020603050405020304" pitchFamily="18" charset="0"/>
+              </a:rPr>
+              <a:t>)</a:t>
+            </a:r>
+            <a:endParaRPr lang="en-US" sz="1600" dirty="0">
+              <a:latin typeface="Times New Roman" panose="02020603050405020304" pitchFamily="18" charset="0"/>
+              <a:cs typeface="Times New Roman" panose="02020603050405020304" pitchFamily="18" charset="0"/>
+            </a:endParaRPr>
+          </a:p>
+          <a:p>
+            <a:pPr marL="342900" indent="-342900">
+              <a:buFont typeface="+mj-lt"/>
+              <a:buAutoNum type="arabicPeriod"/>
+            </a:pPr>
+            <a:r>
+              <a:rPr lang="en-US" sz="1600" dirty="0">
+                <a:latin typeface="Times New Roman" panose="02020603050405020304" pitchFamily="18" charset="0"/>
+                <a:cs typeface="Times New Roman" panose="02020603050405020304" pitchFamily="18" charset="0"/>
+              </a:rPr>
+              <a:t>Update your salesforce ticket with your investigation notes in the “Log Call” section change Problem </a:t>
+            </a:r>
+            <a:r>
+              <a:rPr lang="en-US" sz="1600" dirty="0" smtClean="0">
+                <a:latin typeface="Times New Roman" panose="02020603050405020304" pitchFamily="18" charset="0"/>
+                <a:cs typeface="Times New Roman" panose="02020603050405020304" pitchFamily="18" charset="0"/>
+              </a:rPr>
+              <a:t>Code to “Fraud Alert” and Problem Code II to reflect </a:t>
+            </a:r>
+            <a:r>
+              <a:rPr lang="en-US" sz="1600" dirty="0">
+                <a:latin typeface="Times New Roman" panose="02020603050405020304" pitchFamily="18" charset="0"/>
+                <a:cs typeface="Times New Roman" panose="02020603050405020304" pitchFamily="18" charset="0"/>
+              </a:rPr>
+              <a:t>False-Positive or Fraud. Make sure case owner is set to On-Call and your name is in the Tier 2 Rep field or you will not be paid</a:t>
+            </a:r>
+            <a:r>
+              <a:rPr lang="en-US" sz="1600" dirty="0" smtClean="0">
+                <a:latin typeface="Times New Roman" panose="02020603050405020304" pitchFamily="18" charset="0"/>
+                <a:cs typeface="Times New Roman" panose="02020603050405020304" pitchFamily="18" charset="0"/>
+              </a:rPr>
+              <a:t>.</a:t>
+            </a:r>
+            <a:endParaRPr lang="en-US" sz="1600" dirty="0">
+              <a:latin typeface="Times New Roman" panose="02020603050405020304" pitchFamily="18" charset="0"/>
+              <a:cs typeface="Times New Roman" panose="02020603050405020304" pitchFamily="18" charset="0"/>
+            </a:endParaRPr>
+          </a:p>
+          <a:p>
+            <a:pPr marL="342900" indent="-342900">
+              <a:buFont typeface="+mj-lt"/>
+              <a:buAutoNum type="arabicPeriod"/>
+            </a:pPr>
+            <a:r>
+              <a:rPr lang="en-US" sz="1600" dirty="0">
+                <a:latin typeface="Times New Roman" panose="02020603050405020304" pitchFamily="18" charset="0"/>
+                <a:cs typeface="Times New Roman" panose="02020603050405020304" pitchFamily="18" charset="0"/>
+              </a:rPr>
+              <a:t>Close Ticket “Resolved</a:t>
+            </a:r>
+            <a:r>
+              <a:rPr lang="en-US" sz="1600" dirty="0" smtClean="0">
+                <a:latin typeface="Times New Roman" panose="02020603050405020304" pitchFamily="18" charset="0"/>
+                <a:cs typeface="Times New Roman" panose="02020603050405020304" pitchFamily="18" charset="0"/>
+              </a:rPr>
+              <a:t>”</a:t>
+            </a:r>
+            <a:endParaRPr lang="en-US" sz="1600" dirty="0">
+              <a:latin typeface="Times New Roman" panose="02020603050405020304" pitchFamily="18" charset="0"/>
+              <a:cs typeface="Times New Roman" panose="02020603050405020304" pitchFamily="18" charset="0"/>
+            </a:endParaRPr>
+          </a:p>
+          <a:p>
+            <a:pPr marL="342900" indent="-342900">
+              <a:buFont typeface="+mj-lt"/>
+              <a:buAutoNum type="arabicPeriod"/>
+            </a:pPr>
+            <a:r>
+              <a:rPr lang="en-US" sz="1600" dirty="0" smtClean="0">
+                <a:latin typeface="Times New Roman" panose="02020603050405020304" pitchFamily="18" charset="0"/>
+                <a:cs typeface="Times New Roman" panose="02020603050405020304" pitchFamily="18" charset="0"/>
+              </a:rPr>
+              <a:t>Send an </a:t>
+            </a:r>
+            <a:r>
+              <a:rPr lang="en-US" sz="1600" dirty="0">
+                <a:latin typeface="Times New Roman" panose="02020603050405020304" pitchFamily="18" charset="0"/>
+                <a:cs typeface="Times New Roman" panose="02020603050405020304" pitchFamily="18" charset="0"/>
+              </a:rPr>
+              <a:t>email to </a:t>
+            </a:r>
+            <a:r>
+              <a:rPr lang="en-US" sz="1600" dirty="0" smtClean="0">
+                <a:latin typeface="Times New Roman" panose="02020603050405020304" pitchFamily="18" charset="0"/>
+                <a:cs typeface="Times New Roman" panose="02020603050405020304" pitchFamily="18" charset="0"/>
+                <a:hlinkClick r:id="rId2"/>
+              </a:rPr>
+              <a:t>FraudandAbuseTeam-vb@vonage.com</a:t>
+            </a:r>
+            <a:r>
+              <a:rPr lang="en-US" sz="1600" dirty="0" smtClean="0">
+                <a:latin typeface="Times New Roman" panose="02020603050405020304" pitchFamily="18" charset="0"/>
+                <a:cs typeface="Times New Roman" panose="02020603050405020304" pitchFamily="18" charset="0"/>
+              </a:rPr>
+              <a:t> for </a:t>
+            </a:r>
+            <a:r>
+              <a:rPr lang="en-US" sz="1600" dirty="0">
+                <a:latin typeface="Times New Roman" panose="02020603050405020304" pitchFamily="18" charset="0"/>
+                <a:cs typeface="Times New Roman" panose="02020603050405020304" pitchFamily="18" charset="0"/>
+              </a:rPr>
+              <a:t>any actual Frauds </a:t>
+            </a:r>
+            <a:r>
+              <a:rPr lang="en-US" sz="1600" dirty="0" smtClean="0">
+                <a:latin typeface="Times New Roman" panose="02020603050405020304" pitchFamily="18" charset="0"/>
+                <a:cs typeface="Times New Roman" panose="02020603050405020304" pitchFamily="18" charset="0"/>
+              </a:rPr>
+              <a:t>at the </a:t>
+            </a:r>
+            <a:r>
+              <a:rPr lang="en-US" sz="1600" dirty="0">
+                <a:latin typeface="Times New Roman" panose="02020603050405020304" pitchFamily="18" charset="0"/>
+                <a:cs typeface="Times New Roman" panose="02020603050405020304" pitchFamily="18" charset="0"/>
+              </a:rPr>
+              <a:t>next day so the total charges can be calculated.</a:t>
+            </a:r>
+          </a:p>
+          <a:p>
+            <a:endParaRPr lang="en-US" dirty="0"/>
+          </a:p>
+        </p:txBody>
+      </p:sp>
+      <p:sp>
+        <p:nvSpPr>
+          <p:cNvPr id="4" name="Slide Number Placeholder 3"/>
           <p:cNvSpPr>
             <a:spLocks noGrp="1"/>
           </p:cNvSpPr>
@@ -16067,19 +16466,32 @@
           <a:bodyPr/>
           <a:lstStyle/>
           <a:p>
-            <a:fld id="{71BC9C40-ACDD-4696-8BAF-E1591320CFED}" type="slidenum">
-              <a:rPr lang="en-US" smtClean="0"/>
-              <a:pPr/>
+            <a:pPr>
+              <a:defRPr/>
+            </a:pPr>
+            <a:fld id="{16514749-0C09-4910-A1F5-A5A3B603506F}" type="slidenum">
+              <a:rPr lang="en-US" smtClean="0">
+                <a:solidFill>
+                  <a:srgbClr val="FFFFFF"/>
+                </a:solidFill>
+              </a:rPr>
+              <a:pPr>
+                <a:defRPr/>
+              </a:pPr>
               <a:t>6</a:t>
             </a:fld>
-            <a:endParaRPr lang="en-US"/>
+            <a:endParaRPr lang="en-US">
+              <a:solidFill>
+                <a:srgbClr val="FFFFFF"/>
+              </a:solidFill>
+            </a:endParaRPr>
           </a:p>
         </p:txBody>
       </p:sp>
     </p:spTree>
     <p:extLst>
       <p:ext uri="{BB962C8B-B14F-4D97-AF65-F5344CB8AC3E}">
-        <p14:creationId xmlns:p14="http://schemas.microsoft.com/office/powerpoint/2010/main" val="3065735914"/>
+        <p14:creationId xmlns:p14="http://schemas.microsoft.com/office/powerpoint/2010/main" val="3464281621"/>
       </p:ext>
     </p:extLst>
   </p:cSld>
@@ -16115,7 +16527,7 @@
       </p:grpSpPr>
       <p:sp>
         <p:nvSpPr>
-          <p:cNvPr id="2" name="Title 1"/>
+          <p:cNvPr id="6" name="Title 5"/>
           <p:cNvSpPr>
             <a:spLocks noGrp="1"/>
           </p:cNvSpPr>
@@ -16129,15 +16541,16 @@
           <a:lstStyle/>
           <a:p>
             <a:r>
-              <a:rPr lang="en-US" dirty="0"/>
-              <a:t>Investigation continued …</a:t>
-            </a:r>
-          </a:p>
-        </p:txBody>
-      </p:sp>
-      <p:sp>
-        <p:nvSpPr>
-          <p:cNvPr id="3" name="Content Placeholder 2"/>
+              <a:rPr lang="en-US" dirty="0" smtClean="0"/>
+              <a:t>Begin Your Investigation </a:t>
+            </a:r>
+            <a:endParaRPr lang="en-US" dirty="0"/>
+          </a:p>
+        </p:txBody>
+      </p:sp>
+      <p:sp>
+        <p:nvSpPr>
+          <p:cNvPr id="7" name="Content Placeholder 6"/>
           <p:cNvSpPr>
             <a:spLocks noGrp="1"/>
           </p:cNvSpPr>
@@ -16147,8 +16560,8 @@
         </p:nvSpPr>
         <p:spPr>
           <a:xfrm>
-            <a:off x="354013" y="1293813"/>
-            <a:ext cx="3151187" cy="4768850"/>
+            <a:off x="381001" y="1371600"/>
+            <a:ext cx="3505199" cy="4768850"/>
           </a:xfrm>
         </p:spPr>
         <p:txBody>
@@ -16160,11 +16573,8 @@
               <a:buChar char="Ø"/>
             </a:pPr>
             <a:r>
-              <a:rPr lang="en-US" sz="1600" dirty="0" smtClean="0">
-                <a:latin typeface="Times New Roman" panose="02020603050405020304" pitchFamily="18" charset="0"/>
-                <a:cs typeface="Times New Roman" panose="02020603050405020304" pitchFamily="18" charset="0"/>
-              </a:rPr>
-              <a:t>Your next step is to bring up the log analyzer for the last call</a:t>
+              <a:rPr lang="en-US" sz="1600" dirty="0" smtClean="0"/>
+              <a:t>You will begin you investigation by looking at the account registration page.</a:t>
             </a:r>
           </a:p>
           <a:p>
@@ -16173,11 +16583,8 @@
               <a:buChar char="Ø"/>
             </a:pPr>
             <a:r>
-              <a:rPr lang="en-US" sz="1600" dirty="0" smtClean="0">
-                <a:latin typeface="Times New Roman" panose="02020603050405020304" pitchFamily="18" charset="0"/>
-                <a:cs typeface="Times New Roman" panose="02020603050405020304" pitchFamily="18" charset="0"/>
-              </a:rPr>
-              <a:t> The Information you will need from here will be the Initiator User Agent which will tell you the device that place the calls, and the Initiator Address which will tell you from where the device was when the calls were placed</a:t>
+              <a:rPr lang="en-US" sz="1600" dirty="0" smtClean="0"/>
+              <a:t>From here you will want to check the IP addresses of any currently registering devices.</a:t>
             </a:r>
           </a:p>
           <a:p>
@@ -16186,22 +16593,16 @@
               <a:buChar char="Ø"/>
             </a:pPr>
             <a:r>
-              <a:rPr lang="en-US" sz="1600" dirty="0" smtClean="0">
-                <a:latin typeface="Times New Roman" panose="02020603050405020304" pitchFamily="18" charset="0"/>
-                <a:cs typeface="Times New Roman" panose="02020603050405020304" pitchFamily="18" charset="0"/>
-              </a:rPr>
-              <a:t>Make sure this information is copied and pasted as per the Fraud Template</a:t>
-            </a:r>
-            <a:endParaRPr lang="en-US" sz="1600" dirty="0">
-              <a:latin typeface="Times New Roman" panose="02020603050405020304" pitchFamily="18" charset="0"/>
-              <a:cs typeface="Times New Roman" panose="02020603050405020304" pitchFamily="18" charset="0"/>
-            </a:endParaRPr>
-          </a:p>
-        </p:txBody>
-      </p:sp>
-      <p:sp>
-        <p:nvSpPr>
-          <p:cNvPr id="5" name="Slide Number Placeholder 4"/>
+              <a:rPr lang="en-US" sz="1600" dirty="0" smtClean="0"/>
+              <a:t>You will also want to see if there are any devices registering with duplicate SIP IDs.</a:t>
+            </a:r>
+            <a:endParaRPr lang="en-US" sz="1600" dirty="0"/>
+          </a:p>
+        </p:txBody>
+      </p:sp>
+      <p:sp>
+        <p:nvSpPr>
+          <p:cNvPr id="4" name="Slide Number Placeholder 3"/>
           <p:cNvSpPr>
             <a:spLocks noGrp="1"/>
           </p:cNvSpPr>
@@ -16214,18 +16615,31 @@
           <a:bodyPr/>
           <a:lstStyle/>
           <a:p>
-            <a:fld id="{71BC9C40-ACDD-4696-8BAF-E1591320CFED}" type="slidenum">
-              <a:rPr lang="en-US" smtClean="0"/>
-              <a:pPr/>
+            <a:pPr>
+              <a:defRPr/>
+            </a:pPr>
+            <a:fld id="{D3208C8F-5341-4944-8C08-C55337151DB1}" type="slidenum">
+              <a:rPr lang="en-US" smtClean="0">
+                <a:solidFill>
+                  <a:srgbClr val="FFFFFF"/>
+                </a:solidFill>
+              </a:rPr>
+              <a:pPr>
+                <a:defRPr/>
+              </a:pPr>
               <a:t>7</a:t>
             </a:fld>
-            <a:endParaRPr lang="en-US"/>
+            <a:endParaRPr lang="en-US" dirty="0">
+              <a:solidFill>
+                <a:srgbClr val="FFFFFF"/>
+              </a:solidFill>
+            </a:endParaRPr>
           </a:p>
         </p:txBody>
       </p:sp>
       <p:pic>
         <p:nvPicPr>
-          <p:cNvPr id="8" name="Content Placeholder 7"/>
+          <p:cNvPr id="14" name="Content Placeholder 13"/>
           <p:cNvPicPr>
             <a:picLocks noGrp="1" noChangeAspect="1"/>
           </p:cNvPicPr>
@@ -16256,16 +16670,15 @@
         </p:blipFill>
         <p:spPr>
           <a:xfrm>
-            <a:off x="3657600" y="1447800"/>
-            <a:ext cx="5130538" cy="4876800"/>
+            <a:off x="3886200" y="1447800"/>
+            <a:ext cx="4908550" cy="4724399"/>
           </a:xfrm>
-          <a:noFill/>
         </p:spPr>
       </p:pic>
     </p:spTree>
     <p:extLst>
       <p:ext uri="{BB962C8B-B14F-4D97-AF65-F5344CB8AC3E}">
-        <p14:creationId xmlns:p14="http://schemas.microsoft.com/office/powerpoint/2010/main" val="2871853853"/>
+        <p14:creationId xmlns:p14="http://schemas.microsoft.com/office/powerpoint/2010/main" val="1031350540"/>
       </p:ext>
     </p:extLst>
   </p:cSld>
@@ -16315,15 +16728,16 @@
           <a:lstStyle/>
           <a:p>
             <a:r>
-              <a:rPr lang="en-US" dirty="0"/>
+              <a:rPr lang="en-US" dirty="0" smtClean="0"/>
               <a:t>Investigation continued …</a:t>
             </a:r>
-          </a:p>
-        </p:txBody>
-      </p:sp>
-      <p:sp>
-        <p:nvSpPr>
-          <p:cNvPr id="6" name="Content Placeholder 5"/>
+            <a:endParaRPr lang="en-US" dirty="0"/>
+          </a:p>
+        </p:txBody>
+      </p:sp>
+      <p:sp>
+        <p:nvSpPr>
+          <p:cNvPr id="3" name="Content Placeholder 2"/>
           <p:cNvSpPr>
             <a:spLocks noGrp="1"/>
           </p:cNvSpPr>
@@ -16331,7 +16745,12 @@
             <p:ph sz="half" idx="1"/>
           </p:nvPr>
         </p:nvSpPr>
-        <p:spPr/>
+        <p:spPr>
+          <a:xfrm>
+            <a:off x="354013" y="1293813"/>
+            <a:ext cx="3379787" cy="4768850"/>
+          </a:xfrm>
+        </p:spPr>
         <p:txBody>
           <a:bodyPr/>
           <a:lstStyle/>
@@ -16345,21 +16764,20 @@
                 <a:latin typeface="Times New Roman" panose="02020603050405020304" pitchFamily="18" charset="0"/>
                 <a:cs typeface="Times New Roman" panose="02020603050405020304" pitchFamily="18" charset="0"/>
               </a:rPr>
-              <a:t>Use a IP address look up tool (like infosniper.net) to look up the IP address of the </a:t>
-            </a:r>
-            <a:r>
-              <a:rPr lang="en-US" sz="1600" dirty="0">
-                <a:latin typeface="Times New Roman" panose="02020603050405020304" pitchFamily="18" charset="0"/>
-                <a:cs typeface="Times New Roman" panose="02020603050405020304" pitchFamily="18" charset="0"/>
-              </a:rPr>
-              <a:t>Initiator User </a:t>
-            </a:r>
+              <a:t>Next you will need to bring up the call logs of the extension that set off the Alert. </a:t>
+            </a:r>
+          </a:p>
+          <a:p>
+            <a:pPr>
+              <a:buFont typeface="Wingdings" panose="05000000000000000000" pitchFamily="2" charset="2"/>
+              <a:buChar char="Ø"/>
+            </a:pPr>
             <a:r>
               <a:rPr lang="en-US" sz="1600" dirty="0" smtClean="0">
                 <a:latin typeface="Times New Roman" panose="02020603050405020304" pitchFamily="18" charset="0"/>
                 <a:cs typeface="Times New Roman" panose="02020603050405020304" pitchFamily="18" charset="0"/>
               </a:rPr>
-              <a:t>Agent pay close attention to where these calls were place from. </a:t>
+              <a:t>Search the call logs for the destination number or the terminated number.</a:t>
             </a:r>
           </a:p>
           <a:p>
@@ -16367,78 +16785,24 @@
               <a:buFont typeface="Wingdings" panose="05000000000000000000" pitchFamily="2" charset="2"/>
               <a:buChar char="Ø"/>
             </a:pPr>
-            <a:endParaRPr lang="en-US" sz="1600" dirty="0" smtClean="0">
-              <a:latin typeface="Times New Roman" panose="02020603050405020304" pitchFamily="18" charset="0"/>
-              <a:cs typeface="Times New Roman" panose="02020603050405020304" pitchFamily="18" charset="0"/>
-            </a:endParaRPr>
-          </a:p>
-          <a:p>
-            <a:pPr>
-              <a:buFont typeface="Wingdings" panose="05000000000000000000" pitchFamily="2" charset="2"/>
-              <a:buChar char="Ø"/>
-            </a:pPr>
-            <a:endParaRPr lang="en-US" sz="1600" dirty="0">
-              <a:latin typeface="Times New Roman" panose="02020603050405020304" pitchFamily="18" charset="0"/>
-              <a:cs typeface="Times New Roman" panose="02020603050405020304" pitchFamily="18" charset="0"/>
-            </a:endParaRPr>
-          </a:p>
-          <a:p>
-            <a:pPr>
-              <a:buFont typeface="Wingdings" panose="05000000000000000000" pitchFamily="2" charset="2"/>
-              <a:buChar char="Ø"/>
-            </a:pPr>
-            <a:endParaRPr lang="en-US" sz="1600" dirty="0" smtClean="0">
-              <a:latin typeface="Times New Roman" panose="02020603050405020304" pitchFamily="18" charset="0"/>
-              <a:cs typeface="Times New Roman" panose="02020603050405020304" pitchFamily="18" charset="0"/>
-            </a:endParaRPr>
-          </a:p>
-          <a:p>
-            <a:pPr>
-              <a:buFont typeface="Wingdings" panose="05000000000000000000" pitchFamily="2" charset="2"/>
-              <a:buChar char="Ø"/>
-            </a:pPr>
-            <a:endParaRPr lang="en-US" sz="1600" dirty="0">
-              <a:latin typeface="Times New Roman" panose="02020603050405020304" pitchFamily="18" charset="0"/>
-              <a:cs typeface="Times New Roman" panose="02020603050405020304" pitchFamily="18" charset="0"/>
-            </a:endParaRPr>
-          </a:p>
-          <a:p>
-            <a:pPr>
-              <a:buFont typeface="Wingdings" panose="05000000000000000000" pitchFamily="2" charset="2"/>
-              <a:buChar char="Ø"/>
-            </a:pPr>
             <a:r>
               <a:rPr lang="en-US" sz="1600" dirty="0" smtClean="0">
                 <a:latin typeface="Times New Roman" panose="02020603050405020304" pitchFamily="18" charset="0"/>
                 <a:cs typeface="Times New Roman" panose="02020603050405020304" pitchFamily="18" charset="0"/>
               </a:rPr>
-              <a:t>You will also want to run an MTR to the </a:t>
-            </a:r>
-            <a:r>
-              <a:rPr lang="en-US" sz="1600" dirty="0">
-                <a:latin typeface="Times New Roman" panose="02020603050405020304" pitchFamily="18" charset="0"/>
-                <a:cs typeface="Times New Roman" panose="02020603050405020304" pitchFamily="18" charset="0"/>
-              </a:rPr>
-              <a:t>Initiator User </a:t>
-            </a:r>
-            <a:r>
-              <a:rPr lang="en-US" sz="1600" dirty="0" smtClean="0">
-                <a:latin typeface="Times New Roman" panose="02020603050405020304" pitchFamily="18" charset="0"/>
-                <a:cs typeface="Times New Roman" panose="02020603050405020304" pitchFamily="18" charset="0"/>
-              </a:rPr>
-              <a:t>Agent IP address . Look for any signs of High latency, Jitter, or Packet Loss.</a:t>
+              <a:t>Pay close attention to the amount of times the same number was called and the duration of those calls. </a:t>
             </a:r>
           </a:p>
         </p:txBody>
       </p:sp>
       <p:pic>
         <p:nvPicPr>
-          <p:cNvPr id="9" name="Content Placeholder 8"/>
+          <p:cNvPr id="6" name="Content Placeholder 5"/>
           <p:cNvPicPr>
             <a:picLocks noGrp="1" noChangeAspect="1"/>
           </p:cNvPicPr>
           <p:nvPr>
-            <p:ph sz="quarter" idx="2"/>
+            <p:ph sz="half" idx="2"/>
           </p:nvPr>
         </p:nvPicPr>
         <p:blipFill>
@@ -16448,7 +16812,7 @@
                 <a14:imgProps xmlns:a14="http://schemas.microsoft.com/office/drawing/2010/main">
                   <a14:imgLayer r:embed="rId3">
                     <a14:imgEffect>
-                      <a14:sharpenSoften amount="25000"/>
+                      <a14:sharpenSoften amount="50000"/>
                     </a14:imgEffect>
                   </a14:imgLayer>
                 </a14:imgProps>
@@ -16464,46 +16828,8 @@
         </p:blipFill>
         <p:spPr>
           <a:xfrm>
-            <a:off x="4495800" y="1293813"/>
-            <a:ext cx="4495800" cy="2308225"/>
-          </a:xfrm>
-        </p:spPr>
-      </p:pic>
-      <p:pic>
-        <p:nvPicPr>
-          <p:cNvPr id="10" name="Content Placeholder 9"/>
-          <p:cNvPicPr>
-            <a:picLocks noGrp="1" noChangeAspect="1"/>
-          </p:cNvPicPr>
-          <p:nvPr>
-            <p:ph sz="quarter" idx="3"/>
-          </p:nvPr>
-        </p:nvPicPr>
-        <p:blipFill>
-          <a:blip r:embed="rId4" cstate="print">
-            <a:extLst>
-              <a:ext uri="{BEBA8EAE-BF5A-486C-A8C5-ECC9F3942E4B}">
-                <a14:imgProps xmlns:a14="http://schemas.microsoft.com/office/drawing/2010/main">
-                  <a14:imgLayer r:embed="rId5">
-                    <a14:imgEffect>
-                      <a14:sharpenSoften amount="25000"/>
-                    </a14:imgEffect>
-                  </a14:imgLayer>
-                </a14:imgProps>
-              </a:ext>
-              <a:ext uri="{28A0092B-C50C-407E-A947-70E740481C1C}">
-                <a14:useLocalDpi xmlns:a14="http://schemas.microsoft.com/office/drawing/2010/main" val="0"/>
-              </a:ext>
-            </a:extLst>
-          </a:blip>
-          <a:stretch>
-            <a:fillRect/>
-          </a:stretch>
-        </p:blipFill>
-        <p:spPr>
-          <a:xfrm>
-            <a:off x="4495800" y="3789635"/>
-            <a:ext cx="4543108" cy="2555328"/>
+            <a:off x="3886200" y="1447799"/>
+            <a:ext cx="4908550" cy="4856181"/>
           </a:xfrm>
         </p:spPr>
       </p:pic>
@@ -16534,7 +16860,7 @@
     </p:spTree>
     <p:extLst>
       <p:ext uri="{BB962C8B-B14F-4D97-AF65-F5344CB8AC3E}">
-        <p14:creationId xmlns:p14="http://schemas.microsoft.com/office/powerpoint/2010/main" val="4049503898"/>
+        <p14:creationId xmlns:p14="http://schemas.microsoft.com/office/powerpoint/2010/main" val="3065735914"/>
       </p:ext>
     </p:extLst>
   </p:cSld>
@@ -16570,7 +16896,7 @@
       </p:grpSpPr>
       <p:sp>
         <p:nvSpPr>
-          <p:cNvPr id="7" name="Title 6"/>
+          <p:cNvPr id="2" name="Title 1"/>
           <p:cNvSpPr>
             <a:spLocks noGrp="1"/>
           </p:cNvSpPr>
@@ -16592,15 +16918,20 @@
       </p:sp>
       <p:sp>
         <p:nvSpPr>
-          <p:cNvPr id="8" name="Content Placeholder 7"/>
+          <p:cNvPr id="3" name="Content Placeholder 2"/>
           <p:cNvSpPr>
             <a:spLocks noGrp="1"/>
           </p:cNvSpPr>
           <p:nvPr>
-            <p:ph idx="1"/>
-          </p:nvPr>
-        </p:nvSpPr>
-        <p:spPr/>
+            <p:ph sz="half" idx="1"/>
+          </p:nvPr>
+        </p:nvSpPr>
+        <p:spPr>
+          <a:xfrm>
+            <a:off x="354013" y="1293813"/>
+            <a:ext cx="3151187" cy="4768850"/>
+          </a:xfrm>
+        </p:spPr>
         <p:txBody>
           <a:bodyPr/>
           <a:lstStyle/>
@@ -16610,11 +16941,11 @@
               <a:buChar char="Ø"/>
             </a:pPr>
             <a:r>
-              <a:rPr lang="en-US" sz="1800" dirty="0" smtClean="0">
+              <a:rPr lang="en-US" sz="1600" dirty="0" smtClean="0">
                 <a:latin typeface="Times New Roman" panose="02020603050405020304" pitchFamily="18" charset="0"/>
                 <a:cs typeface="Times New Roman" panose="02020603050405020304" pitchFamily="18" charset="0"/>
               </a:rPr>
-              <a:t>You will now want to look at the call logs again. This time look at calls made at least 2 weeks back from the same extension. </a:t>
+              <a:t>Your next step is to bring up the log analyzer for the last call</a:t>
             </a:r>
           </a:p>
           <a:p>
@@ -16623,16 +16954,12 @@
               <a:buChar char="Ø"/>
             </a:pPr>
             <a:r>
-              <a:rPr lang="en-US" sz="1800" dirty="0" smtClean="0">
+              <a:rPr lang="en-US" sz="1600" dirty="0" smtClean="0">
                 <a:latin typeface="Times New Roman" panose="02020603050405020304" pitchFamily="18" charset="0"/>
                 <a:cs typeface="Times New Roman" panose="02020603050405020304" pitchFamily="18" charset="0"/>
               </a:rPr>
-              <a:t>You will once again bring up the Log Analyzer from one of these earlier calls. </a:t>
-            </a:r>
-            <a:endParaRPr lang="en-US" sz="1800" dirty="0">
-              <a:latin typeface="Times New Roman" panose="02020603050405020304" pitchFamily="18" charset="0"/>
-              <a:cs typeface="Times New Roman" panose="02020603050405020304" pitchFamily="18" charset="0"/>
-            </a:endParaRPr>
+              <a:t> The Information you will need from here will be the Initiator User Agent which will tell you the device that place the calls, and the Initiator Address which will tell you from where the device was when the calls were placed</a:t>
+            </a:r>
           </a:p>
           <a:p>
             <a:pPr>
@@ -16640,52 +16967,13 @@
               <a:buChar char="Ø"/>
             </a:pPr>
             <a:r>
-              <a:rPr lang="en-US" sz="1800" dirty="0" smtClean="0">
+              <a:rPr lang="en-US" sz="1600" dirty="0" smtClean="0">
                 <a:latin typeface="Times New Roman" panose="02020603050405020304" pitchFamily="18" charset="0"/>
                 <a:cs typeface="Times New Roman" panose="02020603050405020304" pitchFamily="18" charset="0"/>
               </a:rPr>
-              <a:t>Compare the information here to the information from the Log Analyzer that set off the Alert. </a:t>
-            </a:r>
-          </a:p>
-          <a:p>
-            <a:pPr>
-              <a:buFont typeface="Wingdings" panose="05000000000000000000" pitchFamily="2" charset="2"/>
-              <a:buChar char="Ø"/>
-            </a:pPr>
-            <a:r>
-              <a:rPr lang="en-US" sz="1800" dirty="0" smtClean="0">
-                <a:latin typeface="Times New Roman" panose="02020603050405020304" pitchFamily="18" charset="0"/>
-                <a:cs typeface="Times New Roman" panose="02020603050405020304" pitchFamily="18" charset="0"/>
-              </a:rPr>
-              <a:t>Check to see if these calls were from a different device, at a different IP address. </a:t>
-            </a:r>
-          </a:p>
-          <a:p>
-            <a:pPr>
-              <a:buFont typeface="Wingdings" panose="05000000000000000000" pitchFamily="2" charset="2"/>
-              <a:buChar char="Ø"/>
-            </a:pPr>
-            <a:r>
-              <a:rPr lang="en-US" sz="1800" dirty="0" smtClean="0">
-                <a:latin typeface="Times New Roman" panose="02020603050405020304" pitchFamily="18" charset="0"/>
-                <a:cs typeface="Times New Roman" panose="02020603050405020304" pitchFamily="18" charset="0"/>
-              </a:rPr>
-              <a:t>If the Device and IP address are the same and there was high latency, jitter, or  packet loss this more than likely is a False Positive Alert.</a:t>
-            </a:r>
-          </a:p>
-          <a:p>
-            <a:pPr>
-              <a:buFont typeface="Wingdings" panose="05000000000000000000" pitchFamily="2" charset="2"/>
-              <a:buChar char="Ø"/>
-            </a:pPr>
-            <a:r>
-              <a:rPr lang="en-US" sz="1800" dirty="0" smtClean="0">
-                <a:latin typeface="Times New Roman" panose="02020603050405020304" pitchFamily="18" charset="0"/>
-                <a:cs typeface="Times New Roman" panose="02020603050405020304" pitchFamily="18" charset="0"/>
-              </a:rPr>
-              <a:t>If the Device is different and the location of the IP addresses are far and seem to be suspicious then this could potentially be a Fraud.  </a:t>
-            </a:r>
-            <a:endParaRPr lang="en-US" sz="1800" dirty="0">
+              <a:t>Make sure this information is copied and pasted as per the Fraud Template</a:t>
+            </a:r>
+            <a:endParaRPr lang="en-US" sz="1600" dirty="0">
               <a:latin typeface="Times New Roman" panose="02020603050405020304" pitchFamily="18" charset="0"/>
               <a:cs typeface="Times New Roman" panose="02020603050405020304" pitchFamily="18" charset="0"/>
             </a:endParaRPr>
@@ -16694,7 +16982,7 @@
       </p:sp>
       <p:sp>
         <p:nvSpPr>
-          <p:cNvPr id="6" name="Slide Number Placeholder 5"/>
+          <p:cNvPr id="5" name="Slide Number Placeholder 4"/>
           <p:cNvSpPr>
             <a:spLocks noGrp="1"/>
           </p:cNvSpPr>
@@ -16707,7 +16995,7 @@
           <a:bodyPr/>
           <a:lstStyle/>
           <a:p>
-            <a:fld id="{51062DCB-C440-495D-8BB3-6798C4B87E5E}" type="slidenum">
+            <a:fld id="{71BC9C40-ACDD-4696-8BAF-E1591320CFED}" type="slidenum">
               <a:rPr lang="en-US" smtClean="0"/>
               <a:pPr/>
               <a:t>9</a:t>
@@ -16716,10 +17004,49 @@
           </a:p>
         </p:txBody>
       </p:sp>
+      <p:pic>
+        <p:nvPicPr>
+          <p:cNvPr id="8" name="Content Placeholder 7"/>
+          <p:cNvPicPr>
+            <a:picLocks noGrp="1" noChangeAspect="1"/>
+          </p:cNvPicPr>
+          <p:nvPr>
+            <p:ph sz="half" idx="2"/>
+          </p:nvPr>
+        </p:nvPicPr>
+        <p:blipFill>
+          <a:blip r:embed="rId2" cstate="print">
+            <a:extLst>
+              <a:ext uri="{BEBA8EAE-BF5A-486C-A8C5-ECC9F3942E4B}">
+                <a14:imgProps xmlns:a14="http://schemas.microsoft.com/office/drawing/2010/main">
+                  <a14:imgLayer r:embed="rId3">
+                    <a14:imgEffect>
+                      <a14:sharpenSoften amount="50000"/>
+                    </a14:imgEffect>
+                  </a14:imgLayer>
+                </a14:imgProps>
+              </a:ext>
+              <a:ext uri="{28A0092B-C50C-407E-A947-70E740481C1C}">
+                <a14:useLocalDpi xmlns:a14="http://schemas.microsoft.com/office/drawing/2010/main" val="0"/>
+              </a:ext>
+            </a:extLst>
+          </a:blip>
+          <a:stretch>
+            <a:fillRect/>
+          </a:stretch>
+        </p:blipFill>
+        <p:spPr>
+          <a:xfrm>
+            <a:off x="3657600" y="1447800"/>
+            <a:ext cx="5130538" cy="4876800"/>
+          </a:xfrm>
+          <a:noFill/>
+        </p:spPr>
+      </p:pic>
     </p:spTree>
     <p:extLst>
       <p:ext uri="{BB962C8B-B14F-4D97-AF65-F5344CB8AC3E}">
-        <p14:creationId xmlns:p14="http://schemas.microsoft.com/office/powerpoint/2010/main" val="2860348354"/>
+        <p14:creationId xmlns:p14="http://schemas.microsoft.com/office/powerpoint/2010/main" val="2871853853"/>
       </p:ext>
     </p:extLst>
   </p:cSld>

</xml_diff>

<commit_message>
worked on types of fraud
</commit_message>
<xml_diff>
--- a/On-CallFraudProcedures.pptx
+++ b/On-CallFraudProcedures.pptx
@@ -8,7 +8,7 @@
     <p:sldMasterId id="2147483703" r:id="rId4"/>
   </p:sldMasterIdLst>
   <p:notesMasterIdLst>
-    <p:notesMasterId r:id="rId17"/>
+    <p:notesMasterId r:id="rId19"/>
   </p:notesMasterIdLst>
   <p:sldIdLst>
     <p:sldId id="275" r:id="rId5"/>
@@ -16,18 +16,20 @@
     <p:sldId id="287" r:id="rId7"/>
     <p:sldId id="294" r:id="rId8"/>
     <p:sldId id="295" r:id="rId9"/>
-    <p:sldId id="285" r:id="rId10"/>
-    <p:sldId id="288" r:id="rId11"/>
-    <p:sldId id="289" r:id="rId12"/>
-    <p:sldId id="290" r:id="rId13"/>
-    <p:sldId id="291" r:id="rId14"/>
-    <p:sldId id="292" r:id="rId15"/>
-    <p:sldId id="293" r:id="rId16"/>
+    <p:sldId id="296" r:id="rId10"/>
+    <p:sldId id="297" r:id="rId11"/>
+    <p:sldId id="285" r:id="rId12"/>
+    <p:sldId id="288" r:id="rId13"/>
+    <p:sldId id="289" r:id="rId14"/>
+    <p:sldId id="290" r:id="rId15"/>
+    <p:sldId id="291" r:id="rId16"/>
+    <p:sldId id="292" r:id="rId17"/>
+    <p:sldId id="293" r:id="rId18"/>
   </p:sldIdLst>
   <p:sldSz cx="9144000" cy="6858000" type="screen4x3"/>
   <p:notesSz cx="7010400" cy="9296400"/>
   <p:custDataLst>
-    <p:tags r:id="rId18"/>
+    <p:tags r:id="rId20"/>
   </p:custDataLst>
   <p:defaultTextStyle>
     <a:defPPr>
@@ -14767,15 +14769,16 @@
           <a:lstStyle/>
           <a:p>
             <a:r>
-              <a:rPr lang="en-US" dirty="0"/>
+              <a:rPr lang="en-US" dirty="0" smtClean="0"/>
               <a:t>Investigation continued …</a:t>
             </a:r>
-          </a:p>
-        </p:txBody>
-      </p:sp>
-      <p:sp>
-        <p:nvSpPr>
-          <p:cNvPr id="6" name="Content Placeholder 5"/>
+            <a:endParaRPr lang="en-US" dirty="0"/>
+          </a:p>
+        </p:txBody>
+      </p:sp>
+      <p:sp>
+        <p:nvSpPr>
+          <p:cNvPr id="3" name="Content Placeholder 2"/>
           <p:cNvSpPr>
             <a:spLocks noGrp="1"/>
           </p:cNvSpPr>
@@ -14783,7 +14786,12 @@
             <p:ph sz="half" idx="1"/>
           </p:nvPr>
         </p:nvSpPr>
-        <p:spPr/>
+        <p:spPr>
+          <a:xfrm>
+            <a:off x="354013" y="1293813"/>
+            <a:ext cx="3379787" cy="4768850"/>
+          </a:xfrm>
+        </p:spPr>
         <p:txBody>
           <a:bodyPr/>
           <a:lstStyle/>
@@ -14797,21 +14805,20 @@
                 <a:latin typeface="Times New Roman" panose="02020603050405020304" pitchFamily="18" charset="0"/>
                 <a:cs typeface="Times New Roman" panose="02020603050405020304" pitchFamily="18" charset="0"/>
               </a:rPr>
-              <a:t>Use a IP address look up tool (like infosniper.net) to look up the IP address of the </a:t>
-            </a:r>
-            <a:r>
-              <a:rPr lang="en-US" sz="1600" dirty="0">
-                <a:latin typeface="Times New Roman" panose="02020603050405020304" pitchFamily="18" charset="0"/>
-                <a:cs typeface="Times New Roman" panose="02020603050405020304" pitchFamily="18" charset="0"/>
-              </a:rPr>
-              <a:t>Initiator User </a:t>
-            </a:r>
+              <a:t>Next you will need to bring up the call logs of the extension that set off the Alert. </a:t>
+            </a:r>
+          </a:p>
+          <a:p>
+            <a:pPr>
+              <a:buFont typeface="Wingdings" panose="05000000000000000000" pitchFamily="2" charset="2"/>
+              <a:buChar char="Ø"/>
+            </a:pPr>
             <a:r>
               <a:rPr lang="en-US" sz="1600" dirty="0" smtClean="0">
                 <a:latin typeface="Times New Roman" panose="02020603050405020304" pitchFamily="18" charset="0"/>
                 <a:cs typeface="Times New Roman" panose="02020603050405020304" pitchFamily="18" charset="0"/>
               </a:rPr>
-              <a:t>Agent pay close attention to where these calls were place from. </a:t>
+              <a:t>Search the call logs for the destination number or the terminated number.</a:t>
             </a:r>
           </a:p>
           <a:p>
@@ -14819,78 +14826,24 @@
               <a:buFont typeface="Wingdings" panose="05000000000000000000" pitchFamily="2" charset="2"/>
               <a:buChar char="Ø"/>
             </a:pPr>
-            <a:endParaRPr lang="en-US" sz="1600" dirty="0" smtClean="0">
-              <a:latin typeface="Times New Roman" panose="02020603050405020304" pitchFamily="18" charset="0"/>
-              <a:cs typeface="Times New Roman" panose="02020603050405020304" pitchFamily="18" charset="0"/>
-            </a:endParaRPr>
-          </a:p>
-          <a:p>
-            <a:pPr>
-              <a:buFont typeface="Wingdings" panose="05000000000000000000" pitchFamily="2" charset="2"/>
-              <a:buChar char="Ø"/>
-            </a:pPr>
-            <a:endParaRPr lang="en-US" sz="1600" dirty="0">
-              <a:latin typeface="Times New Roman" panose="02020603050405020304" pitchFamily="18" charset="0"/>
-              <a:cs typeface="Times New Roman" panose="02020603050405020304" pitchFamily="18" charset="0"/>
-            </a:endParaRPr>
-          </a:p>
-          <a:p>
-            <a:pPr>
-              <a:buFont typeface="Wingdings" panose="05000000000000000000" pitchFamily="2" charset="2"/>
-              <a:buChar char="Ø"/>
-            </a:pPr>
-            <a:endParaRPr lang="en-US" sz="1600" dirty="0" smtClean="0">
-              <a:latin typeface="Times New Roman" panose="02020603050405020304" pitchFamily="18" charset="0"/>
-              <a:cs typeface="Times New Roman" panose="02020603050405020304" pitchFamily="18" charset="0"/>
-            </a:endParaRPr>
-          </a:p>
-          <a:p>
-            <a:pPr>
-              <a:buFont typeface="Wingdings" panose="05000000000000000000" pitchFamily="2" charset="2"/>
-              <a:buChar char="Ø"/>
-            </a:pPr>
-            <a:endParaRPr lang="en-US" sz="1600" dirty="0">
-              <a:latin typeface="Times New Roman" panose="02020603050405020304" pitchFamily="18" charset="0"/>
-              <a:cs typeface="Times New Roman" panose="02020603050405020304" pitchFamily="18" charset="0"/>
-            </a:endParaRPr>
-          </a:p>
-          <a:p>
-            <a:pPr>
-              <a:buFont typeface="Wingdings" panose="05000000000000000000" pitchFamily="2" charset="2"/>
-              <a:buChar char="Ø"/>
-            </a:pPr>
             <a:r>
               <a:rPr lang="en-US" sz="1600" dirty="0" smtClean="0">
                 <a:latin typeface="Times New Roman" panose="02020603050405020304" pitchFamily="18" charset="0"/>
                 <a:cs typeface="Times New Roman" panose="02020603050405020304" pitchFamily="18" charset="0"/>
               </a:rPr>
-              <a:t>You will also want to run an MTR to the </a:t>
-            </a:r>
-            <a:r>
-              <a:rPr lang="en-US" sz="1600" dirty="0">
-                <a:latin typeface="Times New Roman" panose="02020603050405020304" pitchFamily="18" charset="0"/>
-                <a:cs typeface="Times New Roman" panose="02020603050405020304" pitchFamily="18" charset="0"/>
-              </a:rPr>
-              <a:t>Initiator User </a:t>
-            </a:r>
-            <a:r>
-              <a:rPr lang="en-US" sz="1600" dirty="0" smtClean="0">
-                <a:latin typeface="Times New Roman" panose="02020603050405020304" pitchFamily="18" charset="0"/>
-                <a:cs typeface="Times New Roman" panose="02020603050405020304" pitchFamily="18" charset="0"/>
-              </a:rPr>
-              <a:t>Agent IP address . Look for any signs of High latency, Jitter, or Packet Loss.</a:t>
+              <a:t>Pay close attention to the amount of times the same number was called and the duration of those calls. </a:t>
             </a:r>
           </a:p>
         </p:txBody>
       </p:sp>
       <p:pic>
         <p:nvPicPr>
-          <p:cNvPr id="9" name="Content Placeholder 8"/>
+          <p:cNvPr id="6" name="Content Placeholder 5"/>
           <p:cNvPicPr>
             <a:picLocks noGrp="1" noChangeAspect="1"/>
           </p:cNvPicPr>
           <p:nvPr>
-            <p:ph sz="quarter" idx="2"/>
+            <p:ph sz="half" idx="2"/>
           </p:nvPr>
         </p:nvPicPr>
         <p:blipFill>
@@ -14900,7 +14853,7 @@
                 <a14:imgProps xmlns:a14="http://schemas.microsoft.com/office/drawing/2010/main">
                   <a14:imgLayer r:embed="rId3">
                     <a14:imgEffect>
-                      <a14:sharpenSoften amount="25000"/>
+                      <a14:sharpenSoften amount="50000"/>
                     </a14:imgEffect>
                   </a14:imgLayer>
                 </a14:imgProps>
@@ -14916,46 +14869,8 @@
         </p:blipFill>
         <p:spPr>
           <a:xfrm>
-            <a:off x="4495800" y="1293813"/>
-            <a:ext cx="4495800" cy="2308225"/>
-          </a:xfrm>
-        </p:spPr>
-      </p:pic>
-      <p:pic>
-        <p:nvPicPr>
-          <p:cNvPr id="10" name="Content Placeholder 9"/>
-          <p:cNvPicPr>
-            <a:picLocks noGrp="1" noChangeAspect="1"/>
-          </p:cNvPicPr>
-          <p:nvPr>
-            <p:ph sz="quarter" idx="3"/>
-          </p:nvPr>
-        </p:nvPicPr>
-        <p:blipFill>
-          <a:blip r:embed="rId4" cstate="print">
-            <a:extLst>
-              <a:ext uri="{BEBA8EAE-BF5A-486C-A8C5-ECC9F3942E4B}">
-                <a14:imgProps xmlns:a14="http://schemas.microsoft.com/office/drawing/2010/main">
-                  <a14:imgLayer r:embed="rId5">
-                    <a14:imgEffect>
-                      <a14:sharpenSoften amount="25000"/>
-                    </a14:imgEffect>
-                  </a14:imgLayer>
-                </a14:imgProps>
-              </a:ext>
-              <a:ext uri="{28A0092B-C50C-407E-A947-70E740481C1C}">
-                <a14:useLocalDpi xmlns:a14="http://schemas.microsoft.com/office/drawing/2010/main" val="0"/>
-              </a:ext>
-            </a:extLst>
-          </a:blip>
-          <a:stretch>
-            <a:fillRect/>
-          </a:stretch>
-        </p:blipFill>
-        <p:spPr>
-          <a:xfrm>
-            <a:off x="4495800" y="3789635"/>
-            <a:ext cx="4543108" cy="2555328"/>
+            <a:off x="3886200" y="1447799"/>
+            <a:ext cx="4908550" cy="4856181"/>
           </a:xfrm>
         </p:spPr>
       </p:pic>
@@ -14986,7 +14901,7 @@
     </p:spTree>
     <p:extLst>
       <p:ext uri="{BB962C8B-B14F-4D97-AF65-F5344CB8AC3E}">
-        <p14:creationId xmlns:p14="http://schemas.microsoft.com/office/powerpoint/2010/main" val="4049503898"/>
+        <p14:creationId xmlns:p14="http://schemas.microsoft.com/office/powerpoint/2010/main" val="3065735914"/>
       </p:ext>
     </p:extLst>
   </p:cSld>
@@ -15022,7 +14937,7 @@
       </p:grpSpPr>
       <p:sp>
         <p:nvSpPr>
-          <p:cNvPr id="7" name="Title 6"/>
+          <p:cNvPr id="2" name="Title 1"/>
           <p:cNvSpPr>
             <a:spLocks noGrp="1"/>
           </p:cNvSpPr>
@@ -15044,15 +14959,20 @@
       </p:sp>
       <p:sp>
         <p:nvSpPr>
-          <p:cNvPr id="8" name="Content Placeholder 7"/>
+          <p:cNvPr id="3" name="Content Placeholder 2"/>
           <p:cNvSpPr>
             <a:spLocks noGrp="1"/>
           </p:cNvSpPr>
           <p:nvPr>
-            <p:ph idx="1"/>
-          </p:nvPr>
-        </p:nvSpPr>
-        <p:spPr/>
+            <p:ph sz="half" idx="1"/>
+          </p:nvPr>
+        </p:nvSpPr>
+        <p:spPr>
+          <a:xfrm>
+            <a:off x="354013" y="1293813"/>
+            <a:ext cx="3151187" cy="4768850"/>
+          </a:xfrm>
+        </p:spPr>
         <p:txBody>
           <a:bodyPr/>
           <a:lstStyle/>
@@ -15062,11 +14982,11 @@
               <a:buChar char="Ø"/>
             </a:pPr>
             <a:r>
-              <a:rPr lang="en-US" sz="1800" dirty="0" smtClean="0">
+              <a:rPr lang="en-US" sz="1600" dirty="0" smtClean="0">
                 <a:latin typeface="Times New Roman" panose="02020603050405020304" pitchFamily="18" charset="0"/>
                 <a:cs typeface="Times New Roman" panose="02020603050405020304" pitchFamily="18" charset="0"/>
               </a:rPr>
-              <a:t>You will now want to look at the call logs again. This time look at calls made at least 2 weeks back from the same extension. </a:t>
+              <a:t>Your next step is to bring up the log analyzer for the last call</a:t>
             </a:r>
           </a:p>
           <a:p>
@@ -15075,16 +14995,12 @@
               <a:buChar char="Ø"/>
             </a:pPr>
             <a:r>
-              <a:rPr lang="en-US" sz="1800" dirty="0" smtClean="0">
+              <a:rPr lang="en-US" sz="1600" dirty="0" smtClean="0">
                 <a:latin typeface="Times New Roman" panose="02020603050405020304" pitchFamily="18" charset="0"/>
                 <a:cs typeface="Times New Roman" panose="02020603050405020304" pitchFamily="18" charset="0"/>
               </a:rPr>
-              <a:t>You will once again bring up the Log Analyzer from one of these earlier calls. </a:t>
-            </a:r>
-            <a:endParaRPr lang="en-US" sz="1800" dirty="0">
-              <a:latin typeface="Times New Roman" panose="02020603050405020304" pitchFamily="18" charset="0"/>
-              <a:cs typeface="Times New Roman" panose="02020603050405020304" pitchFamily="18" charset="0"/>
-            </a:endParaRPr>
+              <a:t> The Information you will need from here will be the Initiator User Agent which will tell you the device that place the calls, and the Initiator Address which will tell you from where the device was when the calls were placed</a:t>
+            </a:r>
           </a:p>
           <a:p>
             <a:pPr>
@@ -15092,52 +15008,13 @@
               <a:buChar char="Ø"/>
             </a:pPr>
             <a:r>
-              <a:rPr lang="en-US" sz="1800" dirty="0" smtClean="0">
+              <a:rPr lang="en-US" sz="1600" dirty="0" smtClean="0">
                 <a:latin typeface="Times New Roman" panose="02020603050405020304" pitchFamily="18" charset="0"/>
                 <a:cs typeface="Times New Roman" panose="02020603050405020304" pitchFamily="18" charset="0"/>
               </a:rPr>
-              <a:t>Compare the information here to the information from the Log Analyzer that set off the Alert. </a:t>
-            </a:r>
-          </a:p>
-          <a:p>
-            <a:pPr>
-              <a:buFont typeface="Wingdings" panose="05000000000000000000" pitchFamily="2" charset="2"/>
-              <a:buChar char="Ø"/>
-            </a:pPr>
-            <a:r>
-              <a:rPr lang="en-US" sz="1800" dirty="0" smtClean="0">
-                <a:latin typeface="Times New Roman" panose="02020603050405020304" pitchFamily="18" charset="0"/>
-                <a:cs typeface="Times New Roman" panose="02020603050405020304" pitchFamily="18" charset="0"/>
-              </a:rPr>
-              <a:t>Check to see if these calls were from a different device, at a different IP address. </a:t>
-            </a:r>
-          </a:p>
-          <a:p>
-            <a:pPr>
-              <a:buFont typeface="Wingdings" panose="05000000000000000000" pitchFamily="2" charset="2"/>
-              <a:buChar char="Ø"/>
-            </a:pPr>
-            <a:r>
-              <a:rPr lang="en-US" sz="1800" dirty="0" smtClean="0">
-                <a:latin typeface="Times New Roman" panose="02020603050405020304" pitchFamily="18" charset="0"/>
-                <a:cs typeface="Times New Roman" panose="02020603050405020304" pitchFamily="18" charset="0"/>
-              </a:rPr>
-              <a:t>If the Device and IP address are the same and there was high latency, jitter, or  packet loss this more than likely is a False Positive Alert.</a:t>
-            </a:r>
-          </a:p>
-          <a:p>
-            <a:pPr>
-              <a:buFont typeface="Wingdings" panose="05000000000000000000" pitchFamily="2" charset="2"/>
-              <a:buChar char="Ø"/>
-            </a:pPr>
-            <a:r>
-              <a:rPr lang="en-US" sz="1800" dirty="0" smtClean="0">
-                <a:latin typeface="Times New Roman" panose="02020603050405020304" pitchFamily="18" charset="0"/>
-                <a:cs typeface="Times New Roman" panose="02020603050405020304" pitchFamily="18" charset="0"/>
-              </a:rPr>
-              <a:t>If the Device is different and the location of the IP addresses are far and seem to be suspicious then this could potentially be a Fraud.  </a:t>
-            </a:r>
-            <a:endParaRPr lang="en-US" sz="1800" dirty="0">
+              <a:t>Make sure this information is copied and pasted as per the Fraud Template</a:t>
+            </a:r>
+            <a:endParaRPr lang="en-US" sz="1600" dirty="0">
               <a:latin typeface="Times New Roman" panose="02020603050405020304" pitchFamily="18" charset="0"/>
               <a:cs typeface="Times New Roman" panose="02020603050405020304" pitchFamily="18" charset="0"/>
             </a:endParaRPr>
@@ -15146,7 +15023,7 @@
       </p:sp>
       <p:sp>
         <p:nvSpPr>
-          <p:cNvPr id="6" name="Slide Number Placeholder 5"/>
+          <p:cNvPr id="5" name="Slide Number Placeholder 4"/>
           <p:cNvSpPr>
             <a:spLocks noGrp="1"/>
           </p:cNvSpPr>
@@ -15159,7 +15036,7 @@
           <a:bodyPr/>
           <a:lstStyle/>
           <a:p>
-            <a:fld id="{51062DCB-C440-495D-8BB3-6798C4B87E5E}" type="slidenum">
+            <a:fld id="{71BC9C40-ACDD-4696-8BAF-E1591320CFED}" type="slidenum">
               <a:rPr lang="en-US" smtClean="0"/>
               <a:pPr/>
               <a:t>11</a:t>
@@ -15168,10 +15045,49 @@
           </a:p>
         </p:txBody>
       </p:sp>
+      <p:pic>
+        <p:nvPicPr>
+          <p:cNvPr id="8" name="Content Placeholder 7"/>
+          <p:cNvPicPr>
+            <a:picLocks noGrp="1" noChangeAspect="1"/>
+          </p:cNvPicPr>
+          <p:nvPr>
+            <p:ph sz="half" idx="2"/>
+          </p:nvPr>
+        </p:nvPicPr>
+        <p:blipFill>
+          <a:blip r:embed="rId2" cstate="print">
+            <a:extLst>
+              <a:ext uri="{BEBA8EAE-BF5A-486C-A8C5-ECC9F3942E4B}">
+                <a14:imgProps xmlns:a14="http://schemas.microsoft.com/office/drawing/2010/main">
+                  <a14:imgLayer r:embed="rId3">
+                    <a14:imgEffect>
+                      <a14:sharpenSoften amount="50000"/>
+                    </a14:imgEffect>
+                  </a14:imgLayer>
+                </a14:imgProps>
+              </a:ext>
+              <a:ext uri="{28A0092B-C50C-407E-A947-70E740481C1C}">
+                <a14:useLocalDpi xmlns:a14="http://schemas.microsoft.com/office/drawing/2010/main" val="0"/>
+              </a:ext>
+            </a:extLst>
+          </a:blip>
+          <a:stretch>
+            <a:fillRect/>
+          </a:stretch>
+        </p:blipFill>
+        <p:spPr>
+          <a:xfrm>
+            <a:off x="3657600" y="1447800"/>
+            <a:ext cx="5130538" cy="4876800"/>
+          </a:xfrm>
+          <a:noFill/>
+        </p:spPr>
+      </p:pic>
     </p:spTree>
     <p:extLst>
       <p:ext uri="{BB962C8B-B14F-4D97-AF65-F5344CB8AC3E}">
-        <p14:creationId xmlns:p14="http://schemas.microsoft.com/office/powerpoint/2010/main" val="2860348354"/>
+        <p14:creationId xmlns:p14="http://schemas.microsoft.com/office/powerpoint/2010/main" val="2871853853"/>
       </p:ext>
     </p:extLst>
   </p:cSld>
@@ -15221,6 +15137,460 @@
           <a:lstStyle/>
           <a:p>
             <a:r>
+              <a:rPr lang="en-US" dirty="0"/>
+              <a:t>Investigation continued …</a:t>
+            </a:r>
+          </a:p>
+        </p:txBody>
+      </p:sp>
+      <p:sp>
+        <p:nvSpPr>
+          <p:cNvPr id="6" name="Content Placeholder 5"/>
+          <p:cNvSpPr>
+            <a:spLocks noGrp="1"/>
+          </p:cNvSpPr>
+          <p:nvPr>
+            <p:ph sz="half" idx="1"/>
+          </p:nvPr>
+        </p:nvSpPr>
+        <p:spPr/>
+        <p:txBody>
+          <a:bodyPr/>
+          <a:lstStyle/>
+          <a:p>
+            <a:pPr>
+              <a:buFont typeface="Wingdings" panose="05000000000000000000" pitchFamily="2" charset="2"/>
+              <a:buChar char="Ø"/>
+            </a:pPr>
+            <a:r>
+              <a:rPr lang="en-US" sz="1600" dirty="0" smtClean="0">
+                <a:latin typeface="Times New Roman" panose="02020603050405020304" pitchFamily="18" charset="0"/>
+                <a:cs typeface="Times New Roman" panose="02020603050405020304" pitchFamily="18" charset="0"/>
+              </a:rPr>
+              <a:t>Use a IP address look up tool (like infosniper.net) to look up the IP address of the </a:t>
+            </a:r>
+            <a:r>
+              <a:rPr lang="en-US" sz="1600" dirty="0">
+                <a:latin typeface="Times New Roman" panose="02020603050405020304" pitchFamily="18" charset="0"/>
+                <a:cs typeface="Times New Roman" panose="02020603050405020304" pitchFamily="18" charset="0"/>
+              </a:rPr>
+              <a:t>Initiator User </a:t>
+            </a:r>
+            <a:r>
+              <a:rPr lang="en-US" sz="1600" dirty="0" smtClean="0">
+                <a:latin typeface="Times New Roman" panose="02020603050405020304" pitchFamily="18" charset="0"/>
+                <a:cs typeface="Times New Roman" panose="02020603050405020304" pitchFamily="18" charset="0"/>
+              </a:rPr>
+              <a:t>Agent pay close attention to where these calls were place from. </a:t>
+            </a:r>
+          </a:p>
+          <a:p>
+            <a:pPr>
+              <a:buFont typeface="Wingdings" panose="05000000000000000000" pitchFamily="2" charset="2"/>
+              <a:buChar char="Ø"/>
+            </a:pPr>
+            <a:endParaRPr lang="en-US" sz="1600" dirty="0" smtClean="0">
+              <a:latin typeface="Times New Roman" panose="02020603050405020304" pitchFamily="18" charset="0"/>
+              <a:cs typeface="Times New Roman" panose="02020603050405020304" pitchFamily="18" charset="0"/>
+            </a:endParaRPr>
+          </a:p>
+          <a:p>
+            <a:pPr>
+              <a:buFont typeface="Wingdings" panose="05000000000000000000" pitchFamily="2" charset="2"/>
+              <a:buChar char="Ø"/>
+            </a:pPr>
+            <a:endParaRPr lang="en-US" sz="1600" dirty="0">
+              <a:latin typeface="Times New Roman" panose="02020603050405020304" pitchFamily="18" charset="0"/>
+              <a:cs typeface="Times New Roman" panose="02020603050405020304" pitchFamily="18" charset="0"/>
+            </a:endParaRPr>
+          </a:p>
+          <a:p>
+            <a:pPr>
+              <a:buFont typeface="Wingdings" panose="05000000000000000000" pitchFamily="2" charset="2"/>
+              <a:buChar char="Ø"/>
+            </a:pPr>
+            <a:endParaRPr lang="en-US" sz="1600" dirty="0" smtClean="0">
+              <a:latin typeface="Times New Roman" panose="02020603050405020304" pitchFamily="18" charset="0"/>
+              <a:cs typeface="Times New Roman" panose="02020603050405020304" pitchFamily="18" charset="0"/>
+            </a:endParaRPr>
+          </a:p>
+          <a:p>
+            <a:pPr>
+              <a:buFont typeface="Wingdings" panose="05000000000000000000" pitchFamily="2" charset="2"/>
+              <a:buChar char="Ø"/>
+            </a:pPr>
+            <a:endParaRPr lang="en-US" sz="1600" dirty="0">
+              <a:latin typeface="Times New Roman" panose="02020603050405020304" pitchFamily="18" charset="0"/>
+              <a:cs typeface="Times New Roman" panose="02020603050405020304" pitchFamily="18" charset="0"/>
+            </a:endParaRPr>
+          </a:p>
+          <a:p>
+            <a:pPr>
+              <a:buFont typeface="Wingdings" panose="05000000000000000000" pitchFamily="2" charset="2"/>
+              <a:buChar char="Ø"/>
+            </a:pPr>
+            <a:r>
+              <a:rPr lang="en-US" sz="1600" dirty="0" smtClean="0">
+                <a:latin typeface="Times New Roman" panose="02020603050405020304" pitchFamily="18" charset="0"/>
+                <a:cs typeface="Times New Roman" panose="02020603050405020304" pitchFamily="18" charset="0"/>
+              </a:rPr>
+              <a:t>You will also want to run an MTR to the </a:t>
+            </a:r>
+            <a:r>
+              <a:rPr lang="en-US" sz="1600" dirty="0">
+                <a:latin typeface="Times New Roman" panose="02020603050405020304" pitchFamily="18" charset="0"/>
+                <a:cs typeface="Times New Roman" panose="02020603050405020304" pitchFamily="18" charset="0"/>
+              </a:rPr>
+              <a:t>Initiator User </a:t>
+            </a:r>
+            <a:r>
+              <a:rPr lang="en-US" sz="1600" dirty="0" smtClean="0">
+                <a:latin typeface="Times New Roman" panose="02020603050405020304" pitchFamily="18" charset="0"/>
+                <a:cs typeface="Times New Roman" panose="02020603050405020304" pitchFamily="18" charset="0"/>
+              </a:rPr>
+              <a:t>Agent IP address . Look for any signs of High latency, Jitter, or Packet Loss.</a:t>
+            </a:r>
+          </a:p>
+        </p:txBody>
+      </p:sp>
+      <p:pic>
+        <p:nvPicPr>
+          <p:cNvPr id="9" name="Content Placeholder 8"/>
+          <p:cNvPicPr>
+            <a:picLocks noGrp="1" noChangeAspect="1"/>
+          </p:cNvPicPr>
+          <p:nvPr>
+            <p:ph sz="quarter" idx="2"/>
+          </p:nvPr>
+        </p:nvPicPr>
+        <p:blipFill>
+          <a:blip r:embed="rId2" cstate="print">
+            <a:extLst>
+              <a:ext uri="{BEBA8EAE-BF5A-486C-A8C5-ECC9F3942E4B}">
+                <a14:imgProps xmlns:a14="http://schemas.microsoft.com/office/drawing/2010/main">
+                  <a14:imgLayer r:embed="rId3">
+                    <a14:imgEffect>
+                      <a14:sharpenSoften amount="25000"/>
+                    </a14:imgEffect>
+                  </a14:imgLayer>
+                </a14:imgProps>
+              </a:ext>
+              <a:ext uri="{28A0092B-C50C-407E-A947-70E740481C1C}">
+                <a14:useLocalDpi xmlns:a14="http://schemas.microsoft.com/office/drawing/2010/main" val="0"/>
+              </a:ext>
+            </a:extLst>
+          </a:blip>
+          <a:stretch>
+            <a:fillRect/>
+          </a:stretch>
+        </p:blipFill>
+        <p:spPr>
+          <a:xfrm>
+            <a:off x="4495800" y="1293813"/>
+            <a:ext cx="4495800" cy="2308225"/>
+          </a:xfrm>
+        </p:spPr>
+      </p:pic>
+      <p:pic>
+        <p:nvPicPr>
+          <p:cNvPr id="10" name="Content Placeholder 9"/>
+          <p:cNvPicPr>
+            <a:picLocks noGrp="1" noChangeAspect="1"/>
+          </p:cNvPicPr>
+          <p:nvPr>
+            <p:ph sz="quarter" idx="3"/>
+          </p:nvPr>
+        </p:nvPicPr>
+        <p:blipFill>
+          <a:blip r:embed="rId4" cstate="print">
+            <a:extLst>
+              <a:ext uri="{BEBA8EAE-BF5A-486C-A8C5-ECC9F3942E4B}">
+                <a14:imgProps xmlns:a14="http://schemas.microsoft.com/office/drawing/2010/main">
+                  <a14:imgLayer r:embed="rId5">
+                    <a14:imgEffect>
+                      <a14:sharpenSoften amount="25000"/>
+                    </a14:imgEffect>
+                  </a14:imgLayer>
+                </a14:imgProps>
+              </a:ext>
+              <a:ext uri="{28A0092B-C50C-407E-A947-70E740481C1C}">
+                <a14:useLocalDpi xmlns:a14="http://schemas.microsoft.com/office/drawing/2010/main" val="0"/>
+              </a:ext>
+            </a:extLst>
+          </a:blip>
+          <a:stretch>
+            <a:fillRect/>
+          </a:stretch>
+        </p:blipFill>
+        <p:spPr>
+          <a:xfrm>
+            <a:off x="4495800" y="3789635"/>
+            <a:ext cx="4543108" cy="2555328"/>
+          </a:xfrm>
+        </p:spPr>
+      </p:pic>
+      <p:sp>
+        <p:nvSpPr>
+          <p:cNvPr id="5" name="Slide Number Placeholder 4"/>
+          <p:cNvSpPr>
+            <a:spLocks noGrp="1"/>
+          </p:cNvSpPr>
+          <p:nvPr>
+            <p:ph type="sldNum" sz="quarter" idx="10"/>
+          </p:nvPr>
+        </p:nvSpPr>
+        <p:spPr/>
+        <p:txBody>
+          <a:bodyPr/>
+          <a:lstStyle/>
+          <a:p>
+            <a:fld id="{71BC9C40-ACDD-4696-8BAF-E1591320CFED}" type="slidenum">
+              <a:rPr lang="en-US" smtClean="0"/>
+              <a:pPr/>
+              <a:t>12</a:t>
+            </a:fld>
+            <a:endParaRPr lang="en-US"/>
+          </a:p>
+        </p:txBody>
+      </p:sp>
+    </p:spTree>
+    <p:extLst>
+      <p:ext uri="{BB962C8B-B14F-4D97-AF65-F5344CB8AC3E}">
+        <p14:creationId xmlns:p14="http://schemas.microsoft.com/office/powerpoint/2010/main" val="4049503898"/>
+      </p:ext>
+    </p:extLst>
+  </p:cSld>
+  <p:clrMapOvr>
+    <a:masterClrMapping/>
+  </p:clrMapOvr>
+  <p:timing>
+    <p:tnLst>
+      <p:par>
+        <p:cTn id="1" dur="indefinite" restart="never" nodeType="tmRoot"/>
+      </p:par>
+    </p:tnLst>
+  </p:timing>
+</p:sld>
+</file>
+
+<file path=ppt/slides/slide13.xml><?xml version="1.0" encoding="utf-8"?>
+<p:sld xmlns:a="http://schemas.openxmlformats.org/drawingml/2006/main" xmlns:r="http://schemas.openxmlformats.org/officeDocument/2006/relationships" xmlns:p="http://schemas.openxmlformats.org/presentationml/2006/main">
+  <p:cSld>
+    <p:spTree>
+      <p:nvGrpSpPr>
+        <p:cNvPr id="1" name=""/>
+        <p:cNvGrpSpPr/>
+        <p:nvPr/>
+      </p:nvGrpSpPr>
+      <p:grpSpPr>
+        <a:xfrm>
+          <a:off x="0" y="0"/>
+          <a:ext cx="0" cy="0"/>
+          <a:chOff x="0" y="0"/>
+          <a:chExt cx="0" cy="0"/>
+        </a:xfrm>
+      </p:grpSpPr>
+      <p:sp>
+        <p:nvSpPr>
+          <p:cNvPr id="7" name="Title 6"/>
+          <p:cNvSpPr>
+            <a:spLocks noGrp="1"/>
+          </p:cNvSpPr>
+          <p:nvPr>
+            <p:ph type="title"/>
+          </p:nvPr>
+        </p:nvSpPr>
+        <p:spPr/>
+        <p:txBody>
+          <a:bodyPr/>
+          <a:lstStyle/>
+          <a:p>
+            <a:r>
+              <a:rPr lang="en-US" dirty="0"/>
+              <a:t>Investigation continued …</a:t>
+            </a:r>
+          </a:p>
+        </p:txBody>
+      </p:sp>
+      <p:sp>
+        <p:nvSpPr>
+          <p:cNvPr id="8" name="Content Placeholder 7"/>
+          <p:cNvSpPr>
+            <a:spLocks noGrp="1"/>
+          </p:cNvSpPr>
+          <p:nvPr>
+            <p:ph idx="1"/>
+          </p:nvPr>
+        </p:nvSpPr>
+        <p:spPr/>
+        <p:txBody>
+          <a:bodyPr/>
+          <a:lstStyle/>
+          <a:p>
+            <a:pPr>
+              <a:buFont typeface="Wingdings" panose="05000000000000000000" pitchFamily="2" charset="2"/>
+              <a:buChar char="Ø"/>
+            </a:pPr>
+            <a:r>
+              <a:rPr lang="en-US" sz="1800" dirty="0" smtClean="0">
+                <a:latin typeface="Times New Roman" panose="02020603050405020304" pitchFamily="18" charset="0"/>
+                <a:cs typeface="Times New Roman" panose="02020603050405020304" pitchFamily="18" charset="0"/>
+              </a:rPr>
+              <a:t>You will now want to look at the call logs again. This time look at calls made at least 2 weeks back from the same extension. </a:t>
+            </a:r>
+          </a:p>
+          <a:p>
+            <a:pPr>
+              <a:buFont typeface="Wingdings" panose="05000000000000000000" pitchFamily="2" charset="2"/>
+              <a:buChar char="Ø"/>
+            </a:pPr>
+            <a:r>
+              <a:rPr lang="en-US" sz="1800" dirty="0" smtClean="0">
+                <a:latin typeface="Times New Roman" panose="02020603050405020304" pitchFamily="18" charset="0"/>
+                <a:cs typeface="Times New Roman" panose="02020603050405020304" pitchFamily="18" charset="0"/>
+              </a:rPr>
+              <a:t>You will once again bring up the Log Analyzer from one of these earlier calls. </a:t>
+            </a:r>
+            <a:endParaRPr lang="en-US" sz="1800" dirty="0">
+              <a:latin typeface="Times New Roman" panose="02020603050405020304" pitchFamily="18" charset="0"/>
+              <a:cs typeface="Times New Roman" panose="02020603050405020304" pitchFamily="18" charset="0"/>
+            </a:endParaRPr>
+          </a:p>
+          <a:p>
+            <a:pPr>
+              <a:buFont typeface="Wingdings" panose="05000000000000000000" pitchFamily="2" charset="2"/>
+              <a:buChar char="Ø"/>
+            </a:pPr>
+            <a:r>
+              <a:rPr lang="en-US" sz="1800" dirty="0" smtClean="0">
+                <a:latin typeface="Times New Roman" panose="02020603050405020304" pitchFamily="18" charset="0"/>
+                <a:cs typeface="Times New Roman" panose="02020603050405020304" pitchFamily="18" charset="0"/>
+              </a:rPr>
+              <a:t>Compare the information here to the information from the Log Analyzer that set off the Alert. </a:t>
+            </a:r>
+          </a:p>
+          <a:p>
+            <a:pPr>
+              <a:buFont typeface="Wingdings" panose="05000000000000000000" pitchFamily="2" charset="2"/>
+              <a:buChar char="Ø"/>
+            </a:pPr>
+            <a:r>
+              <a:rPr lang="en-US" sz="1800" dirty="0" smtClean="0">
+                <a:latin typeface="Times New Roman" panose="02020603050405020304" pitchFamily="18" charset="0"/>
+                <a:cs typeface="Times New Roman" panose="02020603050405020304" pitchFamily="18" charset="0"/>
+              </a:rPr>
+              <a:t>Check to see if these calls were from a different device, at a different IP address. </a:t>
+            </a:r>
+          </a:p>
+          <a:p>
+            <a:pPr>
+              <a:buFont typeface="Wingdings" panose="05000000000000000000" pitchFamily="2" charset="2"/>
+              <a:buChar char="Ø"/>
+            </a:pPr>
+            <a:r>
+              <a:rPr lang="en-US" sz="1800" dirty="0" smtClean="0">
+                <a:latin typeface="Times New Roman" panose="02020603050405020304" pitchFamily="18" charset="0"/>
+                <a:cs typeface="Times New Roman" panose="02020603050405020304" pitchFamily="18" charset="0"/>
+              </a:rPr>
+              <a:t>If the Device and IP address are the same and there was high latency, jitter, or  packet loss this more than likely is a False Positive Alert.</a:t>
+            </a:r>
+          </a:p>
+          <a:p>
+            <a:pPr>
+              <a:buFont typeface="Wingdings" panose="05000000000000000000" pitchFamily="2" charset="2"/>
+              <a:buChar char="Ø"/>
+            </a:pPr>
+            <a:r>
+              <a:rPr lang="en-US" sz="1800" dirty="0" smtClean="0">
+                <a:latin typeface="Times New Roman" panose="02020603050405020304" pitchFamily="18" charset="0"/>
+                <a:cs typeface="Times New Roman" panose="02020603050405020304" pitchFamily="18" charset="0"/>
+              </a:rPr>
+              <a:t>If the Device is different and the location of the IP addresses are far and seem to be suspicious then this could potentially be a Fraud.  </a:t>
+            </a:r>
+            <a:endParaRPr lang="en-US" sz="1800" dirty="0">
+              <a:latin typeface="Times New Roman" panose="02020603050405020304" pitchFamily="18" charset="0"/>
+              <a:cs typeface="Times New Roman" panose="02020603050405020304" pitchFamily="18" charset="0"/>
+            </a:endParaRPr>
+          </a:p>
+        </p:txBody>
+      </p:sp>
+      <p:sp>
+        <p:nvSpPr>
+          <p:cNvPr id="6" name="Slide Number Placeholder 5"/>
+          <p:cNvSpPr>
+            <a:spLocks noGrp="1"/>
+          </p:cNvSpPr>
+          <p:nvPr>
+            <p:ph type="sldNum" sz="quarter" idx="10"/>
+          </p:nvPr>
+        </p:nvSpPr>
+        <p:spPr/>
+        <p:txBody>
+          <a:bodyPr/>
+          <a:lstStyle/>
+          <a:p>
+            <a:fld id="{51062DCB-C440-495D-8BB3-6798C4B87E5E}" type="slidenum">
+              <a:rPr lang="en-US" smtClean="0"/>
+              <a:pPr/>
+              <a:t>13</a:t>
+            </a:fld>
+            <a:endParaRPr lang="en-US"/>
+          </a:p>
+        </p:txBody>
+      </p:sp>
+    </p:spTree>
+    <p:extLst>
+      <p:ext uri="{BB962C8B-B14F-4D97-AF65-F5344CB8AC3E}">
+        <p14:creationId xmlns:p14="http://schemas.microsoft.com/office/powerpoint/2010/main" val="2860348354"/>
+      </p:ext>
+    </p:extLst>
+  </p:cSld>
+  <p:clrMapOvr>
+    <a:masterClrMapping/>
+  </p:clrMapOvr>
+  <p:timing>
+    <p:tnLst>
+      <p:par>
+        <p:cTn id="1" dur="indefinite" restart="never" nodeType="tmRoot"/>
+      </p:par>
+    </p:tnLst>
+  </p:timing>
+</p:sld>
+</file>
+
+<file path=ppt/slides/slide14.xml><?xml version="1.0" encoding="utf-8"?>
+<p:sld xmlns:a="http://schemas.openxmlformats.org/drawingml/2006/main" xmlns:r="http://schemas.openxmlformats.org/officeDocument/2006/relationships" xmlns:p="http://schemas.openxmlformats.org/presentationml/2006/main">
+  <p:cSld>
+    <p:spTree>
+      <p:nvGrpSpPr>
+        <p:cNvPr id="1" name=""/>
+        <p:cNvGrpSpPr/>
+        <p:nvPr/>
+      </p:nvGrpSpPr>
+      <p:grpSpPr>
+        <a:xfrm>
+          <a:off x="0" y="0"/>
+          <a:ext cx="0" cy="0"/>
+          <a:chOff x="0" y="0"/>
+          <a:chExt cx="0" cy="0"/>
+        </a:xfrm>
+      </p:grpSpPr>
+      <p:sp>
+        <p:nvSpPr>
+          <p:cNvPr id="2" name="Title 1"/>
+          <p:cNvSpPr>
+            <a:spLocks noGrp="1"/>
+          </p:cNvSpPr>
+          <p:nvPr>
+            <p:ph type="title"/>
+          </p:nvPr>
+        </p:nvSpPr>
+        <p:spPr/>
+        <p:txBody>
+          <a:bodyPr/>
+          <a:lstStyle/>
+          <a:p>
+            <a:r>
               <a:rPr lang="en-US" dirty="0" smtClean="0"/>
               <a:t>Other ways to investigate.</a:t>
             </a:r>
@@ -15342,7 +15712,7 @@
               <a:pPr>
                 <a:defRPr/>
               </a:pPr>
-              <a:t>12</a:t>
+              <a:t>14</a:t>
             </a:fld>
             <a:endParaRPr lang="en-US">
               <a:solidFill>
@@ -15980,7 +16350,7 @@
         <p:spPr>
           <a:xfrm>
             <a:off x="354013" y="1293813"/>
-            <a:ext cx="8440737" cy="611187"/>
+            <a:ext cx="8440737" cy="687387"/>
           </a:xfrm>
         </p:spPr>
         <p:txBody>
@@ -15995,29 +16365,75 @@
                 <a:latin typeface="Times New Roman" panose="02020603050405020304" pitchFamily="18" charset="0"/>
                 <a:cs typeface="Times New Roman" panose="02020603050405020304" pitchFamily="18" charset="0"/>
               </a:rPr>
-              <a:t>Domestic Alerts are generated by calls exceeding account thresholds or are calls that either the customer or Vonage is being charged for.</a:t>
-            </a:r>
-            <a:r>
-              <a:rPr lang="en-US" sz="1400" dirty="0">
+              <a:t>Domestic Alerts are generated by </a:t>
+            </a:r>
+            <a:r>
+              <a:rPr lang="en-US" sz="1400" dirty="0" smtClean="0">
+                <a:latin typeface="Times New Roman" panose="02020603050405020304" pitchFamily="18" charset="0"/>
+                <a:cs typeface="Times New Roman" panose="02020603050405020304" pitchFamily="18" charset="0"/>
+              </a:rPr>
+              <a:t>domestic calls </a:t>
+            </a:r>
+            <a:r>
+              <a:rPr lang="en-US" sz="1400" dirty="0" smtClean="0">
+                <a:latin typeface="Times New Roman" panose="02020603050405020304" pitchFamily="18" charset="0"/>
+                <a:cs typeface="Times New Roman" panose="02020603050405020304" pitchFamily="18" charset="0"/>
+              </a:rPr>
+              <a:t>exceeding account </a:t>
+            </a:r>
+            <a:r>
+              <a:rPr lang="en-US" sz="1400" dirty="0" smtClean="0">
+                <a:latin typeface="Times New Roman" panose="02020603050405020304" pitchFamily="18" charset="0"/>
+                <a:cs typeface="Times New Roman" panose="02020603050405020304" pitchFamily="18" charset="0"/>
+              </a:rPr>
+              <a:t>thresholds and is often </a:t>
+            </a:r>
+            <a:r>
+              <a:rPr lang="en-US" sz="1400" dirty="0" smtClean="0">
+                <a:latin typeface="Times New Roman" panose="02020603050405020304" pitchFamily="18" charset="0"/>
+                <a:cs typeface="Times New Roman" panose="02020603050405020304" pitchFamily="18" charset="0"/>
+              </a:rPr>
+              <a:t>triggered as a </a:t>
+            </a:r>
+            <a:r>
+              <a:rPr lang="en-US" sz="1400" dirty="0" smtClean="0">
+                <a:latin typeface="Times New Roman" panose="02020603050405020304" pitchFamily="18" charset="0"/>
+                <a:cs typeface="Times New Roman" panose="02020603050405020304" pitchFamily="18" charset="0"/>
+              </a:rPr>
+              <a:t>result of network conditions. However, be on the lookout as </a:t>
+            </a:r>
+            <a:r>
+              <a:rPr lang="en-US" sz="1400" dirty="0" err="1" smtClean="0">
+                <a:latin typeface="Times New Roman" panose="02020603050405020304" pitchFamily="18" charset="0"/>
+                <a:cs typeface="Times New Roman" panose="02020603050405020304" pitchFamily="18" charset="0"/>
+              </a:rPr>
+              <a:t>autodialers</a:t>
+            </a:r>
+            <a:r>
+              <a:rPr lang="en-US" sz="1400" dirty="0" smtClean="0">
+                <a:latin typeface="Times New Roman" panose="02020603050405020304" pitchFamily="18" charset="0"/>
+                <a:cs typeface="Times New Roman" panose="02020603050405020304" pitchFamily="18" charset="0"/>
+              </a:rPr>
+              <a:t> and PBX’s may also be </a:t>
+            </a:r>
+            <a:r>
+              <a:rPr lang="en-US" sz="1400" dirty="0" smtClean="0">
+                <a:latin typeface="Times New Roman" panose="02020603050405020304" pitchFamily="18" charset="0"/>
+                <a:cs typeface="Times New Roman" panose="02020603050405020304" pitchFamily="18" charset="0"/>
+              </a:rPr>
+              <a:t>the culprit either with or without the account holders knowledge. Example:  </a:t>
+            </a:r>
+            <a:r>
+              <a:rPr lang="en-US" sz="1400" dirty="0" smtClean="0">
                 <a:latin typeface="Times New Roman" panose="02020603050405020304" pitchFamily="18" charset="0"/>
                 <a:cs typeface="Times New Roman" panose="02020603050405020304" pitchFamily="18" charset="0"/>
               </a:rPr>
               <a:t> </a:t>
             </a:r>
-            <a:r>
-              <a:rPr lang="en-US" sz="1400" dirty="0" err="1" smtClean="0">
-                <a:latin typeface="Times New Roman" panose="02020603050405020304" pitchFamily="18" charset="0"/>
-                <a:cs typeface="Times New Roman" panose="02020603050405020304" pitchFamily="18" charset="0"/>
-              </a:rPr>
-              <a:t>Exgitample</a:t>
-            </a:r>
-            <a:r>
-              <a:rPr lang="en-US" sz="1400" dirty="0" smtClean="0">
-                <a:latin typeface="Times New Roman" panose="02020603050405020304" pitchFamily="18" charset="0"/>
-                <a:cs typeface="Times New Roman" panose="02020603050405020304" pitchFamily="18" charset="0"/>
-              </a:rPr>
-              <a:t>:</a:t>
-            </a:r>
+            <a:endParaRPr lang="en-US" sz="1400" dirty="0" smtClean="0">
+              <a:latin typeface="Times New Roman" panose="02020603050405020304" pitchFamily="18" charset="0"/>
+              <a:cs typeface="Times New Roman" panose="02020603050405020304" pitchFamily="18" charset="0"/>
+            </a:endParaRPr>
           </a:p>
           <a:p>
             <a:pPr marL="0" indent="0">
@@ -16078,7 +16494,7 @@
       </p:sp>
       <p:pic>
         <p:nvPicPr>
-          <p:cNvPr id="5" name="Picture 4"/>
+          <p:cNvPr id="9" name="Picture 8"/>
           <p:cNvPicPr>
             <a:picLocks noChangeAspect="1"/>
           </p:cNvPicPr>
@@ -16098,8 +16514,8 @@
         </p:blipFill>
         <p:spPr>
           <a:xfrm>
-            <a:off x="381000" y="2133599"/>
-            <a:ext cx="8534400" cy="3930805"/>
+            <a:off x="161309" y="2981262"/>
+            <a:ext cx="8821382" cy="895475"/>
           </a:xfrm>
           <a:prstGeom prst="rect">
             <a:avLst/>
@@ -16162,7 +16578,7 @@
               <a:rPr lang="en-US" sz="4800" dirty="0" smtClean="0">
                 <a:latin typeface="Impact" panose="020B0806030902050204" pitchFamily="34" charset="0"/>
               </a:rPr>
-              <a:t>Investigation Steps</a:t>
+              <a:t>Vonage or Manual Alert</a:t>
             </a:r>
             <a:endParaRPr lang="en-US" sz="4800" dirty="0">
               <a:latin typeface="Impact" panose="020B0806030902050204" pitchFamily="34" charset="0"/>
@@ -16180,274 +16596,76 @@
             <p:ph idx="1"/>
           </p:nvPr>
         </p:nvSpPr>
-        <p:spPr/>
+        <p:spPr>
+          <a:xfrm>
+            <a:off x="354013" y="1293813"/>
+            <a:ext cx="8440737" cy="687387"/>
+          </a:xfrm>
+        </p:spPr>
         <p:txBody>
           <a:bodyPr/>
           <a:lstStyle/>
           <a:p>
-            <a:pPr marL="342900" indent="-342900">
-              <a:buFont typeface="+mj-lt"/>
-              <a:buAutoNum type="arabicPeriod"/>
+            <a:pPr marL="0" indent="0">
+              <a:buNone/>
             </a:pPr>
             <a:r>
-              <a:rPr lang="en-US" sz="1600" dirty="0">
+              <a:rPr lang="en-US" sz="1400" dirty="0" smtClean="0">
                 <a:latin typeface="Times New Roman" panose="02020603050405020304" pitchFamily="18" charset="0"/>
                 <a:cs typeface="Times New Roman" panose="02020603050405020304" pitchFamily="18" charset="0"/>
               </a:rPr>
-              <a:t>After the Fraud alert comes to the On-Call phone forward that email to yourself in Outlook</a:t>
-            </a:r>
-            <a:r>
-              <a:rPr lang="en-US" sz="1600" dirty="0" smtClean="0">
+              <a:t>Vonage Alerts are generated upon discovery of calling patterns to undefined, blocked, or regions high </a:t>
+            </a:r>
+            <a:r>
+              <a:rPr lang="en-US" sz="1400" dirty="0" smtClean="0">
                 <a:latin typeface="Times New Roman" panose="02020603050405020304" pitchFamily="18" charset="0"/>
                 <a:cs typeface="Times New Roman" panose="02020603050405020304" pitchFamily="18" charset="0"/>
               </a:rPr>
-              <a:t>.</a:t>
-            </a:r>
-            <a:endParaRPr lang="en-US" sz="1600" dirty="0">
+              <a:t>in </a:t>
+            </a:r>
+            <a:r>
+              <a:rPr lang="en-US" sz="1400" dirty="0" smtClean="0">
+                <a:latin typeface="Times New Roman" panose="02020603050405020304" pitchFamily="18" charset="0"/>
+                <a:cs typeface="Times New Roman" panose="02020603050405020304" pitchFamily="18" charset="0"/>
+              </a:rPr>
+              <a:t>fraudulent activity</a:t>
+            </a:r>
+            <a:r>
+              <a:rPr lang="en-US" sz="1400" dirty="0" smtClean="0">
+                <a:latin typeface="Times New Roman" panose="02020603050405020304" pitchFamily="18" charset="0"/>
+                <a:cs typeface="Times New Roman" panose="02020603050405020304" pitchFamily="18" charset="0"/>
+              </a:rPr>
+              <a:t>. Example:  </a:t>
+            </a:r>
+            <a:r>
+              <a:rPr lang="en-US" sz="1400" dirty="0" smtClean="0">
+                <a:latin typeface="Times New Roman" panose="02020603050405020304" pitchFamily="18" charset="0"/>
+                <a:cs typeface="Times New Roman" panose="02020603050405020304" pitchFamily="18" charset="0"/>
+              </a:rPr>
+              <a:t> </a:t>
+            </a:r>
+            <a:endParaRPr lang="en-US" sz="1400" dirty="0" smtClean="0">
               <a:latin typeface="Times New Roman" panose="02020603050405020304" pitchFamily="18" charset="0"/>
               <a:cs typeface="Times New Roman" panose="02020603050405020304" pitchFamily="18" charset="0"/>
             </a:endParaRPr>
           </a:p>
           <a:p>
-            <a:pPr marL="342900" indent="-342900">
-              <a:buFont typeface="+mj-lt"/>
-              <a:buAutoNum type="arabicPeriod"/>
+            <a:pPr marL="0" indent="0">
+              <a:buNone/>
             </a:pPr>
-            <a:r>
-              <a:rPr lang="en-US" sz="1600" dirty="0">
-                <a:latin typeface="Times New Roman" panose="02020603050405020304" pitchFamily="18" charset="0"/>
-                <a:cs typeface="Times New Roman" panose="02020603050405020304" pitchFamily="18" charset="0"/>
-              </a:rPr>
-              <a:t>From Outlook “Reply All” (Potential Fraud &amp; CCare On-Call 1) with “Investigating”. Make sure your reply includes your Outlook signature</a:t>
-            </a:r>
-            <a:r>
-              <a:rPr lang="en-US" sz="1600" dirty="0" smtClean="0">
-                <a:latin typeface="Times New Roman" panose="02020603050405020304" pitchFamily="18" charset="0"/>
-                <a:cs typeface="Times New Roman" panose="02020603050405020304" pitchFamily="18" charset="0"/>
-              </a:rPr>
-              <a:t>.</a:t>
-            </a:r>
-            <a:endParaRPr lang="en-US" sz="1600" dirty="0">
+            <a:endParaRPr lang="en-US" sz="1400" dirty="0" smtClean="0">
               <a:latin typeface="Times New Roman" panose="02020603050405020304" pitchFamily="18" charset="0"/>
               <a:cs typeface="Times New Roman" panose="02020603050405020304" pitchFamily="18" charset="0"/>
             </a:endParaRPr>
           </a:p>
           <a:p>
-            <a:pPr marL="342900" indent="-342900">
-              <a:buFont typeface="+mj-lt"/>
-              <a:buAutoNum type="arabicPeriod"/>
+            <a:pPr marL="0" indent="0">
+              <a:buNone/>
             </a:pPr>
-            <a:r>
-              <a:rPr lang="en-US" sz="1600" dirty="0">
-                <a:latin typeface="Times New Roman" panose="02020603050405020304" pitchFamily="18" charset="0"/>
-                <a:cs typeface="Times New Roman" panose="02020603050405020304" pitchFamily="18" charset="0"/>
-              </a:rPr>
-              <a:t>Check the Account and see if a ticket was created in Salesforce if not create one. Insure you change case owner to On-Call and place your name in the Tier 2 Rep field</a:t>
-            </a:r>
-            <a:r>
-              <a:rPr lang="en-US" sz="1600" dirty="0" smtClean="0">
-                <a:latin typeface="Times New Roman" panose="02020603050405020304" pitchFamily="18" charset="0"/>
-                <a:cs typeface="Times New Roman" panose="02020603050405020304" pitchFamily="18" charset="0"/>
-              </a:rPr>
-              <a:t>.</a:t>
-            </a:r>
-            <a:endParaRPr lang="en-US" sz="1600" dirty="0">
+            <a:endParaRPr lang="en-US" sz="1400" dirty="0" smtClean="0">
               <a:latin typeface="Times New Roman" panose="02020603050405020304" pitchFamily="18" charset="0"/>
               <a:cs typeface="Times New Roman" panose="02020603050405020304" pitchFamily="18" charset="0"/>
             </a:endParaRPr>
-          </a:p>
-          <a:p>
-            <a:pPr marL="342900" indent="-342900">
-              <a:buFont typeface="+mj-lt"/>
-              <a:buAutoNum type="arabicPeriod"/>
-            </a:pPr>
-            <a:r>
-              <a:rPr lang="en-US" sz="1600" dirty="0">
-                <a:latin typeface="Times New Roman" panose="02020603050405020304" pitchFamily="18" charset="0"/>
-                <a:cs typeface="Times New Roman" panose="02020603050405020304" pitchFamily="18" charset="0"/>
-              </a:rPr>
-              <a:t>Copy the notes from the Alert and paste them into the Salesforce Description, be sure to include the type of Fraud Alert i.e.: Root, Domestic, Vonage, or Spending</a:t>
-            </a:r>
-            <a:r>
-              <a:rPr lang="en-US" sz="1600" dirty="0" smtClean="0">
-                <a:latin typeface="Times New Roman" panose="02020603050405020304" pitchFamily="18" charset="0"/>
-                <a:cs typeface="Times New Roman" panose="02020603050405020304" pitchFamily="18" charset="0"/>
-              </a:rPr>
-              <a:t>.</a:t>
-            </a:r>
-            <a:endParaRPr lang="en-US" sz="1600" dirty="0">
-              <a:latin typeface="Times New Roman" panose="02020603050405020304" pitchFamily="18" charset="0"/>
-              <a:cs typeface="Times New Roman" panose="02020603050405020304" pitchFamily="18" charset="0"/>
-            </a:endParaRPr>
-          </a:p>
-          <a:p>
-            <a:pPr marL="342900" indent="-342900">
-              <a:buFont typeface="+mj-lt"/>
-              <a:buAutoNum type="arabicPeriod"/>
-            </a:pPr>
-            <a:r>
-              <a:rPr lang="en-US" sz="1600" dirty="0">
-                <a:latin typeface="Times New Roman" panose="02020603050405020304" pitchFamily="18" charset="0"/>
-                <a:cs typeface="Times New Roman" panose="02020603050405020304" pitchFamily="18" charset="0"/>
-              </a:rPr>
-              <a:t>Thoroughly investigate the potential Fraud and make your determination whether it’s a False-Positive or Fraud</a:t>
-            </a:r>
-            <a:r>
-              <a:rPr lang="en-US" sz="1600" dirty="0" smtClean="0">
-                <a:latin typeface="Times New Roman" panose="02020603050405020304" pitchFamily="18" charset="0"/>
-                <a:cs typeface="Times New Roman" panose="02020603050405020304" pitchFamily="18" charset="0"/>
-              </a:rPr>
-              <a:t>.</a:t>
-            </a:r>
-            <a:endParaRPr lang="en-US" sz="1600" dirty="0">
-              <a:latin typeface="Times New Roman" panose="02020603050405020304" pitchFamily="18" charset="0"/>
-              <a:cs typeface="Times New Roman" panose="02020603050405020304" pitchFamily="18" charset="0"/>
-            </a:endParaRPr>
-          </a:p>
-          <a:p>
-            <a:pPr marL="342900" indent="-342900">
-              <a:buFont typeface="+mj-lt"/>
-              <a:buAutoNum type="arabicPeriod"/>
-            </a:pPr>
-            <a:r>
-              <a:rPr lang="en-US" sz="1600" dirty="0">
-                <a:latin typeface="Times New Roman" panose="02020603050405020304" pitchFamily="18" charset="0"/>
-                <a:cs typeface="Times New Roman" panose="02020603050405020304" pitchFamily="18" charset="0"/>
-              </a:rPr>
-              <a:t> From Outlook “Reply All” to the Alert with your investigation notes. (see examples below</a:t>
-            </a:r>
-            <a:r>
-              <a:rPr lang="en-US" sz="1600" dirty="0" smtClean="0">
-                <a:latin typeface="Times New Roman" panose="02020603050405020304" pitchFamily="18" charset="0"/>
-                <a:cs typeface="Times New Roman" panose="02020603050405020304" pitchFamily="18" charset="0"/>
-              </a:rPr>
-              <a:t>)</a:t>
-            </a:r>
-            <a:endParaRPr lang="en-US" sz="1600" dirty="0">
-              <a:latin typeface="Times New Roman" panose="02020603050405020304" pitchFamily="18" charset="0"/>
-              <a:cs typeface="Times New Roman" panose="02020603050405020304" pitchFamily="18" charset="0"/>
-            </a:endParaRPr>
-          </a:p>
-          <a:p>
-            <a:pPr marL="342900" indent="-342900">
-              <a:buFont typeface="+mj-lt"/>
-              <a:buAutoNum type="arabicPeriod"/>
-            </a:pPr>
-            <a:r>
-              <a:rPr lang="en-US" sz="1600" dirty="0">
-                <a:latin typeface="Times New Roman" panose="02020603050405020304" pitchFamily="18" charset="0"/>
-                <a:cs typeface="Times New Roman" panose="02020603050405020304" pitchFamily="18" charset="0"/>
-              </a:rPr>
-              <a:t>Update your salesforce ticket with your investigation notes in the “Log Call” section change Problem </a:t>
-            </a:r>
-            <a:r>
-              <a:rPr lang="en-US" sz="1600" dirty="0" smtClean="0">
-                <a:latin typeface="Times New Roman" panose="02020603050405020304" pitchFamily="18" charset="0"/>
-                <a:cs typeface="Times New Roman" panose="02020603050405020304" pitchFamily="18" charset="0"/>
-              </a:rPr>
-              <a:t>Code to “Fraud Alert” and Problem Code II to reflect </a:t>
-            </a:r>
-            <a:r>
-              <a:rPr lang="en-US" sz="1600" dirty="0">
-                <a:latin typeface="Times New Roman" panose="02020603050405020304" pitchFamily="18" charset="0"/>
-                <a:cs typeface="Times New Roman" panose="02020603050405020304" pitchFamily="18" charset="0"/>
-              </a:rPr>
-              <a:t>False-Positive or Fraud. Make sure case owner is set to On-Call and your name is in the Tier 2 Rep field or you will not be paid</a:t>
-            </a:r>
-            <a:r>
-              <a:rPr lang="en-US" sz="1600" dirty="0" smtClean="0">
-                <a:latin typeface="Times New Roman" panose="02020603050405020304" pitchFamily="18" charset="0"/>
-                <a:cs typeface="Times New Roman" panose="02020603050405020304" pitchFamily="18" charset="0"/>
-              </a:rPr>
-              <a:t>.</a:t>
-            </a:r>
-            <a:endParaRPr lang="en-US" sz="1600" dirty="0">
-              <a:latin typeface="Times New Roman" panose="02020603050405020304" pitchFamily="18" charset="0"/>
-              <a:cs typeface="Times New Roman" panose="02020603050405020304" pitchFamily="18" charset="0"/>
-            </a:endParaRPr>
-          </a:p>
-          <a:p>
-            <a:pPr marL="342900" indent="-342900">
-              <a:buFont typeface="+mj-lt"/>
-              <a:buAutoNum type="arabicPeriod"/>
-            </a:pPr>
-            <a:r>
-              <a:rPr lang="en-US" sz="1600" dirty="0">
-                <a:latin typeface="Times New Roman" panose="02020603050405020304" pitchFamily="18" charset="0"/>
-                <a:cs typeface="Times New Roman" panose="02020603050405020304" pitchFamily="18" charset="0"/>
-              </a:rPr>
-              <a:t>Close Ticket “Resolved</a:t>
-            </a:r>
-            <a:r>
-              <a:rPr lang="en-US" sz="1600" dirty="0" smtClean="0">
-                <a:latin typeface="Times New Roman" panose="02020603050405020304" pitchFamily="18" charset="0"/>
-                <a:cs typeface="Times New Roman" panose="02020603050405020304" pitchFamily="18" charset="0"/>
-              </a:rPr>
-              <a:t>”</a:t>
-            </a:r>
-            <a:endParaRPr lang="en-US" sz="1600" dirty="0">
-              <a:latin typeface="Times New Roman" panose="02020603050405020304" pitchFamily="18" charset="0"/>
-              <a:cs typeface="Times New Roman" panose="02020603050405020304" pitchFamily="18" charset="0"/>
-            </a:endParaRPr>
-          </a:p>
-          <a:p>
-            <a:pPr marL="342900" indent="-342900">
-              <a:buFont typeface="+mj-lt"/>
-              <a:buAutoNum type="arabicPeriod"/>
-            </a:pPr>
-            <a:r>
-              <a:rPr lang="en-US" sz="1600" dirty="0" smtClean="0">
-                <a:latin typeface="Times New Roman" panose="02020603050405020304" pitchFamily="18" charset="0"/>
-                <a:cs typeface="Times New Roman" panose="02020603050405020304" pitchFamily="18" charset="0"/>
-              </a:rPr>
-              <a:t>Send an </a:t>
-            </a:r>
-            <a:r>
-              <a:rPr lang="en-US" sz="1600" dirty="0">
-                <a:latin typeface="Times New Roman" panose="02020603050405020304" pitchFamily="18" charset="0"/>
-                <a:cs typeface="Times New Roman" panose="02020603050405020304" pitchFamily="18" charset="0"/>
-              </a:rPr>
-              <a:t>email to </a:t>
-            </a:r>
-            <a:r>
-              <a:rPr lang="en-US" sz="1600" dirty="0" smtClean="0">
-                <a:latin typeface="Times New Roman" panose="02020603050405020304" pitchFamily="18" charset="0"/>
-                <a:cs typeface="Times New Roman" panose="02020603050405020304" pitchFamily="18" charset="0"/>
-                <a:hlinkClick r:id="rId2"/>
-              </a:rPr>
-              <a:t>FraudandAbuseTeam-vb@vonage.com</a:t>
-            </a:r>
-            <a:r>
-              <a:rPr lang="en-US" sz="1600" dirty="0" smtClean="0">
-                <a:latin typeface="Times New Roman" panose="02020603050405020304" pitchFamily="18" charset="0"/>
-                <a:cs typeface="Times New Roman" panose="02020603050405020304" pitchFamily="18" charset="0"/>
-              </a:rPr>
-              <a:t> for </a:t>
-            </a:r>
-            <a:r>
-              <a:rPr lang="en-US" sz="1600" dirty="0">
-                <a:latin typeface="Times New Roman" panose="02020603050405020304" pitchFamily="18" charset="0"/>
-                <a:cs typeface="Times New Roman" panose="02020603050405020304" pitchFamily="18" charset="0"/>
-              </a:rPr>
-              <a:t>any actual Frauds </a:t>
-            </a:r>
-            <a:r>
-              <a:rPr lang="en-US" sz="1600" dirty="0" smtClean="0">
-                <a:latin typeface="Times New Roman" panose="02020603050405020304" pitchFamily="18" charset="0"/>
-                <a:cs typeface="Times New Roman" panose="02020603050405020304" pitchFamily="18" charset="0"/>
-              </a:rPr>
-              <a:t>at the </a:t>
-            </a:r>
-            <a:r>
-              <a:rPr lang="en-US" sz="1600" dirty="0">
-                <a:latin typeface="Times New Roman" panose="02020603050405020304" pitchFamily="18" charset="0"/>
-                <a:cs typeface="Times New Roman" panose="02020603050405020304" pitchFamily="18" charset="0"/>
-              </a:rPr>
-              <a:t>next day so the total charges can be calculated.</a:t>
-            </a:r>
-          </a:p>
-          <a:p>
-            <a:endParaRPr lang="en-US" dirty="0"/>
           </a:p>
         </p:txBody>
       </p:sp>
@@ -16488,10 +16706,40 @@
           </a:p>
         </p:txBody>
       </p:sp>
+      <p:pic>
+        <p:nvPicPr>
+          <p:cNvPr id="6" name="Picture 5"/>
+          <p:cNvPicPr>
+            <a:picLocks noChangeAspect="1"/>
+          </p:cNvPicPr>
+          <p:nvPr/>
+        </p:nvPicPr>
+        <p:blipFill>
+          <a:blip r:embed="rId2">
+            <a:extLst>
+              <a:ext uri="{28A0092B-C50C-407E-A947-70E740481C1C}">
+                <a14:useLocalDpi xmlns:a14="http://schemas.microsoft.com/office/drawing/2010/main" val="0"/>
+              </a:ext>
+            </a:extLst>
+          </a:blip>
+          <a:stretch>
+            <a:fillRect/>
+          </a:stretch>
+        </p:blipFill>
+        <p:spPr>
+          <a:xfrm>
+            <a:off x="762000" y="1981200"/>
+            <a:ext cx="7467600" cy="4558664"/>
+          </a:xfrm>
+          <a:prstGeom prst="rect">
+            <a:avLst/>
+          </a:prstGeom>
+        </p:spPr>
+      </p:pic>
     </p:spTree>
     <p:extLst>
       <p:ext uri="{BB962C8B-B14F-4D97-AF65-F5344CB8AC3E}">
-        <p14:creationId xmlns:p14="http://schemas.microsoft.com/office/powerpoint/2010/main" val="3464281621"/>
+        <p14:creationId xmlns:p14="http://schemas.microsoft.com/office/powerpoint/2010/main" val="2663891567"/>
       </p:ext>
     </p:extLst>
   </p:cSld>
@@ -16527,7 +16775,7 @@
       </p:grpSpPr>
       <p:sp>
         <p:nvSpPr>
-          <p:cNvPr id="6" name="Title 5"/>
+          <p:cNvPr id="2" name="Title 1"/>
           <p:cNvSpPr>
             <a:spLocks noGrp="1"/>
           </p:cNvSpPr>
@@ -16541,62 +16789,83 @@
           <a:lstStyle/>
           <a:p>
             <a:r>
-              <a:rPr lang="en-US" dirty="0" smtClean="0"/>
-              <a:t>Begin Your Investigation </a:t>
-            </a:r>
-            <a:endParaRPr lang="en-US" dirty="0"/>
-          </a:p>
-        </p:txBody>
-      </p:sp>
-      <p:sp>
-        <p:nvSpPr>
-          <p:cNvPr id="7" name="Content Placeholder 6"/>
+              <a:rPr lang="en-US" sz="4800" dirty="0" smtClean="0">
+                <a:latin typeface="Impact" panose="020B0806030902050204" pitchFamily="34" charset="0"/>
+              </a:rPr>
+              <a:t>Spending Alert</a:t>
+            </a:r>
+            <a:endParaRPr lang="en-US" sz="4800" dirty="0">
+              <a:latin typeface="Impact" panose="020B0806030902050204" pitchFamily="34" charset="0"/>
+            </a:endParaRPr>
+          </a:p>
+        </p:txBody>
+      </p:sp>
+      <p:sp>
+        <p:nvSpPr>
+          <p:cNvPr id="3" name="Content Placeholder 2"/>
           <p:cNvSpPr>
             <a:spLocks noGrp="1"/>
           </p:cNvSpPr>
           <p:nvPr>
-            <p:ph sz="half" idx="1"/>
+            <p:ph idx="1"/>
           </p:nvPr>
         </p:nvSpPr>
         <p:spPr>
           <a:xfrm>
-            <a:off x="381001" y="1371600"/>
-            <a:ext cx="3505199" cy="4768850"/>
+            <a:off x="354013" y="1293813"/>
+            <a:ext cx="8440737" cy="534987"/>
           </a:xfrm>
         </p:spPr>
         <p:txBody>
           <a:bodyPr/>
           <a:lstStyle/>
           <a:p>
-            <a:pPr>
-              <a:buFont typeface="Wingdings" panose="05000000000000000000" pitchFamily="2" charset="2"/>
-              <a:buChar char="Ø"/>
+            <a:pPr marL="0" indent="0">
+              <a:buNone/>
             </a:pPr>
             <a:r>
-              <a:rPr lang="en-US" sz="1600" dirty="0" smtClean="0"/>
-              <a:t>You will begin you investigation by looking at the account registration page.</a:t>
-            </a:r>
-          </a:p>
-          <a:p>
-            <a:pPr>
-              <a:buFont typeface="Wingdings" panose="05000000000000000000" pitchFamily="2" charset="2"/>
-              <a:buChar char="Ø"/>
+              <a:rPr lang="en-US" sz="1400" dirty="0" smtClean="0">
+                <a:latin typeface="Times New Roman" panose="02020603050405020304" pitchFamily="18" charset="0"/>
+                <a:cs typeface="Times New Roman" panose="02020603050405020304" pitchFamily="18" charset="0"/>
+              </a:rPr>
+              <a:t>Spending Alerts are generated when charges </a:t>
+            </a:r>
+            <a:r>
+              <a:rPr lang="en-US" sz="1400" dirty="0" smtClean="0">
+                <a:latin typeface="Times New Roman" panose="02020603050405020304" pitchFamily="18" charset="0"/>
+                <a:cs typeface="Times New Roman" panose="02020603050405020304" pitchFamily="18" charset="0"/>
+              </a:rPr>
+              <a:t>exceed an account threshold. Example:  </a:t>
+            </a:r>
+            <a:r>
+              <a:rPr lang="en-US" sz="1400" dirty="0" smtClean="0">
+                <a:latin typeface="Times New Roman" panose="02020603050405020304" pitchFamily="18" charset="0"/>
+                <a:cs typeface="Times New Roman" panose="02020603050405020304" pitchFamily="18" charset="0"/>
+              </a:rPr>
+              <a:t> </a:t>
+            </a:r>
+            <a:endParaRPr lang="en-US" sz="1400" dirty="0" smtClean="0">
+              <a:latin typeface="Times New Roman" panose="02020603050405020304" pitchFamily="18" charset="0"/>
+              <a:cs typeface="Times New Roman" panose="02020603050405020304" pitchFamily="18" charset="0"/>
+            </a:endParaRPr>
+          </a:p>
+          <a:p>
+            <a:pPr marL="0" indent="0">
+              <a:buNone/>
             </a:pPr>
-            <a:r>
-              <a:rPr lang="en-US" sz="1600" dirty="0" smtClean="0"/>
-              <a:t>From here you will want to check the IP addresses of any currently registering devices.</a:t>
-            </a:r>
-          </a:p>
-          <a:p>
-            <a:pPr>
-              <a:buFont typeface="Wingdings" panose="05000000000000000000" pitchFamily="2" charset="2"/>
-              <a:buChar char="Ø"/>
+            <a:endParaRPr lang="en-US" sz="1400" dirty="0" smtClean="0">
+              <a:latin typeface="Times New Roman" panose="02020603050405020304" pitchFamily="18" charset="0"/>
+              <a:cs typeface="Times New Roman" panose="02020603050405020304" pitchFamily="18" charset="0"/>
+            </a:endParaRPr>
+          </a:p>
+          <a:p>
+            <a:pPr marL="0" indent="0">
+              <a:buNone/>
             </a:pPr>
-            <a:r>
-              <a:rPr lang="en-US" sz="1600" dirty="0" smtClean="0"/>
-              <a:t>You will also want to see if there are any devices registering with duplicate SIP IDs.</a:t>
-            </a:r>
-            <a:endParaRPr lang="en-US" sz="1600" dirty="0"/>
+            <a:endParaRPr lang="en-US" sz="1400" dirty="0" smtClean="0">
+              <a:latin typeface="Times New Roman" panose="02020603050405020304" pitchFamily="18" charset="0"/>
+              <a:cs typeface="Times New Roman" panose="02020603050405020304" pitchFamily="18" charset="0"/>
+            </a:endParaRPr>
           </a:p>
         </p:txBody>
       </p:sp>
@@ -16618,7 +16887,7 @@
             <a:pPr>
               <a:defRPr/>
             </a:pPr>
-            <a:fld id="{D3208C8F-5341-4944-8C08-C55337151DB1}" type="slidenum">
+            <a:fld id="{16514749-0C09-4910-A1F5-A5A3B603506F}" type="slidenum">
               <a:rPr lang="en-US" smtClean="0">
                 <a:solidFill>
                   <a:srgbClr val="FFFFFF"/>
@@ -16629,7 +16898,7 @@
               </a:pPr>
               <a:t>7</a:t>
             </a:fld>
-            <a:endParaRPr lang="en-US" dirty="0">
+            <a:endParaRPr lang="en-US">
               <a:solidFill>
                 <a:srgbClr val="FFFFFF"/>
               </a:solidFill>
@@ -16639,26 +16908,15 @@
       </p:sp>
       <p:pic>
         <p:nvPicPr>
-          <p:cNvPr id="14" name="Content Placeholder 13"/>
+          <p:cNvPr id="5" name="Picture 4"/>
           <p:cNvPicPr>
-            <a:picLocks noGrp="1" noChangeAspect="1"/>
+            <a:picLocks noChangeAspect="1"/>
           </p:cNvPicPr>
-          <p:nvPr>
-            <p:ph sz="half" idx="2"/>
-          </p:nvPr>
+          <p:nvPr/>
         </p:nvPicPr>
         <p:blipFill>
-          <a:blip r:embed="rId2" cstate="print">
+          <a:blip r:embed="rId2">
             <a:extLst>
-              <a:ext uri="{BEBA8EAE-BF5A-486C-A8C5-ECC9F3942E4B}">
-                <a14:imgProps xmlns:a14="http://schemas.microsoft.com/office/drawing/2010/main">
-                  <a14:imgLayer r:embed="rId3">
-                    <a14:imgEffect>
-                      <a14:sharpenSoften amount="50000"/>
-                    </a14:imgEffect>
-                  </a14:imgLayer>
-                </a14:imgProps>
-              </a:ext>
               <a:ext uri="{28A0092B-C50C-407E-A947-70E740481C1C}">
                 <a14:useLocalDpi xmlns:a14="http://schemas.microsoft.com/office/drawing/2010/main" val="0"/>
               </a:ext>
@@ -16670,15 +16928,18 @@
         </p:blipFill>
         <p:spPr>
           <a:xfrm>
-            <a:off x="3886200" y="1447800"/>
-            <a:ext cx="4908550" cy="4724399"/>
+            <a:off x="990600" y="1981200"/>
+            <a:ext cx="6649378" cy="2143424"/>
           </a:xfrm>
+          <a:prstGeom prst="rect">
+            <a:avLst/>
+          </a:prstGeom>
         </p:spPr>
       </p:pic>
     </p:spTree>
     <p:extLst>
       <p:ext uri="{BB962C8B-B14F-4D97-AF65-F5344CB8AC3E}">
-        <p14:creationId xmlns:p14="http://schemas.microsoft.com/office/powerpoint/2010/main" val="1031350540"/>
+        <p14:creationId xmlns:p14="http://schemas.microsoft.com/office/powerpoint/2010/main" val="579679256"/>
       </p:ext>
     </p:extLst>
   </p:cSld>
@@ -16728,10 +16989,14 @@
           <a:lstStyle/>
           <a:p>
             <a:r>
-              <a:rPr lang="en-US" dirty="0" smtClean="0"/>
-              <a:t>Investigation continued …</a:t>
-            </a:r>
-            <a:endParaRPr lang="en-US" dirty="0"/>
+              <a:rPr lang="en-US" sz="4800" dirty="0" smtClean="0">
+                <a:latin typeface="Impact" panose="020B0806030902050204" pitchFamily="34" charset="0"/>
+              </a:rPr>
+              <a:t>Investigation Steps</a:t>
+            </a:r>
+            <a:endParaRPr lang="en-US" sz="4800" dirty="0">
+              <a:latin typeface="Impact" panose="020B0806030902050204" pitchFamily="34" charset="0"/>
+            </a:endParaRPr>
           </a:p>
         </p:txBody>
       </p:sp>
@@ -16742,100 +17007,297 @@
             <a:spLocks noGrp="1"/>
           </p:cNvSpPr>
           <p:nvPr>
-            <p:ph sz="half" idx="1"/>
-          </p:nvPr>
-        </p:nvSpPr>
-        <p:spPr>
-          <a:xfrm>
-            <a:off x="354013" y="1293813"/>
-            <a:ext cx="3379787" cy="4768850"/>
-          </a:xfrm>
-        </p:spPr>
+            <p:ph idx="1"/>
+          </p:nvPr>
+        </p:nvSpPr>
+        <p:spPr/>
         <p:txBody>
           <a:bodyPr/>
           <a:lstStyle/>
           <a:p>
-            <a:pPr>
-              <a:buFont typeface="Wingdings" panose="05000000000000000000" pitchFamily="2" charset="2"/>
-              <a:buChar char="Ø"/>
+            <a:pPr marL="342900" indent="-342900">
+              <a:buFont typeface="+mj-lt"/>
+              <a:buAutoNum type="arabicPeriod"/>
             </a:pPr>
+            <a:r>
+              <a:rPr lang="en-US" sz="1600" dirty="0">
+                <a:latin typeface="Times New Roman" panose="02020603050405020304" pitchFamily="18" charset="0"/>
+                <a:cs typeface="Times New Roman" panose="02020603050405020304" pitchFamily="18" charset="0"/>
+              </a:rPr>
+              <a:t>After the Fraud alert comes to the On-Call phone forward that email to yourself in Outlook</a:t>
+            </a:r>
             <a:r>
               <a:rPr lang="en-US" sz="1600" dirty="0" smtClean="0">
                 <a:latin typeface="Times New Roman" panose="02020603050405020304" pitchFamily="18" charset="0"/>
                 <a:cs typeface="Times New Roman" panose="02020603050405020304" pitchFamily="18" charset="0"/>
               </a:rPr>
-              <a:t>Next you will need to bring up the call logs of the extension that set off the Alert. </a:t>
-            </a:r>
-          </a:p>
-          <a:p>
-            <a:pPr>
-              <a:buFont typeface="Wingdings" panose="05000000000000000000" pitchFamily="2" charset="2"/>
-              <a:buChar char="Ø"/>
+              <a:t>.</a:t>
+            </a:r>
+            <a:endParaRPr lang="en-US" sz="1600" dirty="0">
+              <a:latin typeface="Times New Roman" panose="02020603050405020304" pitchFamily="18" charset="0"/>
+              <a:cs typeface="Times New Roman" panose="02020603050405020304" pitchFamily="18" charset="0"/>
+            </a:endParaRPr>
+          </a:p>
+          <a:p>
+            <a:pPr marL="342900" indent="-342900">
+              <a:buFont typeface="+mj-lt"/>
+              <a:buAutoNum type="arabicPeriod"/>
             </a:pPr>
+            <a:r>
+              <a:rPr lang="en-US" sz="1600" dirty="0">
+                <a:latin typeface="Times New Roman" panose="02020603050405020304" pitchFamily="18" charset="0"/>
+                <a:cs typeface="Times New Roman" panose="02020603050405020304" pitchFamily="18" charset="0"/>
+              </a:rPr>
+              <a:t>From Outlook “Reply All” (Potential Fraud &amp; CCare On-Call 1) with “Investigating”. Make sure your reply includes your Outlook signature</a:t>
+            </a:r>
             <a:r>
               <a:rPr lang="en-US" sz="1600" dirty="0" smtClean="0">
                 <a:latin typeface="Times New Roman" panose="02020603050405020304" pitchFamily="18" charset="0"/>
                 <a:cs typeface="Times New Roman" panose="02020603050405020304" pitchFamily="18" charset="0"/>
               </a:rPr>
-              <a:t>Search the call logs for the destination number or the terminated number.</a:t>
-            </a:r>
-          </a:p>
-          <a:p>
-            <a:pPr>
-              <a:buFont typeface="Wingdings" panose="05000000000000000000" pitchFamily="2" charset="2"/>
-              <a:buChar char="Ø"/>
+              <a:t>.</a:t>
+            </a:r>
+            <a:endParaRPr lang="en-US" sz="1600" dirty="0">
+              <a:latin typeface="Times New Roman" panose="02020603050405020304" pitchFamily="18" charset="0"/>
+              <a:cs typeface="Times New Roman" panose="02020603050405020304" pitchFamily="18" charset="0"/>
+            </a:endParaRPr>
+          </a:p>
+          <a:p>
+            <a:pPr marL="342900" indent="-342900">
+              <a:buFont typeface="+mj-lt"/>
+              <a:buAutoNum type="arabicPeriod"/>
             </a:pPr>
+            <a:r>
+              <a:rPr lang="en-US" sz="1600" dirty="0">
+                <a:latin typeface="Times New Roman" panose="02020603050405020304" pitchFamily="18" charset="0"/>
+                <a:cs typeface="Times New Roman" panose="02020603050405020304" pitchFamily="18" charset="0"/>
+              </a:rPr>
+              <a:t>Check the Account and see if a ticket was created in Salesforce if not create one. Insure you change case owner to On-Call and place your name in the Tier 2 Rep field</a:t>
+            </a:r>
             <a:r>
               <a:rPr lang="en-US" sz="1600" dirty="0" smtClean="0">
                 <a:latin typeface="Times New Roman" panose="02020603050405020304" pitchFamily="18" charset="0"/>
                 <a:cs typeface="Times New Roman" panose="02020603050405020304" pitchFamily="18" charset="0"/>
               </a:rPr>
-              <a:t>Pay close attention to the amount of times the same number was called and the duration of those calls. </a:t>
-            </a:r>
-          </a:p>
-        </p:txBody>
-      </p:sp>
-      <p:pic>
-        <p:nvPicPr>
-          <p:cNvPr id="6" name="Content Placeholder 5"/>
-          <p:cNvPicPr>
-            <a:picLocks noGrp="1" noChangeAspect="1"/>
-          </p:cNvPicPr>
-          <p:nvPr>
-            <p:ph sz="half" idx="2"/>
-          </p:nvPr>
-        </p:nvPicPr>
-        <p:blipFill>
-          <a:blip r:embed="rId2" cstate="print">
-            <a:extLst>
-              <a:ext uri="{BEBA8EAE-BF5A-486C-A8C5-ECC9F3942E4B}">
-                <a14:imgProps xmlns:a14="http://schemas.microsoft.com/office/drawing/2010/main">
-                  <a14:imgLayer r:embed="rId3">
-                    <a14:imgEffect>
-                      <a14:sharpenSoften amount="50000"/>
-                    </a14:imgEffect>
-                  </a14:imgLayer>
-                </a14:imgProps>
-              </a:ext>
-              <a:ext uri="{28A0092B-C50C-407E-A947-70E740481C1C}">
-                <a14:useLocalDpi xmlns:a14="http://schemas.microsoft.com/office/drawing/2010/main" val="0"/>
-              </a:ext>
-            </a:extLst>
-          </a:blip>
-          <a:stretch>
-            <a:fillRect/>
-          </a:stretch>
-        </p:blipFill>
-        <p:spPr>
-          <a:xfrm>
-            <a:off x="3886200" y="1447799"/>
-            <a:ext cx="4908550" cy="4856181"/>
-          </a:xfrm>
-        </p:spPr>
-      </p:pic>
-      <p:sp>
-        <p:nvSpPr>
-          <p:cNvPr id="5" name="Slide Number Placeholder 4"/>
+              <a:t>.</a:t>
+            </a:r>
+            <a:endParaRPr lang="en-US" sz="1600" dirty="0">
+              <a:latin typeface="Times New Roman" panose="02020603050405020304" pitchFamily="18" charset="0"/>
+              <a:cs typeface="Times New Roman" panose="02020603050405020304" pitchFamily="18" charset="0"/>
+            </a:endParaRPr>
+          </a:p>
+          <a:p>
+            <a:pPr marL="342900" indent="-342900">
+              <a:buFont typeface="+mj-lt"/>
+              <a:buAutoNum type="arabicPeriod"/>
+            </a:pPr>
+            <a:r>
+              <a:rPr lang="en-US" sz="1600" dirty="0">
+                <a:latin typeface="Times New Roman" panose="02020603050405020304" pitchFamily="18" charset="0"/>
+                <a:cs typeface="Times New Roman" panose="02020603050405020304" pitchFamily="18" charset="0"/>
+              </a:rPr>
+              <a:t>Copy the </a:t>
+            </a:r>
+            <a:r>
+              <a:rPr lang="en-US" sz="1600" dirty="0" smtClean="0">
+                <a:latin typeface="Times New Roman" panose="02020603050405020304" pitchFamily="18" charset="0"/>
+                <a:cs typeface="Times New Roman" panose="02020603050405020304" pitchFamily="18" charset="0"/>
+              </a:rPr>
+              <a:t>message body of the </a:t>
+            </a:r>
+            <a:r>
+              <a:rPr lang="en-US" sz="1600" dirty="0">
+                <a:latin typeface="Times New Roman" panose="02020603050405020304" pitchFamily="18" charset="0"/>
+                <a:cs typeface="Times New Roman" panose="02020603050405020304" pitchFamily="18" charset="0"/>
+              </a:rPr>
+              <a:t>Alert and paste them into the Salesforce Description, be sure to include the type of Fraud Alert i.e.: Root, Domestic, Vonage, or Spending</a:t>
+            </a:r>
+            <a:r>
+              <a:rPr lang="en-US" sz="1600" dirty="0" smtClean="0">
+                <a:latin typeface="Times New Roman" panose="02020603050405020304" pitchFamily="18" charset="0"/>
+                <a:cs typeface="Times New Roman" panose="02020603050405020304" pitchFamily="18" charset="0"/>
+              </a:rPr>
+              <a:t>.</a:t>
+            </a:r>
+            <a:endParaRPr lang="en-US" sz="1600" dirty="0">
+              <a:latin typeface="Times New Roman" panose="02020603050405020304" pitchFamily="18" charset="0"/>
+              <a:cs typeface="Times New Roman" panose="02020603050405020304" pitchFamily="18" charset="0"/>
+            </a:endParaRPr>
+          </a:p>
+          <a:p>
+            <a:pPr marL="342900" indent="-342900">
+              <a:buFont typeface="+mj-lt"/>
+              <a:buAutoNum type="arabicPeriod"/>
+            </a:pPr>
+            <a:r>
+              <a:rPr lang="en-US" sz="1600" dirty="0">
+                <a:latin typeface="Times New Roman" panose="02020603050405020304" pitchFamily="18" charset="0"/>
+                <a:cs typeface="Times New Roman" panose="02020603050405020304" pitchFamily="18" charset="0"/>
+              </a:rPr>
+              <a:t>Thoroughly investigate the potential Fraud and make your determination whether it’s a False-Positive or Fraud</a:t>
+            </a:r>
+            <a:r>
+              <a:rPr lang="en-US" sz="1600" dirty="0" smtClean="0">
+                <a:latin typeface="Times New Roman" panose="02020603050405020304" pitchFamily="18" charset="0"/>
+                <a:cs typeface="Times New Roman" panose="02020603050405020304" pitchFamily="18" charset="0"/>
+              </a:rPr>
+              <a:t>.</a:t>
+            </a:r>
+            <a:endParaRPr lang="en-US" sz="1600" dirty="0">
+              <a:latin typeface="Times New Roman" panose="02020603050405020304" pitchFamily="18" charset="0"/>
+              <a:cs typeface="Times New Roman" panose="02020603050405020304" pitchFamily="18" charset="0"/>
+            </a:endParaRPr>
+          </a:p>
+          <a:p>
+            <a:pPr marL="342900" indent="-342900">
+              <a:buFont typeface="+mj-lt"/>
+              <a:buAutoNum type="arabicPeriod"/>
+            </a:pPr>
+            <a:r>
+              <a:rPr lang="en-US" sz="1600" dirty="0">
+                <a:latin typeface="Times New Roman" panose="02020603050405020304" pitchFamily="18" charset="0"/>
+                <a:cs typeface="Times New Roman" panose="02020603050405020304" pitchFamily="18" charset="0"/>
+              </a:rPr>
+              <a:t> From Outlook “Reply All” to the Alert with your investigation notes. (see examples below</a:t>
+            </a:r>
+            <a:r>
+              <a:rPr lang="en-US" sz="1600" dirty="0" smtClean="0">
+                <a:latin typeface="Times New Roman" panose="02020603050405020304" pitchFamily="18" charset="0"/>
+                <a:cs typeface="Times New Roman" panose="02020603050405020304" pitchFamily="18" charset="0"/>
+              </a:rPr>
+              <a:t>)</a:t>
+            </a:r>
+            <a:endParaRPr lang="en-US" sz="1600" dirty="0">
+              <a:latin typeface="Times New Roman" panose="02020603050405020304" pitchFamily="18" charset="0"/>
+              <a:cs typeface="Times New Roman" panose="02020603050405020304" pitchFamily="18" charset="0"/>
+            </a:endParaRPr>
+          </a:p>
+          <a:p>
+            <a:pPr marL="342900" indent="-342900">
+              <a:buFont typeface="+mj-lt"/>
+              <a:buAutoNum type="arabicPeriod"/>
+            </a:pPr>
+            <a:r>
+              <a:rPr lang="en-US" sz="1600" dirty="0">
+                <a:latin typeface="Times New Roman" panose="02020603050405020304" pitchFamily="18" charset="0"/>
+                <a:cs typeface="Times New Roman" panose="02020603050405020304" pitchFamily="18" charset="0"/>
+              </a:rPr>
+              <a:t>Update your salesforce ticket with your investigation notes in the “Log Call” section change Problem </a:t>
+            </a:r>
+            <a:r>
+              <a:rPr lang="en-US" sz="1600" dirty="0" smtClean="0">
+                <a:latin typeface="Times New Roman" panose="02020603050405020304" pitchFamily="18" charset="0"/>
+                <a:cs typeface="Times New Roman" panose="02020603050405020304" pitchFamily="18" charset="0"/>
+              </a:rPr>
+              <a:t>Code to “Fraud Alert” and Problem Code II to reflect </a:t>
+            </a:r>
+            <a:r>
+              <a:rPr lang="en-US" sz="1600" dirty="0">
+                <a:latin typeface="Times New Roman" panose="02020603050405020304" pitchFamily="18" charset="0"/>
+                <a:cs typeface="Times New Roman" panose="02020603050405020304" pitchFamily="18" charset="0"/>
+              </a:rPr>
+              <a:t>False-Positive or Fraud. Make sure case owner is set to On-Call and your name is in the Tier 2 Rep field or you will not be paid</a:t>
+            </a:r>
+            <a:r>
+              <a:rPr lang="en-US" sz="1600" dirty="0" smtClean="0">
+                <a:latin typeface="Times New Roman" panose="02020603050405020304" pitchFamily="18" charset="0"/>
+                <a:cs typeface="Times New Roman" panose="02020603050405020304" pitchFamily="18" charset="0"/>
+              </a:rPr>
+              <a:t>.</a:t>
+            </a:r>
+            <a:endParaRPr lang="en-US" sz="1600" dirty="0">
+              <a:latin typeface="Times New Roman" panose="02020603050405020304" pitchFamily="18" charset="0"/>
+              <a:cs typeface="Times New Roman" panose="02020603050405020304" pitchFamily="18" charset="0"/>
+            </a:endParaRPr>
+          </a:p>
+          <a:p>
+            <a:pPr marL="342900" indent="-342900">
+              <a:buFont typeface="+mj-lt"/>
+              <a:buAutoNum type="arabicPeriod"/>
+            </a:pPr>
+            <a:r>
+              <a:rPr lang="en-US" sz="1600" dirty="0">
+                <a:latin typeface="Times New Roman" panose="02020603050405020304" pitchFamily="18" charset="0"/>
+                <a:cs typeface="Times New Roman" panose="02020603050405020304" pitchFamily="18" charset="0"/>
+              </a:rPr>
+              <a:t>Close Ticket “Resolved</a:t>
+            </a:r>
+            <a:r>
+              <a:rPr lang="en-US" sz="1600" dirty="0" smtClean="0">
+                <a:latin typeface="Times New Roman" panose="02020603050405020304" pitchFamily="18" charset="0"/>
+                <a:cs typeface="Times New Roman" panose="02020603050405020304" pitchFamily="18" charset="0"/>
+              </a:rPr>
+              <a:t>”</a:t>
+            </a:r>
+            <a:endParaRPr lang="en-US" sz="1600" dirty="0">
+              <a:latin typeface="Times New Roman" panose="02020603050405020304" pitchFamily="18" charset="0"/>
+              <a:cs typeface="Times New Roman" panose="02020603050405020304" pitchFamily="18" charset="0"/>
+            </a:endParaRPr>
+          </a:p>
+          <a:p>
+            <a:pPr marL="342900" indent="-342900">
+              <a:buFont typeface="+mj-lt"/>
+              <a:buAutoNum type="arabicPeriod"/>
+            </a:pPr>
+            <a:r>
+              <a:rPr lang="en-US" sz="1600" dirty="0" smtClean="0">
+                <a:latin typeface="Times New Roman" panose="02020603050405020304" pitchFamily="18" charset="0"/>
+                <a:cs typeface="Times New Roman" panose="02020603050405020304" pitchFamily="18" charset="0"/>
+              </a:rPr>
+              <a:t>Send an </a:t>
+            </a:r>
+            <a:r>
+              <a:rPr lang="en-US" sz="1600" dirty="0">
+                <a:latin typeface="Times New Roman" panose="02020603050405020304" pitchFamily="18" charset="0"/>
+                <a:cs typeface="Times New Roman" panose="02020603050405020304" pitchFamily="18" charset="0"/>
+              </a:rPr>
+              <a:t>email to </a:t>
+            </a:r>
+            <a:r>
+              <a:rPr lang="en-US" sz="1600" dirty="0" smtClean="0">
+                <a:latin typeface="Times New Roman" panose="02020603050405020304" pitchFamily="18" charset="0"/>
+                <a:cs typeface="Times New Roman" panose="02020603050405020304" pitchFamily="18" charset="0"/>
+                <a:hlinkClick r:id="rId2"/>
+              </a:rPr>
+              <a:t>FraudandAbuseTeam-vb@vonage.com</a:t>
+            </a:r>
+            <a:r>
+              <a:rPr lang="en-US" sz="1600" dirty="0" smtClean="0">
+                <a:latin typeface="Times New Roman" panose="02020603050405020304" pitchFamily="18" charset="0"/>
+                <a:cs typeface="Times New Roman" panose="02020603050405020304" pitchFamily="18" charset="0"/>
+              </a:rPr>
+              <a:t> for </a:t>
+            </a:r>
+            <a:r>
+              <a:rPr lang="en-US" sz="1600" dirty="0">
+                <a:latin typeface="Times New Roman" panose="02020603050405020304" pitchFamily="18" charset="0"/>
+                <a:cs typeface="Times New Roman" panose="02020603050405020304" pitchFamily="18" charset="0"/>
+              </a:rPr>
+              <a:t>any actual Frauds </a:t>
+            </a:r>
+            <a:r>
+              <a:rPr lang="en-US" sz="1600" dirty="0" smtClean="0">
+                <a:latin typeface="Times New Roman" panose="02020603050405020304" pitchFamily="18" charset="0"/>
+                <a:cs typeface="Times New Roman" panose="02020603050405020304" pitchFamily="18" charset="0"/>
+              </a:rPr>
+              <a:t>at the </a:t>
+            </a:r>
+            <a:r>
+              <a:rPr lang="en-US" sz="1600" dirty="0">
+                <a:latin typeface="Times New Roman" panose="02020603050405020304" pitchFamily="18" charset="0"/>
+                <a:cs typeface="Times New Roman" panose="02020603050405020304" pitchFamily="18" charset="0"/>
+              </a:rPr>
+              <a:t>next day so the total charges can be calculated.</a:t>
+            </a:r>
+          </a:p>
+          <a:p>
+            <a:endParaRPr lang="en-US" dirty="0"/>
+          </a:p>
+        </p:txBody>
+      </p:sp>
+      <p:sp>
+        <p:nvSpPr>
+          <p:cNvPr id="4" name="Slide Number Placeholder 3"/>
           <p:cNvSpPr>
             <a:spLocks noGrp="1"/>
           </p:cNvSpPr>
@@ -16848,19 +17310,32 @@
           <a:bodyPr/>
           <a:lstStyle/>
           <a:p>
-            <a:fld id="{71BC9C40-ACDD-4696-8BAF-E1591320CFED}" type="slidenum">
-              <a:rPr lang="en-US" smtClean="0"/>
-              <a:pPr/>
+            <a:pPr>
+              <a:defRPr/>
+            </a:pPr>
+            <a:fld id="{16514749-0C09-4910-A1F5-A5A3B603506F}" type="slidenum">
+              <a:rPr lang="en-US" smtClean="0">
+                <a:solidFill>
+                  <a:srgbClr val="FFFFFF"/>
+                </a:solidFill>
+              </a:rPr>
+              <a:pPr>
+                <a:defRPr/>
+              </a:pPr>
               <a:t>8</a:t>
             </a:fld>
-            <a:endParaRPr lang="en-US"/>
+            <a:endParaRPr lang="en-US">
+              <a:solidFill>
+                <a:srgbClr val="FFFFFF"/>
+              </a:solidFill>
+            </a:endParaRPr>
           </a:p>
         </p:txBody>
       </p:sp>
     </p:spTree>
     <p:extLst>
       <p:ext uri="{BB962C8B-B14F-4D97-AF65-F5344CB8AC3E}">
-        <p14:creationId xmlns:p14="http://schemas.microsoft.com/office/powerpoint/2010/main" val="3065735914"/>
+        <p14:creationId xmlns:p14="http://schemas.microsoft.com/office/powerpoint/2010/main" val="3464281621"/>
       </p:ext>
     </p:extLst>
   </p:cSld>
@@ -16896,7 +17371,7 @@
       </p:grpSpPr>
       <p:sp>
         <p:nvSpPr>
-          <p:cNvPr id="2" name="Title 1"/>
+          <p:cNvPr id="6" name="Title 5"/>
           <p:cNvSpPr>
             <a:spLocks noGrp="1"/>
           </p:cNvSpPr>
@@ -16910,15 +17385,16 @@
           <a:lstStyle/>
           <a:p>
             <a:r>
-              <a:rPr lang="en-US" dirty="0"/>
-              <a:t>Investigation continued …</a:t>
-            </a:r>
-          </a:p>
-        </p:txBody>
-      </p:sp>
-      <p:sp>
-        <p:nvSpPr>
-          <p:cNvPr id="3" name="Content Placeholder 2"/>
+              <a:rPr lang="en-US" dirty="0" smtClean="0"/>
+              <a:t>Begin Your Investigation </a:t>
+            </a:r>
+            <a:endParaRPr lang="en-US" dirty="0"/>
+          </a:p>
+        </p:txBody>
+      </p:sp>
+      <p:sp>
+        <p:nvSpPr>
+          <p:cNvPr id="7" name="Content Placeholder 6"/>
           <p:cNvSpPr>
             <a:spLocks noGrp="1"/>
           </p:cNvSpPr>
@@ -16928,8 +17404,8 @@
         </p:nvSpPr>
         <p:spPr>
           <a:xfrm>
-            <a:off x="354013" y="1293813"/>
-            <a:ext cx="3151187" cy="4768850"/>
+            <a:off x="381001" y="1371600"/>
+            <a:ext cx="3505199" cy="4768850"/>
           </a:xfrm>
         </p:spPr>
         <p:txBody>
@@ -16941,11 +17417,8 @@
               <a:buChar char="Ø"/>
             </a:pPr>
             <a:r>
-              <a:rPr lang="en-US" sz="1600" dirty="0" smtClean="0">
-                <a:latin typeface="Times New Roman" panose="02020603050405020304" pitchFamily="18" charset="0"/>
-                <a:cs typeface="Times New Roman" panose="02020603050405020304" pitchFamily="18" charset="0"/>
-              </a:rPr>
-              <a:t>Your next step is to bring up the log analyzer for the last call</a:t>
+              <a:rPr lang="en-US" sz="1600" dirty="0" smtClean="0"/>
+              <a:t>You will begin you investigation by looking at the account registration page.</a:t>
             </a:r>
           </a:p>
           <a:p>
@@ -16954,11 +17427,16 @@
               <a:buChar char="Ø"/>
             </a:pPr>
             <a:r>
-              <a:rPr lang="en-US" sz="1600" dirty="0" smtClean="0">
-                <a:latin typeface="Times New Roman" panose="02020603050405020304" pitchFamily="18" charset="0"/>
-                <a:cs typeface="Times New Roman" panose="02020603050405020304" pitchFamily="18" charset="0"/>
-              </a:rPr>
-              <a:t> The Information you will need from here will be the Initiator User Agent which will tell you the device that place the calls, and the Initiator Address which will tell you from where the device was when the calls were placed</a:t>
+              <a:rPr lang="en-US" sz="1600" dirty="0" smtClean="0"/>
+              <a:t>Compare the IP </a:t>
+            </a:r>
+            <a:r>
+              <a:rPr lang="en-US" sz="1600" dirty="0" smtClean="0"/>
+              <a:t>addresses of </a:t>
+            </a:r>
+            <a:r>
+              <a:rPr lang="en-US" sz="1600" dirty="0" smtClean="0"/>
+              <a:t>the registered devices with the alert.</a:t>
             </a:r>
           </a:p>
           <a:p>
@@ -16967,22 +17445,15 @@
               <a:buChar char="Ø"/>
             </a:pPr>
             <a:r>
-              <a:rPr lang="en-US" sz="1600" dirty="0" smtClean="0">
-                <a:latin typeface="Times New Roman" panose="02020603050405020304" pitchFamily="18" charset="0"/>
-                <a:cs typeface="Times New Roman" panose="02020603050405020304" pitchFamily="18" charset="0"/>
-              </a:rPr>
-              <a:t>Make sure this information is copied and pasted as per the Fraud Template</a:t>
-            </a:r>
-            <a:endParaRPr lang="en-US" sz="1600" dirty="0">
-              <a:latin typeface="Times New Roman" panose="02020603050405020304" pitchFamily="18" charset="0"/>
-              <a:cs typeface="Times New Roman" panose="02020603050405020304" pitchFamily="18" charset="0"/>
-            </a:endParaRPr>
-          </a:p>
-        </p:txBody>
-      </p:sp>
-      <p:sp>
-        <p:nvSpPr>
-          <p:cNvPr id="5" name="Slide Number Placeholder 4"/>
+              <a:rPr lang="en-US" sz="1600" dirty="0" smtClean="0"/>
+              <a:t>Look for duplicate SIP IDs and suspicious devices</a:t>
+            </a:r>
+          </a:p>
+        </p:txBody>
+      </p:sp>
+      <p:sp>
+        <p:nvSpPr>
+          <p:cNvPr id="4" name="Slide Number Placeholder 3"/>
           <p:cNvSpPr>
             <a:spLocks noGrp="1"/>
           </p:cNvSpPr>
@@ -16995,18 +17466,31 @@
           <a:bodyPr/>
           <a:lstStyle/>
           <a:p>
-            <a:fld id="{71BC9C40-ACDD-4696-8BAF-E1591320CFED}" type="slidenum">
-              <a:rPr lang="en-US" smtClean="0"/>
-              <a:pPr/>
+            <a:pPr>
+              <a:defRPr/>
+            </a:pPr>
+            <a:fld id="{D3208C8F-5341-4944-8C08-C55337151DB1}" type="slidenum">
+              <a:rPr lang="en-US" smtClean="0">
+                <a:solidFill>
+                  <a:srgbClr val="FFFFFF"/>
+                </a:solidFill>
+              </a:rPr>
+              <a:pPr>
+                <a:defRPr/>
+              </a:pPr>
               <a:t>9</a:t>
             </a:fld>
-            <a:endParaRPr lang="en-US"/>
+            <a:endParaRPr lang="en-US" dirty="0">
+              <a:solidFill>
+                <a:srgbClr val="FFFFFF"/>
+              </a:solidFill>
+            </a:endParaRPr>
           </a:p>
         </p:txBody>
       </p:sp>
       <p:pic>
         <p:nvPicPr>
-          <p:cNvPr id="8" name="Content Placeholder 7"/>
+          <p:cNvPr id="14" name="Content Placeholder 13"/>
           <p:cNvPicPr>
             <a:picLocks noGrp="1" noChangeAspect="1"/>
           </p:cNvPicPr>
@@ -17037,16 +17521,15 @@
         </p:blipFill>
         <p:spPr>
           <a:xfrm>
-            <a:off x="3657600" y="1447800"/>
-            <a:ext cx="5130538" cy="4876800"/>
+            <a:off x="3886200" y="1447800"/>
+            <a:ext cx="4908550" cy="4724399"/>
           </a:xfrm>
-          <a:noFill/>
         </p:spPr>
       </p:pic>
     </p:spTree>
     <p:extLst>
       <p:ext uri="{BB962C8B-B14F-4D97-AF65-F5344CB8AC3E}">
-        <p14:creationId xmlns:p14="http://schemas.microsoft.com/office/powerpoint/2010/main" val="2871853853"/>
+        <p14:creationId xmlns:p14="http://schemas.microsoft.com/office/powerpoint/2010/main" val="1031350540"/>
       </p:ext>
     </p:extLst>
   </p:cSld>

</xml_diff>

<commit_message>
Updated types of fraud, added fraud template page
</commit_message>
<xml_diff>
--- a/On-CallFraudProcedures.pptx
+++ b/On-CallFraudProcedures.pptx
@@ -8,7 +8,7 @@
     <p:sldMasterId id="2147483703" r:id="rId4"/>
   </p:sldMasterIdLst>
   <p:notesMasterIdLst>
-    <p:notesMasterId r:id="rId19"/>
+    <p:notesMasterId r:id="rId20"/>
   </p:notesMasterIdLst>
   <p:sldIdLst>
     <p:sldId id="275" r:id="rId5"/>
@@ -18,18 +18,19 @@
     <p:sldId id="295" r:id="rId9"/>
     <p:sldId id="296" r:id="rId10"/>
     <p:sldId id="297" r:id="rId11"/>
-    <p:sldId id="285" r:id="rId12"/>
-    <p:sldId id="288" r:id="rId13"/>
-    <p:sldId id="289" r:id="rId14"/>
-    <p:sldId id="290" r:id="rId15"/>
-    <p:sldId id="291" r:id="rId16"/>
-    <p:sldId id="292" r:id="rId17"/>
-    <p:sldId id="293" r:id="rId18"/>
+    <p:sldId id="298" r:id="rId12"/>
+    <p:sldId id="285" r:id="rId13"/>
+    <p:sldId id="288" r:id="rId14"/>
+    <p:sldId id="289" r:id="rId15"/>
+    <p:sldId id="290" r:id="rId16"/>
+    <p:sldId id="291" r:id="rId17"/>
+    <p:sldId id="292" r:id="rId18"/>
+    <p:sldId id="293" r:id="rId19"/>
   </p:sldIdLst>
   <p:sldSz cx="9144000" cy="6858000" type="screen4x3"/>
   <p:notesSz cx="7010400" cy="9296400"/>
   <p:custDataLst>
-    <p:tags r:id="rId20"/>
+    <p:tags r:id="rId21"/>
   </p:custDataLst>
   <p:defaultTextStyle>
     <a:defPPr>
@@ -14755,7 +14756,7 @@
       </p:grpSpPr>
       <p:sp>
         <p:nvSpPr>
-          <p:cNvPr id="2" name="Title 1"/>
+          <p:cNvPr id="6" name="Title 5"/>
           <p:cNvSpPr>
             <a:spLocks noGrp="1"/>
           </p:cNvSpPr>
@@ -14770,7 +14771,7 @@
           <a:p>
             <a:r>
               <a:rPr lang="en-US" dirty="0" smtClean="0"/>
-              <a:t>Investigation continued …</a:t>
+              <a:t>Begin Your Investigation </a:t>
             </a:r>
             <a:endParaRPr lang="en-US" dirty="0"/>
           </a:p>
@@ -14778,7 +14779,7 @@
       </p:sp>
       <p:sp>
         <p:nvSpPr>
-          <p:cNvPr id="3" name="Content Placeholder 2"/>
+          <p:cNvPr id="7" name="Content Placeholder 6"/>
           <p:cNvSpPr>
             <a:spLocks noGrp="1"/>
           </p:cNvSpPr>
@@ -14788,8 +14789,8 @@
         </p:nvSpPr>
         <p:spPr>
           <a:xfrm>
-            <a:off x="354013" y="1293813"/>
-            <a:ext cx="3379787" cy="4768850"/>
+            <a:off x="381001" y="1371600"/>
+            <a:ext cx="3505199" cy="4768850"/>
           </a:xfrm>
         </p:spPr>
         <p:txBody>
@@ -14801,11 +14802,8 @@
               <a:buChar char="Ø"/>
             </a:pPr>
             <a:r>
-              <a:rPr lang="en-US" sz="1600" dirty="0" smtClean="0">
-                <a:latin typeface="Times New Roman" panose="02020603050405020304" pitchFamily="18" charset="0"/>
-                <a:cs typeface="Times New Roman" panose="02020603050405020304" pitchFamily="18" charset="0"/>
-              </a:rPr>
-              <a:t>Next you will need to bring up the call logs of the extension that set off the Alert. </a:t>
+              <a:rPr lang="en-US" sz="1600" dirty="0" smtClean="0"/>
+              <a:t>You will begin you investigation by looking at the account registration page.</a:t>
             </a:r>
           </a:p>
           <a:p>
@@ -14814,12 +14812,14 @@
               <a:buChar char="Ø"/>
             </a:pPr>
             <a:r>
-              <a:rPr lang="en-US" sz="1600" dirty="0" smtClean="0">
-                <a:latin typeface="Times New Roman" panose="02020603050405020304" pitchFamily="18" charset="0"/>
-                <a:cs typeface="Times New Roman" panose="02020603050405020304" pitchFamily="18" charset="0"/>
-              </a:rPr>
-              <a:t>Search the call logs for the destination number or the terminated number.</a:t>
-            </a:r>
+              <a:rPr lang="en-US" sz="1600" dirty="0" smtClean="0"/>
+              <a:t>Compare the IP addresses of the registered devices with the alert</a:t>
+            </a:r>
+            <a:r>
+              <a:rPr lang="en-US" sz="1600" dirty="0" smtClean="0"/>
+              <a:t>.</a:t>
+            </a:r>
+            <a:endParaRPr lang="en-US" sz="1600" dirty="0" smtClean="0"/>
           </a:p>
           <a:p>
             <a:pPr>
@@ -14827,18 +14827,52 @@
               <a:buChar char="Ø"/>
             </a:pPr>
             <a:r>
-              <a:rPr lang="en-US" sz="1600" dirty="0" smtClean="0">
-                <a:latin typeface="Times New Roman" panose="02020603050405020304" pitchFamily="18" charset="0"/>
-                <a:cs typeface="Times New Roman" panose="02020603050405020304" pitchFamily="18" charset="0"/>
+              <a:rPr lang="en-US" sz="1600" dirty="0" smtClean="0"/>
+              <a:t>Look for duplicate SIP IDs and suspicious devices</a:t>
+            </a:r>
+          </a:p>
+        </p:txBody>
+      </p:sp>
+      <p:sp>
+        <p:nvSpPr>
+          <p:cNvPr id="4" name="Slide Number Placeholder 3"/>
+          <p:cNvSpPr>
+            <a:spLocks noGrp="1"/>
+          </p:cNvSpPr>
+          <p:nvPr>
+            <p:ph type="sldNum" sz="quarter" idx="10"/>
+          </p:nvPr>
+        </p:nvSpPr>
+        <p:spPr/>
+        <p:txBody>
+          <a:bodyPr/>
+          <a:lstStyle/>
+          <a:p>
+            <a:pPr>
+              <a:defRPr/>
+            </a:pPr>
+            <a:fld id="{D3208C8F-5341-4944-8C08-C55337151DB1}" type="slidenum">
+              <a:rPr lang="en-US" smtClean="0">
+                <a:solidFill>
+                  <a:srgbClr val="FFFFFF"/>
+                </a:solidFill>
               </a:rPr>
-              <a:t>Pay close attention to the amount of times the same number was called and the duration of those calls. </a:t>
-            </a:r>
+              <a:pPr>
+                <a:defRPr/>
+              </a:pPr>
+              <a:t>10</a:t>
+            </a:fld>
+            <a:endParaRPr lang="en-US" dirty="0">
+              <a:solidFill>
+                <a:srgbClr val="FFFFFF"/>
+              </a:solidFill>
+            </a:endParaRPr>
           </a:p>
         </p:txBody>
       </p:sp>
       <p:pic>
         <p:nvPicPr>
-          <p:cNvPr id="6" name="Content Placeholder 5"/>
+          <p:cNvPr id="14" name="Content Placeholder 13"/>
           <p:cNvPicPr>
             <a:picLocks noGrp="1" noChangeAspect="1"/>
           </p:cNvPicPr>
@@ -14869,39 +14903,15 @@
         </p:blipFill>
         <p:spPr>
           <a:xfrm>
-            <a:off x="3886200" y="1447799"/>
-            <a:ext cx="4908550" cy="4856181"/>
+            <a:off x="3886200" y="1447800"/>
+            <a:ext cx="4908550" cy="4724399"/>
           </a:xfrm>
         </p:spPr>
       </p:pic>
-      <p:sp>
-        <p:nvSpPr>
-          <p:cNvPr id="5" name="Slide Number Placeholder 4"/>
-          <p:cNvSpPr>
-            <a:spLocks noGrp="1"/>
-          </p:cNvSpPr>
-          <p:nvPr>
-            <p:ph type="sldNum" sz="quarter" idx="10"/>
-          </p:nvPr>
-        </p:nvSpPr>
-        <p:spPr/>
-        <p:txBody>
-          <a:bodyPr/>
-          <a:lstStyle/>
-          <a:p>
-            <a:fld id="{71BC9C40-ACDD-4696-8BAF-E1591320CFED}" type="slidenum">
-              <a:rPr lang="en-US" smtClean="0"/>
-              <a:pPr/>
-              <a:t>10</a:t>
-            </a:fld>
-            <a:endParaRPr lang="en-US"/>
-          </a:p>
-        </p:txBody>
-      </p:sp>
     </p:spTree>
     <p:extLst>
       <p:ext uri="{BB962C8B-B14F-4D97-AF65-F5344CB8AC3E}">
-        <p14:creationId xmlns:p14="http://schemas.microsoft.com/office/powerpoint/2010/main" val="3065735914"/>
+        <p14:creationId xmlns:p14="http://schemas.microsoft.com/office/powerpoint/2010/main" val="1031350540"/>
       </p:ext>
     </p:extLst>
   </p:cSld>
@@ -14951,9 +14961,10 @@
           <a:lstStyle/>
           <a:p>
             <a:r>
-              <a:rPr lang="en-US" dirty="0"/>
+              <a:rPr lang="en-US" dirty="0" smtClean="0"/>
               <a:t>Investigation continued …</a:t>
             </a:r>
+            <a:endParaRPr lang="en-US" dirty="0"/>
           </a:p>
         </p:txBody>
       </p:sp>
@@ -14970,7 +14981,7 @@
         <p:spPr>
           <a:xfrm>
             <a:off x="354013" y="1293813"/>
-            <a:ext cx="3151187" cy="4768850"/>
+            <a:ext cx="3379787" cy="4768850"/>
           </a:xfrm>
         </p:spPr>
         <p:txBody>
@@ -14986,7 +14997,7 @@
                 <a:latin typeface="Times New Roman" panose="02020603050405020304" pitchFamily="18" charset="0"/>
                 <a:cs typeface="Times New Roman" panose="02020603050405020304" pitchFamily="18" charset="0"/>
               </a:rPr>
-              <a:t>Your next step is to bring up the log analyzer for the last call</a:t>
+              <a:t>Next you will need to bring up the call logs of the extension that set off the Alert. </a:t>
             </a:r>
           </a:p>
           <a:p>
@@ -14999,7 +15010,7 @@
                 <a:latin typeface="Times New Roman" panose="02020603050405020304" pitchFamily="18" charset="0"/>
                 <a:cs typeface="Times New Roman" panose="02020603050405020304" pitchFamily="18" charset="0"/>
               </a:rPr>
-              <a:t> The Information you will need from here will be the Initiator User Agent which will tell you the device that place the calls, and the Initiator Address which will tell you from where the device was when the calls were placed</a:t>
+              <a:t>Search the call logs for the destination number or the terminated number.</a:t>
             </a:r>
           </a:p>
           <a:p>
@@ -15012,42 +15023,14 @@
                 <a:latin typeface="Times New Roman" panose="02020603050405020304" pitchFamily="18" charset="0"/>
                 <a:cs typeface="Times New Roman" panose="02020603050405020304" pitchFamily="18" charset="0"/>
               </a:rPr>
-              <a:t>Make sure this information is copied and pasted as per the Fraud Template</a:t>
-            </a:r>
-            <a:endParaRPr lang="en-US" sz="1600" dirty="0">
-              <a:latin typeface="Times New Roman" panose="02020603050405020304" pitchFamily="18" charset="0"/>
-              <a:cs typeface="Times New Roman" panose="02020603050405020304" pitchFamily="18" charset="0"/>
-            </a:endParaRPr>
-          </a:p>
-        </p:txBody>
-      </p:sp>
-      <p:sp>
-        <p:nvSpPr>
-          <p:cNvPr id="5" name="Slide Number Placeholder 4"/>
-          <p:cNvSpPr>
-            <a:spLocks noGrp="1"/>
-          </p:cNvSpPr>
-          <p:nvPr>
-            <p:ph type="sldNum" sz="quarter" idx="10"/>
-          </p:nvPr>
-        </p:nvSpPr>
-        <p:spPr/>
-        <p:txBody>
-          <a:bodyPr/>
-          <a:lstStyle/>
-          <a:p>
-            <a:fld id="{71BC9C40-ACDD-4696-8BAF-E1591320CFED}" type="slidenum">
-              <a:rPr lang="en-US" smtClean="0"/>
-              <a:pPr/>
-              <a:t>11</a:t>
-            </a:fld>
-            <a:endParaRPr lang="en-US"/>
+              <a:t>Pay close attention to the amount of times the same number was called and the duration of those calls. </a:t>
+            </a:r>
           </a:p>
         </p:txBody>
       </p:sp>
       <p:pic>
         <p:nvPicPr>
-          <p:cNvPr id="8" name="Content Placeholder 7"/>
+          <p:cNvPr id="6" name="Content Placeholder 5"/>
           <p:cNvPicPr>
             <a:picLocks noGrp="1" noChangeAspect="1"/>
           </p:cNvPicPr>
@@ -15078,16 +15061,39 @@
         </p:blipFill>
         <p:spPr>
           <a:xfrm>
-            <a:off x="3657600" y="1447800"/>
-            <a:ext cx="5130538" cy="4876800"/>
+            <a:off x="3886200" y="1447799"/>
+            <a:ext cx="4908550" cy="4856181"/>
           </a:xfrm>
-          <a:noFill/>
         </p:spPr>
       </p:pic>
+      <p:sp>
+        <p:nvSpPr>
+          <p:cNvPr id="5" name="Slide Number Placeholder 4"/>
+          <p:cNvSpPr>
+            <a:spLocks noGrp="1"/>
+          </p:cNvSpPr>
+          <p:nvPr>
+            <p:ph type="sldNum" sz="quarter" idx="10"/>
+          </p:nvPr>
+        </p:nvSpPr>
+        <p:spPr/>
+        <p:txBody>
+          <a:bodyPr/>
+          <a:lstStyle/>
+          <a:p>
+            <a:fld id="{71BC9C40-ACDD-4696-8BAF-E1591320CFED}" type="slidenum">
+              <a:rPr lang="en-US" smtClean="0"/>
+              <a:pPr/>
+              <a:t>11</a:t>
+            </a:fld>
+            <a:endParaRPr lang="en-US"/>
+          </a:p>
+        </p:txBody>
+      </p:sp>
     </p:spTree>
     <p:extLst>
       <p:ext uri="{BB962C8B-B14F-4D97-AF65-F5344CB8AC3E}">
-        <p14:creationId xmlns:p14="http://schemas.microsoft.com/office/powerpoint/2010/main" val="2871853853"/>
+        <p14:creationId xmlns:p14="http://schemas.microsoft.com/office/powerpoint/2010/main" val="3065735914"/>
       </p:ext>
     </p:extLst>
   </p:cSld>
@@ -15145,7 +15151,7 @@
       </p:sp>
       <p:sp>
         <p:nvSpPr>
-          <p:cNvPr id="6" name="Content Placeholder 5"/>
+          <p:cNvPr id="3" name="Content Placeholder 2"/>
           <p:cNvSpPr>
             <a:spLocks noGrp="1"/>
           </p:cNvSpPr>
@@ -15153,7 +15159,12 @@
             <p:ph sz="half" idx="1"/>
           </p:nvPr>
         </p:nvSpPr>
-        <p:spPr/>
+        <p:spPr>
+          <a:xfrm>
+            <a:off x="354013" y="1293813"/>
+            <a:ext cx="3151187" cy="4768850"/>
+          </a:xfrm>
+        </p:spPr>
         <p:txBody>
           <a:bodyPr/>
           <a:lstStyle/>
@@ -15167,100 +15178,98 @@
                 <a:latin typeface="Times New Roman" panose="02020603050405020304" pitchFamily="18" charset="0"/>
                 <a:cs typeface="Times New Roman" panose="02020603050405020304" pitchFamily="18" charset="0"/>
               </a:rPr>
-              <a:t>Use a IP address look up tool (like infosniper.net) to look up the IP address of the </a:t>
-            </a:r>
-            <a:r>
-              <a:rPr lang="en-US" sz="1600" dirty="0">
-                <a:latin typeface="Times New Roman" panose="02020603050405020304" pitchFamily="18" charset="0"/>
-                <a:cs typeface="Times New Roman" panose="02020603050405020304" pitchFamily="18" charset="0"/>
-              </a:rPr>
-              <a:t>Initiator User </a:t>
+              <a:t>Your next step is to bring up the log analyzer for the </a:t>
             </a:r>
             <a:r>
               <a:rPr lang="en-US" sz="1600" dirty="0" smtClean="0">
                 <a:latin typeface="Times New Roman" panose="02020603050405020304" pitchFamily="18" charset="0"/>
                 <a:cs typeface="Times New Roman" panose="02020603050405020304" pitchFamily="18" charset="0"/>
               </a:rPr>
-              <a:t>Agent pay close attention to where these calls were place from. </a:t>
-            </a:r>
+              <a:t>call triggering the alert</a:t>
+            </a:r>
+            <a:endParaRPr lang="en-US" sz="1600" dirty="0" smtClean="0">
+              <a:latin typeface="Times New Roman" panose="02020603050405020304" pitchFamily="18" charset="0"/>
+              <a:cs typeface="Times New Roman" panose="02020603050405020304" pitchFamily="18" charset="0"/>
+            </a:endParaRPr>
           </a:p>
           <a:p>
             <a:pPr>
               <a:buFont typeface="Wingdings" panose="05000000000000000000" pitchFamily="2" charset="2"/>
               <a:buChar char="Ø"/>
             </a:pPr>
-            <a:endParaRPr lang="en-US" sz="1600" dirty="0" smtClean="0">
-              <a:latin typeface="Times New Roman" panose="02020603050405020304" pitchFamily="18" charset="0"/>
-              <a:cs typeface="Times New Roman" panose="02020603050405020304" pitchFamily="18" charset="0"/>
-            </a:endParaRPr>
+            <a:r>
+              <a:rPr lang="en-US" sz="1600" dirty="0" smtClean="0">
+                <a:latin typeface="Times New Roman" panose="02020603050405020304" pitchFamily="18" charset="0"/>
+                <a:cs typeface="Times New Roman" panose="02020603050405020304" pitchFamily="18" charset="0"/>
+              </a:rPr>
+              <a:t> </a:t>
+            </a:r>
+            <a:r>
+              <a:rPr lang="en-US" sz="1600" dirty="0" smtClean="0">
+                <a:latin typeface="Times New Roman" panose="02020603050405020304" pitchFamily="18" charset="0"/>
+                <a:cs typeface="Times New Roman" panose="02020603050405020304" pitchFamily="18" charset="0"/>
+              </a:rPr>
+              <a:t>Make note of the User Agent </a:t>
+            </a:r>
+            <a:r>
+              <a:rPr lang="en-US" sz="1600" dirty="0" smtClean="0">
+                <a:latin typeface="Times New Roman" panose="02020603050405020304" pitchFamily="18" charset="0"/>
+                <a:cs typeface="Times New Roman" panose="02020603050405020304" pitchFamily="18" charset="0"/>
+              </a:rPr>
+              <a:t>which will tell you the device that place the calls, and the Initiator Address which will tell you from where the device was when the calls were placed</a:t>
+            </a:r>
           </a:p>
           <a:p>
             <a:pPr>
               <a:buFont typeface="Wingdings" panose="05000000000000000000" pitchFamily="2" charset="2"/>
               <a:buChar char="Ø"/>
             </a:pPr>
+            <a:r>
+              <a:rPr lang="en-US" sz="1600" dirty="0" smtClean="0">
+                <a:latin typeface="Times New Roman" panose="02020603050405020304" pitchFamily="18" charset="0"/>
+                <a:cs typeface="Times New Roman" panose="02020603050405020304" pitchFamily="18" charset="0"/>
+              </a:rPr>
+              <a:t>Make sure this information is copied and pasted as per the Fraud Template</a:t>
+            </a:r>
             <a:endParaRPr lang="en-US" sz="1600" dirty="0">
               <a:latin typeface="Times New Roman" panose="02020603050405020304" pitchFamily="18" charset="0"/>
               <a:cs typeface="Times New Roman" panose="02020603050405020304" pitchFamily="18" charset="0"/>
             </a:endParaRPr>
           </a:p>
-          <a:p>
-            <a:pPr>
-              <a:buFont typeface="Wingdings" panose="05000000000000000000" pitchFamily="2" charset="2"/>
-              <a:buChar char="Ø"/>
-            </a:pPr>
-            <a:endParaRPr lang="en-US" sz="1600" dirty="0" smtClean="0">
-              <a:latin typeface="Times New Roman" panose="02020603050405020304" pitchFamily="18" charset="0"/>
-              <a:cs typeface="Times New Roman" panose="02020603050405020304" pitchFamily="18" charset="0"/>
-            </a:endParaRPr>
-          </a:p>
-          <a:p>
-            <a:pPr>
-              <a:buFont typeface="Wingdings" panose="05000000000000000000" pitchFamily="2" charset="2"/>
-              <a:buChar char="Ø"/>
-            </a:pPr>
-            <a:endParaRPr lang="en-US" sz="1600" dirty="0">
-              <a:latin typeface="Times New Roman" panose="02020603050405020304" pitchFamily="18" charset="0"/>
-              <a:cs typeface="Times New Roman" panose="02020603050405020304" pitchFamily="18" charset="0"/>
-            </a:endParaRPr>
-          </a:p>
-          <a:p>
-            <a:pPr>
-              <a:buFont typeface="Wingdings" panose="05000000000000000000" pitchFamily="2" charset="2"/>
-              <a:buChar char="Ø"/>
-            </a:pPr>
-            <a:r>
-              <a:rPr lang="en-US" sz="1600" dirty="0" smtClean="0">
-                <a:latin typeface="Times New Roman" panose="02020603050405020304" pitchFamily="18" charset="0"/>
-                <a:cs typeface="Times New Roman" panose="02020603050405020304" pitchFamily="18" charset="0"/>
-              </a:rPr>
-              <a:t>You will also want to run an MTR to the </a:t>
-            </a:r>
-            <a:r>
-              <a:rPr lang="en-US" sz="1600" dirty="0">
-                <a:latin typeface="Times New Roman" panose="02020603050405020304" pitchFamily="18" charset="0"/>
-                <a:cs typeface="Times New Roman" panose="02020603050405020304" pitchFamily="18" charset="0"/>
-              </a:rPr>
-              <a:t>Initiator User </a:t>
-            </a:r>
-            <a:r>
-              <a:rPr lang="en-US" sz="1600" dirty="0" smtClean="0">
-                <a:latin typeface="Times New Roman" panose="02020603050405020304" pitchFamily="18" charset="0"/>
-                <a:cs typeface="Times New Roman" panose="02020603050405020304" pitchFamily="18" charset="0"/>
-              </a:rPr>
-              <a:t>Agent IP address . Look for any signs of High latency, Jitter, or Packet Loss.</a:t>
-            </a:r>
+        </p:txBody>
+      </p:sp>
+      <p:sp>
+        <p:nvSpPr>
+          <p:cNvPr id="5" name="Slide Number Placeholder 4"/>
+          <p:cNvSpPr>
+            <a:spLocks noGrp="1"/>
+          </p:cNvSpPr>
+          <p:nvPr>
+            <p:ph type="sldNum" sz="quarter" idx="10"/>
+          </p:nvPr>
+        </p:nvSpPr>
+        <p:spPr/>
+        <p:txBody>
+          <a:bodyPr/>
+          <a:lstStyle/>
+          <a:p>
+            <a:fld id="{71BC9C40-ACDD-4696-8BAF-E1591320CFED}" type="slidenum">
+              <a:rPr lang="en-US" smtClean="0"/>
+              <a:pPr/>
+              <a:t>12</a:t>
+            </a:fld>
+            <a:endParaRPr lang="en-US"/>
           </a:p>
         </p:txBody>
       </p:sp>
       <p:pic>
         <p:nvPicPr>
-          <p:cNvPr id="9" name="Content Placeholder 8"/>
+          <p:cNvPr id="8" name="Content Placeholder 7"/>
           <p:cNvPicPr>
             <a:picLocks noGrp="1" noChangeAspect="1"/>
           </p:cNvPicPr>
           <p:nvPr>
-            <p:ph sz="quarter" idx="2"/>
+            <p:ph sz="half" idx="2"/>
           </p:nvPr>
         </p:nvPicPr>
         <p:blipFill>
@@ -15270,7 +15279,7 @@
                 <a14:imgProps xmlns:a14="http://schemas.microsoft.com/office/drawing/2010/main">
                   <a14:imgLayer r:embed="rId3">
                     <a14:imgEffect>
-                      <a14:sharpenSoften amount="25000"/>
+                      <a14:sharpenSoften amount="50000"/>
                     </a14:imgEffect>
                   </a14:imgLayer>
                 </a14:imgProps>
@@ -15286,77 +15295,16 @@
         </p:blipFill>
         <p:spPr>
           <a:xfrm>
-            <a:off x="4495800" y="1293813"/>
-            <a:ext cx="4495800" cy="2308225"/>
+            <a:off x="3657600" y="1447800"/>
+            <a:ext cx="5130538" cy="4876800"/>
           </a:xfrm>
+          <a:noFill/>
         </p:spPr>
       </p:pic>
-      <p:pic>
-        <p:nvPicPr>
-          <p:cNvPr id="10" name="Content Placeholder 9"/>
-          <p:cNvPicPr>
-            <a:picLocks noGrp="1" noChangeAspect="1"/>
-          </p:cNvPicPr>
-          <p:nvPr>
-            <p:ph sz="quarter" idx="3"/>
-          </p:nvPr>
-        </p:nvPicPr>
-        <p:blipFill>
-          <a:blip r:embed="rId4" cstate="print">
-            <a:extLst>
-              <a:ext uri="{BEBA8EAE-BF5A-486C-A8C5-ECC9F3942E4B}">
-                <a14:imgProps xmlns:a14="http://schemas.microsoft.com/office/drawing/2010/main">
-                  <a14:imgLayer r:embed="rId5">
-                    <a14:imgEffect>
-                      <a14:sharpenSoften amount="25000"/>
-                    </a14:imgEffect>
-                  </a14:imgLayer>
-                </a14:imgProps>
-              </a:ext>
-              <a:ext uri="{28A0092B-C50C-407E-A947-70E740481C1C}">
-                <a14:useLocalDpi xmlns:a14="http://schemas.microsoft.com/office/drawing/2010/main" val="0"/>
-              </a:ext>
-            </a:extLst>
-          </a:blip>
-          <a:stretch>
-            <a:fillRect/>
-          </a:stretch>
-        </p:blipFill>
-        <p:spPr>
-          <a:xfrm>
-            <a:off x="4495800" y="3789635"/>
-            <a:ext cx="4543108" cy="2555328"/>
-          </a:xfrm>
-        </p:spPr>
-      </p:pic>
-      <p:sp>
-        <p:nvSpPr>
-          <p:cNvPr id="5" name="Slide Number Placeholder 4"/>
-          <p:cNvSpPr>
-            <a:spLocks noGrp="1"/>
-          </p:cNvSpPr>
-          <p:nvPr>
-            <p:ph type="sldNum" sz="quarter" idx="10"/>
-          </p:nvPr>
-        </p:nvSpPr>
-        <p:spPr/>
-        <p:txBody>
-          <a:bodyPr/>
-          <a:lstStyle/>
-          <a:p>
-            <a:fld id="{71BC9C40-ACDD-4696-8BAF-E1591320CFED}" type="slidenum">
-              <a:rPr lang="en-US" smtClean="0"/>
-              <a:pPr/>
-              <a:t>12</a:t>
-            </a:fld>
-            <a:endParaRPr lang="en-US"/>
-          </a:p>
-        </p:txBody>
-      </p:sp>
     </p:spTree>
     <p:extLst>
       <p:ext uri="{BB962C8B-B14F-4D97-AF65-F5344CB8AC3E}">
-        <p14:creationId xmlns:p14="http://schemas.microsoft.com/office/powerpoint/2010/main" val="4049503898"/>
+        <p14:creationId xmlns:p14="http://schemas.microsoft.com/office/powerpoint/2010/main" val="2871853853"/>
       </p:ext>
     </p:extLst>
   </p:cSld>
@@ -15392,7 +15340,7 @@
       </p:grpSpPr>
       <p:sp>
         <p:nvSpPr>
-          <p:cNvPr id="7" name="Title 6"/>
+          <p:cNvPr id="2" name="Title 1"/>
           <p:cNvSpPr>
             <a:spLocks noGrp="1"/>
           </p:cNvSpPr>
@@ -15414,12 +15362,12 @@
       </p:sp>
       <p:sp>
         <p:nvSpPr>
-          <p:cNvPr id="8" name="Content Placeholder 7"/>
+          <p:cNvPr id="6" name="Content Placeholder 5"/>
           <p:cNvSpPr>
             <a:spLocks noGrp="1"/>
           </p:cNvSpPr>
           <p:nvPr>
-            <p:ph idx="1"/>
+            <p:ph sz="half" idx="1"/>
           </p:nvPr>
         </p:nvSpPr>
         <p:spPr/>
@@ -15432,11 +15380,25 @@
               <a:buChar char="Ø"/>
             </a:pPr>
             <a:r>
-              <a:rPr lang="en-US" sz="1800" dirty="0" smtClean="0">
+              <a:rPr lang="en-US" sz="1600" dirty="0" smtClean="0">
                 <a:latin typeface="Times New Roman" panose="02020603050405020304" pitchFamily="18" charset="0"/>
                 <a:cs typeface="Times New Roman" panose="02020603050405020304" pitchFamily="18" charset="0"/>
               </a:rPr>
-              <a:t>You will now want to look at the call logs again. This time look at calls made at least 2 weeks back from the same extension. </a:t>
+              <a:t>Use a IP address look up tool (like infosniper.net) to look up the IP address of the </a:t>
+            </a:r>
+            <a:r>
+              <a:rPr lang="en-US" sz="1600" dirty="0">
+                <a:latin typeface="Times New Roman" panose="02020603050405020304" pitchFamily="18" charset="0"/>
+                <a:cs typeface="Times New Roman" panose="02020603050405020304" pitchFamily="18" charset="0"/>
+              </a:rPr>
+              <a:t>Initiator User </a:t>
+            </a:r>
+            <a:r>
+              <a:rPr lang="en-US" sz="1600" dirty="0" smtClean="0">
+                <a:latin typeface="Times New Roman" panose="02020603050405020304" pitchFamily="18" charset="0"/>
+                <a:cs typeface="Times New Roman" panose="02020603050405020304" pitchFamily="18" charset="0"/>
+              </a:rPr>
+              <a:t>Agent pay close attention to where these calls were place from. </a:t>
             </a:r>
           </a:p>
           <a:p>
@@ -15444,14 +15406,7 @@
               <a:buFont typeface="Wingdings" panose="05000000000000000000" pitchFamily="2" charset="2"/>
               <a:buChar char="Ø"/>
             </a:pPr>
-            <a:r>
-              <a:rPr lang="en-US" sz="1800" dirty="0" smtClean="0">
-                <a:latin typeface="Times New Roman" panose="02020603050405020304" pitchFamily="18" charset="0"/>
-                <a:cs typeface="Times New Roman" panose="02020603050405020304" pitchFamily="18" charset="0"/>
-              </a:rPr>
-              <a:t>You will once again bring up the Log Analyzer from one of these earlier calls. </a:t>
-            </a:r>
-            <a:endParaRPr lang="en-US" sz="1800" dirty="0">
+            <a:endParaRPr lang="en-US" sz="1600" dirty="0" smtClean="0">
               <a:latin typeface="Times New Roman" panose="02020603050405020304" pitchFamily="18" charset="0"/>
               <a:cs typeface="Times New Roman" panose="02020603050405020304" pitchFamily="18" charset="0"/>
             </a:endParaRPr>
@@ -15461,39 +15416,30 @@
               <a:buFont typeface="Wingdings" panose="05000000000000000000" pitchFamily="2" charset="2"/>
               <a:buChar char="Ø"/>
             </a:pPr>
-            <a:r>
-              <a:rPr lang="en-US" sz="1800" dirty="0" smtClean="0">
-                <a:latin typeface="Times New Roman" panose="02020603050405020304" pitchFamily="18" charset="0"/>
-                <a:cs typeface="Times New Roman" panose="02020603050405020304" pitchFamily="18" charset="0"/>
-              </a:rPr>
-              <a:t>Compare the information here to the information from the Log Analyzer that set off the Alert. </a:t>
-            </a:r>
+            <a:endParaRPr lang="en-US" sz="1600" dirty="0">
+              <a:latin typeface="Times New Roman" panose="02020603050405020304" pitchFamily="18" charset="0"/>
+              <a:cs typeface="Times New Roman" panose="02020603050405020304" pitchFamily="18" charset="0"/>
+            </a:endParaRPr>
           </a:p>
           <a:p>
             <a:pPr>
               <a:buFont typeface="Wingdings" panose="05000000000000000000" pitchFamily="2" charset="2"/>
               <a:buChar char="Ø"/>
             </a:pPr>
-            <a:r>
-              <a:rPr lang="en-US" sz="1800" dirty="0" smtClean="0">
-                <a:latin typeface="Times New Roman" panose="02020603050405020304" pitchFamily="18" charset="0"/>
-                <a:cs typeface="Times New Roman" panose="02020603050405020304" pitchFamily="18" charset="0"/>
-              </a:rPr>
-              <a:t>Check to see if these calls were from a different device, at a different IP address. </a:t>
-            </a:r>
+            <a:endParaRPr lang="en-US" sz="1600" dirty="0" smtClean="0">
+              <a:latin typeface="Times New Roman" panose="02020603050405020304" pitchFamily="18" charset="0"/>
+              <a:cs typeface="Times New Roman" panose="02020603050405020304" pitchFamily="18" charset="0"/>
+            </a:endParaRPr>
           </a:p>
           <a:p>
             <a:pPr>
               <a:buFont typeface="Wingdings" panose="05000000000000000000" pitchFamily="2" charset="2"/>
               <a:buChar char="Ø"/>
             </a:pPr>
-            <a:r>
-              <a:rPr lang="en-US" sz="1800" dirty="0" smtClean="0">
-                <a:latin typeface="Times New Roman" panose="02020603050405020304" pitchFamily="18" charset="0"/>
-                <a:cs typeface="Times New Roman" panose="02020603050405020304" pitchFamily="18" charset="0"/>
-              </a:rPr>
-              <a:t>If the Device and IP address are the same and there was high latency, jitter, or  packet loss this more than likely is a False Positive Alert.</a:t>
-            </a:r>
+            <a:endParaRPr lang="en-US" sz="1600" dirty="0">
+              <a:latin typeface="Times New Roman" panose="02020603050405020304" pitchFamily="18" charset="0"/>
+              <a:cs typeface="Times New Roman" panose="02020603050405020304" pitchFamily="18" charset="0"/>
+            </a:endParaRPr>
           </a:p>
           <a:p>
             <a:pPr>
@@ -15501,22 +15447,108 @@
               <a:buChar char="Ø"/>
             </a:pPr>
             <a:r>
-              <a:rPr lang="en-US" sz="1800" dirty="0" smtClean="0">
+              <a:rPr lang="en-US" sz="1600" dirty="0" smtClean="0">
                 <a:latin typeface="Times New Roman" panose="02020603050405020304" pitchFamily="18" charset="0"/>
                 <a:cs typeface="Times New Roman" panose="02020603050405020304" pitchFamily="18" charset="0"/>
               </a:rPr>
-              <a:t>If the Device is different and the location of the IP addresses are far and seem to be suspicious then this could potentially be a Fraud.  </a:t>
-            </a:r>
-            <a:endParaRPr lang="en-US" sz="1800" dirty="0">
-              <a:latin typeface="Times New Roman" panose="02020603050405020304" pitchFamily="18" charset="0"/>
-              <a:cs typeface="Times New Roman" panose="02020603050405020304" pitchFamily="18" charset="0"/>
-            </a:endParaRPr>
-          </a:p>
-        </p:txBody>
-      </p:sp>
-      <p:sp>
-        <p:nvSpPr>
-          <p:cNvPr id="6" name="Slide Number Placeholder 5"/>
+              <a:t>You will also want to run an MTR to the </a:t>
+            </a:r>
+            <a:r>
+              <a:rPr lang="en-US" sz="1600" dirty="0">
+                <a:latin typeface="Times New Roman" panose="02020603050405020304" pitchFamily="18" charset="0"/>
+                <a:cs typeface="Times New Roman" panose="02020603050405020304" pitchFamily="18" charset="0"/>
+              </a:rPr>
+              <a:t>Initiator User </a:t>
+            </a:r>
+            <a:r>
+              <a:rPr lang="en-US" sz="1600" dirty="0" smtClean="0">
+                <a:latin typeface="Times New Roman" panose="02020603050405020304" pitchFamily="18" charset="0"/>
+                <a:cs typeface="Times New Roman" panose="02020603050405020304" pitchFamily="18" charset="0"/>
+              </a:rPr>
+              <a:t>Agent IP address . Look for any signs of High latency, Jitter, or Packet Loss.</a:t>
+            </a:r>
+          </a:p>
+        </p:txBody>
+      </p:sp>
+      <p:pic>
+        <p:nvPicPr>
+          <p:cNvPr id="9" name="Content Placeholder 8"/>
+          <p:cNvPicPr>
+            <a:picLocks noGrp="1" noChangeAspect="1"/>
+          </p:cNvPicPr>
+          <p:nvPr>
+            <p:ph sz="quarter" idx="2"/>
+          </p:nvPr>
+        </p:nvPicPr>
+        <p:blipFill>
+          <a:blip r:embed="rId2" cstate="print">
+            <a:extLst>
+              <a:ext uri="{BEBA8EAE-BF5A-486C-A8C5-ECC9F3942E4B}">
+                <a14:imgProps xmlns:a14="http://schemas.microsoft.com/office/drawing/2010/main">
+                  <a14:imgLayer r:embed="rId3">
+                    <a14:imgEffect>
+                      <a14:sharpenSoften amount="25000"/>
+                    </a14:imgEffect>
+                  </a14:imgLayer>
+                </a14:imgProps>
+              </a:ext>
+              <a:ext uri="{28A0092B-C50C-407E-A947-70E740481C1C}">
+                <a14:useLocalDpi xmlns:a14="http://schemas.microsoft.com/office/drawing/2010/main" val="0"/>
+              </a:ext>
+            </a:extLst>
+          </a:blip>
+          <a:stretch>
+            <a:fillRect/>
+          </a:stretch>
+        </p:blipFill>
+        <p:spPr>
+          <a:xfrm>
+            <a:off x="4495800" y="1293813"/>
+            <a:ext cx="4495800" cy="2308225"/>
+          </a:xfrm>
+        </p:spPr>
+      </p:pic>
+      <p:pic>
+        <p:nvPicPr>
+          <p:cNvPr id="10" name="Content Placeholder 9"/>
+          <p:cNvPicPr>
+            <a:picLocks noGrp="1" noChangeAspect="1"/>
+          </p:cNvPicPr>
+          <p:nvPr>
+            <p:ph sz="quarter" idx="3"/>
+          </p:nvPr>
+        </p:nvPicPr>
+        <p:blipFill>
+          <a:blip r:embed="rId4" cstate="print">
+            <a:extLst>
+              <a:ext uri="{BEBA8EAE-BF5A-486C-A8C5-ECC9F3942E4B}">
+                <a14:imgProps xmlns:a14="http://schemas.microsoft.com/office/drawing/2010/main">
+                  <a14:imgLayer r:embed="rId5">
+                    <a14:imgEffect>
+                      <a14:sharpenSoften amount="25000"/>
+                    </a14:imgEffect>
+                  </a14:imgLayer>
+                </a14:imgProps>
+              </a:ext>
+              <a:ext uri="{28A0092B-C50C-407E-A947-70E740481C1C}">
+                <a14:useLocalDpi xmlns:a14="http://schemas.microsoft.com/office/drawing/2010/main" val="0"/>
+              </a:ext>
+            </a:extLst>
+          </a:blip>
+          <a:stretch>
+            <a:fillRect/>
+          </a:stretch>
+        </p:blipFill>
+        <p:spPr>
+          <a:xfrm>
+            <a:off x="4495800" y="3789635"/>
+            <a:ext cx="4543108" cy="2555328"/>
+          </a:xfrm>
+        </p:spPr>
+      </p:pic>
+      <p:sp>
+        <p:nvSpPr>
+          <p:cNvPr id="5" name="Slide Number Placeholder 4"/>
           <p:cNvSpPr>
             <a:spLocks noGrp="1"/>
           </p:cNvSpPr>
@@ -15529,7 +15561,7 @@
           <a:bodyPr/>
           <a:lstStyle/>
           <a:p>
-            <a:fld id="{51062DCB-C440-495D-8BB3-6798C4B87E5E}" type="slidenum">
+            <a:fld id="{71BC9C40-ACDD-4696-8BAF-E1591320CFED}" type="slidenum">
               <a:rPr lang="en-US" smtClean="0"/>
               <a:pPr/>
               <a:t>13</a:t>
@@ -15541,7 +15573,7 @@
     </p:spTree>
     <p:extLst>
       <p:ext uri="{BB962C8B-B14F-4D97-AF65-F5344CB8AC3E}">
-        <p14:creationId xmlns:p14="http://schemas.microsoft.com/office/powerpoint/2010/main" val="2860348354"/>
+        <p14:creationId xmlns:p14="http://schemas.microsoft.com/office/powerpoint/2010/main" val="4049503898"/>
       </p:ext>
     </p:extLst>
   </p:cSld>
@@ -15577,6 +15609,191 @@
       </p:grpSpPr>
       <p:sp>
         <p:nvSpPr>
+          <p:cNvPr id="7" name="Title 6"/>
+          <p:cNvSpPr>
+            <a:spLocks noGrp="1"/>
+          </p:cNvSpPr>
+          <p:nvPr>
+            <p:ph type="title"/>
+          </p:nvPr>
+        </p:nvSpPr>
+        <p:spPr/>
+        <p:txBody>
+          <a:bodyPr/>
+          <a:lstStyle/>
+          <a:p>
+            <a:r>
+              <a:rPr lang="en-US" dirty="0"/>
+              <a:t>Investigation continued …</a:t>
+            </a:r>
+          </a:p>
+        </p:txBody>
+      </p:sp>
+      <p:sp>
+        <p:nvSpPr>
+          <p:cNvPr id="8" name="Content Placeholder 7"/>
+          <p:cNvSpPr>
+            <a:spLocks noGrp="1"/>
+          </p:cNvSpPr>
+          <p:nvPr>
+            <p:ph idx="1"/>
+          </p:nvPr>
+        </p:nvSpPr>
+        <p:spPr/>
+        <p:txBody>
+          <a:bodyPr/>
+          <a:lstStyle/>
+          <a:p>
+            <a:pPr>
+              <a:buFont typeface="Wingdings" panose="05000000000000000000" pitchFamily="2" charset="2"/>
+              <a:buChar char="Ø"/>
+            </a:pPr>
+            <a:r>
+              <a:rPr lang="en-US" sz="1800" dirty="0" smtClean="0">
+                <a:latin typeface="Times New Roman" panose="02020603050405020304" pitchFamily="18" charset="0"/>
+                <a:cs typeface="Times New Roman" panose="02020603050405020304" pitchFamily="18" charset="0"/>
+              </a:rPr>
+              <a:t>You will now want to look at the call logs again. This time look at calls made at least 2 weeks back from the same extension. </a:t>
+            </a:r>
+          </a:p>
+          <a:p>
+            <a:pPr>
+              <a:buFont typeface="Wingdings" panose="05000000000000000000" pitchFamily="2" charset="2"/>
+              <a:buChar char="Ø"/>
+            </a:pPr>
+            <a:r>
+              <a:rPr lang="en-US" sz="1800" dirty="0" smtClean="0">
+                <a:latin typeface="Times New Roman" panose="02020603050405020304" pitchFamily="18" charset="0"/>
+                <a:cs typeface="Times New Roman" panose="02020603050405020304" pitchFamily="18" charset="0"/>
+              </a:rPr>
+              <a:t>You will once again bring up the Log Analyzer from one of these earlier calls. </a:t>
+            </a:r>
+            <a:endParaRPr lang="en-US" sz="1800" dirty="0">
+              <a:latin typeface="Times New Roman" panose="02020603050405020304" pitchFamily="18" charset="0"/>
+              <a:cs typeface="Times New Roman" panose="02020603050405020304" pitchFamily="18" charset="0"/>
+            </a:endParaRPr>
+          </a:p>
+          <a:p>
+            <a:pPr>
+              <a:buFont typeface="Wingdings" panose="05000000000000000000" pitchFamily="2" charset="2"/>
+              <a:buChar char="Ø"/>
+            </a:pPr>
+            <a:r>
+              <a:rPr lang="en-US" sz="1800" dirty="0" smtClean="0">
+                <a:latin typeface="Times New Roman" panose="02020603050405020304" pitchFamily="18" charset="0"/>
+                <a:cs typeface="Times New Roman" panose="02020603050405020304" pitchFamily="18" charset="0"/>
+              </a:rPr>
+              <a:t>Compare the information here to the information from the Log Analyzer that set off the Alert. </a:t>
+            </a:r>
+          </a:p>
+          <a:p>
+            <a:pPr>
+              <a:buFont typeface="Wingdings" panose="05000000000000000000" pitchFamily="2" charset="2"/>
+              <a:buChar char="Ø"/>
+            </a:pPr>
+            <a:r>
+              <a:rPr lang="en-US" sz="1800" dirty="0" smtClean="0">
+                <a:latin typeface="Times New Roman" panose="02020603050405020304" pitchFamily="18" charset="0"/>
+                <a:cs typeface="Times New Roman" panose="02020603050405020304" pitchFamily="18" charset="0"/>
+              </a:rPr>
+              <a:t>Check to see if these calls were from a different device, at a different IP address. </a:t>
+            </a:r>
+          </a:p>
+          <a:p>
+            <a:pPr>
+              <a:buFont typeface="Wingdings" panose="05000000000000000000" pitchFamily="2" charset="2"/>
+              <a:buChar char="Ø"/>
+            </a:pPr>
+            <a:r>
+              <a:rPr lang="en-US" sz="1800" dirty="0" smtClean="0">
+                <a:latin typeface="Times New Roman" panose="02020603050405020304" pitchFamily="18" charset="0"/>
+                <a:cs typeface="Times New Roman" panose="02020603050405020304" pitchFamily="18" charset="0"/>
+              </a:rPr>
+              <a:t>If the Device and IP address are the same and there was high latency, jitter, or  packet loss this more than likely is a False Positive Alert.</a:t>
+            </a:r>
+          </a:p>
+          <a:p>
+            <a:pPr>
+              <a:buFont typeface="Wingdings" panose="05000000000000000000" pitchFamily="2" charset="2"/>
+              <a:buChar char="Ø"/>
+            </a:pPr>
+            <a:r>
+              <a:rPr lang="en-US" sz="1800" dirty="0" smtClean="0">
+                <a:latin typeface="Times New Roman" panose="02020603050405020304" pitchFamily="18" charset="0"/>
+                <a:cs typeface="Times New Roman" panose="02020603050405020304" pitchFamily="18" charset="0"/>
+              </a:rPr>
+              <a:t>If the Device is different and the location of the IP addresses are far and seem to be suspicious then this could potentially be a Fraud.  </a:t>
+            </a:r>
+            <a:endParaRPr lang="en-US" sz="1800" dirty="0">
+              <a:latin typeface="Times New Roman" panose="02020603050405020304" pitchFamily="18" charset="0"/>
+              <a:cs typeface="Times New Roman" panose="02020603050405020304" pitchFamily="18" charset="0"/>
+            </a:endParaRPr>
+          </a:p>
+        </p:txBody>
+      </p:sp>
+      <p:sp>
+        <p:nvSpPr>
+          <p:cNvPr id="6" name="Slide Number Placeholder 5"/>
+          <p:cNvSpPr>
+            <a:spLocks noGrp="1"/>
+          </p:cNvSpPr>
+          <p:nvPr>
+            <p:ph type="sldNum" sz="quarter" idx="10"/>
+          </p:nvPr>
+        </p:nvSpPr>
+        <p:spPr/>
+        <p:txBody>
+          <a:bodyPr/>
+          <a:lstStyle/>
+          <a:p>
+            <a:fld id="{51062DCB-C440-495D-8BB3-6798C4B87E5E}" type="slidenum">
+              <a:rPr lang="en-US" smtClean="0"/>
+              <a:pPr/>
+              <a:t>14</a:t>
+            </a:fld>
+            <a:endParaRPr lang="en-US"/>
+          </a:p>
+        </p:txBody>
+      </p:sp>
+    </p:spTree>
+    <p:extLst>
+      <p:ext uri="{BB962C8B-B14F-4D97-AF65-F5344CB8AC3E}">
+        <p14:creationId xmlns:p14="http://schemas.microsoft.com/office/powerpoint/2010/main" val="2860348354"/>
+      </p:ext>
+    </p:extLst>
+  </p:cSld>
+  <p:clrMapOvr>
+    <a:masterClrMapping/>
+  </p:clrMapOvr>
+  <p:timing>
+    <p:tnLst>
+      <p:par>
+        <p:cTn id="1" dur="indefinite" restart="never" nodeType="tmRoot"/>
+      </p:par>
+    </p:tnLst>
+  </p:timing>
+</p:sld>
+</file>
+
+<file path=ppt/slides/slide15.xml><?xml version="1.0" encoding="utf-8"?>
+<p:sld xmlns:a="http://schemas.openxmlformats.org/drawingml/2006/main" xmlns:r="http://schemas.openxmlformats.org/officeDocument/2006/relationships" xmlns:p="http://schemas.openxmlformats.org/presentationml/2006/main">
+  <p:cSld>
+    <p:spTree>
+      <p:nvGrpSpPr>
+        <p:cNvPr id="1" name=""/>
+        <p:cNvGrpSpPr/>
+        <p:nvPr/>
+      </p:nvGrpSpPr>
+      <p:grpSpPr>
+        <a:xfrm>
+          <a:off x="0" y="0"/>
+          <a:ext cx="0" cy="0"/>
+          <a:chOff x="0" y="0"/>
+          <a:chExt cx="0" cy="0"/>
+        </a:xfrm>
+      </p:grpSpPr>
+      <p:sp>
+        <p:nvSpPr>
           <p:cNvPr id="2" name="Title 1"/>
           <p:cNvSpPr>
             <a:spLocks noGrp="1"/>
@@ -15712,7 +15929,7 @@
               <a:pPr>
                 <a:defRPr/>
               </a:pPr>
-              <a:t>14</a:t>
+              <a:t>15</a:t>
             </a:fld>
             <a:endParaRPr lang="en-US">
               <a:solidFill>
@@ -16007,7 +16224,21 @@
                 <a:latin typeface="Times New Roman" panose="02020603050405020304" pitchFamily="18" charset="0"/>
                 <a:cs typeface="Times New Roman" panose="02020603050405020304" pitchFamily="18" charset="0"/>
               </a:rPr>
-              <a:t>Carrier Alert which usually has very little info and commonly consists of calls to blacklisted regions or numbers.</a:t>
+              <a:t>Carrier Alert which usually has very little info and commonly consists of calls to blacklisted </a:t>
+            </a:r>
+            <a:r>
+              <a:rPr lang="en-US" sz="1400" dirty="0" smtClean="0">
+                <a:latin typeface="Times New Roman" panose="02020603050405020304" pitchFamily="18" charset="0"/>
+                <a:cs typeface="Times New Roman" panose="02020603050405020304" pitchFamily="18" charset="0"/>
+              </a:rPr>
+              <a:t>destinations or </a:t>
+            </a:r>
+            <a:r>
+              <a:rPr lang="en-US" sz="1400" dirty="0" smtClean="0">
+                <a:latin typeface="Times New Roman" panose="02020603050405020304" pitchFamily="18" charset="0"/>
+                <a:cs typeface="Times New Roman" panose="02020603050405020304" pitchFamily="18" charset="0"/>
+              </a:rPr>
+              <a:t>numbers.</a:t>
             </a:r>
           </a:p>
           <a:p>
@@ -16365,42 +16596,7 @@
                 <a:latin typeface="Times New Roman" panose="02020603050405020304" pitchFamily="18" charset="0"/>
                 <a:cs typeface="Times New Roman" panose="02020603050405020304" pitchFamily="18" charset="0"/>
               </a:rPr>
-              <a:t>Domestic Alerts are generated by </a:t>
-            </a:r>
-            <a:r>
-              <a:rPr lang="en-US" sz="1400" dirty="0" smtClean="0">
-                <a:latin typeface="Times New Roman" panose="02020603050405020304" pitchFamily="18" charset="0"/>
-                <a:cs typeface="Times New Roman" panose="02020603050405020304" pitchFamily="18" charset="0"/>
-              </a:rPr>
-              <a:t>domestic calls </a:t>
-            </a:r>
-            <a:r>
-              <a:rPr lang="en-US" sz="1400" dirty="0" smtClean="0">
-                <a:latin typeface="Times New Roman" panose="02020603050405020304" pitchFamily="18" charset="0"/>
-                <a:cs typeface="Times New Roman" panose="02020603050405020304" pitchFamily="18" charset="0"/>
-              </a:rPr>
-              <a:t>exceeding account </a:t>
-            </a:r>
-            <a:r>
-              <a:rPr lang="en-US" sz="1400" dirty="0" smtClean="0">
-                <a:latin typeface="Times New Roman" panose="02020603050405020304" pitchFamily="18" charset="0"/>
-                <a:cs typeface="Times New Roman" panose="02020603050405020304" pitchFamily="18" charset="0"/>
-              </a:rPr>
-              <a:t>thresholds and is often </a:t>
-            </a:r>
-            <a:r>
-              <a:rPr lang="en-US" sz="1400" dirty="0" smtClean="0">
-                <a:latin typeface="Times New Roman" panose="02020603050405020304" pitchFamily="18" charset="0"/>
-                <a:cs typeface="Times New Roman" panose="02020603050405020304" pitchFamily="18" charset="0"/>
-              </a:rPr>
-              <a:t>triggered as a </a:t>
-            </a:r>
-            <a:r>
-              <a:rPr lang="en-US" sz="1400" dirty="0" smtClean="0">
-                <a:latin typeface="Times New Roman" panose="02020603050405020304" pitchFamily="18" charset="0"/>
-                <a:cs typeface="Times New Roman" panose="02020603050405020304" pitchFamily="18" charset="0"/>
-              </a:rPr>
-              <a:t>result of network conditions. However, be on the lookout as </a:t>
+              <a:t>Domestic Alerts are generated by domestic calls exceeding account thresholds and is often triggered as a result of network conditions. However, be on the lookout as </a:t>
             </a:r>
             <a:r>
               <a:rPr lang="en-US" sz="1400" dirty="0" err="1" smtClean="0">
@@ -16414,26 +16610,8 @@
                 <a:latin typeface="Times New Roman" panose="02020603050405020304" pitchFamily="18" charset="0"/>
                 <a:cs typeface="Times New Roman" panose="02020603050405020304" pitchFamily="18" charset="0"/>
               </a:rPr>
-              <a:t> and PBX’s may also be </a:t>
-            </a:r>
-            <a:r>
-              <a:rPr lang="en-US" sz="1400" dirty="0" smtClean="0">
-                <a:latin typeface="Times New Roman" panose="02020603050405020304" pitchFamily="18" charset="0"/>
-                <a:cs typeface="Times New Roman" panose="02020603050405020304" pitchFamily="18" charset="0"/>
-              </a:rPr>
-              <a:t>the culprit either with or without the account holders knowledge. Example:  </a:t>
-            </a:r>
-            <a:r>
-              <a:rPr lang="en-US" sz="1400" dirty="0" smtClean="0">
-                <a:latin typeface="Times New Roman" panose="02020603050405020304" pitchFamily="18" charset="0"/>
-                <a:cs typeface="Times New Roman" panose="02020603050405020304" pitchFamily="18" charset="0"/>
-              </a:rPr>
-              <a:t> </a:t>
-            </a:r>
-            <a:endParaRPr lang="en-US" sz="1400" dirty="0" smtClean="0">
-              <a:latin typeface="Times New Roman" panose="02020603050405020304" pitchFamily="18" charset="0"/>
-              <a:cs typeface="Times New Roman" panose="02020603050405020304" pitchFamily="18" charset="0"/>
-            </a:endParaRPr>
+              <a:t> and PBX’s may also be the culprit either with or without the account holders knowledge. Example:   </a:t>
+            </a:r>
           </a:p>
           <a:p>
             <a:pPr marL="0" indent="0">
@@ -16614,40 +16792,8 @@
                 <a:latin typeface="Times New Roman" panose="02020603050405020304" pitchFamily="18" charset="0"/>
                 <a:cs typeface="Times New Roman" panose="02020603050405020304" pitchFamily="18" charset="0"/>
               </a:rPr>
-              <a:t>Vonage Alerts are generated upon discovery of calling patterns to undefined, blocked, or regions high </a:t>
-            </a:r>
-            <a:r>
-              <a:rPr lang="en-US" sz="1400" dirty="0" smtClean="0">
-                <a:latin typeface="Times New Roman" panose="02020603050405020304" pitchFamily="18" charset="0"/>
-                <a:cs typeface="Times New Roman" panose="02020603050405020304" pitchFamily="18" charset="0"/>
-              </a:rPr>
-              <a:t>in </a:t>
-            </a:r>
-            <a:r>
-              <a:rPr lang="en-US" sz="1400" dirty="0" smtClean="0">
-                <a:latin typeface="Times New Roman" panose="02020603050405020304" pitchFamily="18" charset="0"/>
-                <a:cs typeface="Times New Roman" panose="02020603050405020304" pitchFamily="18" charset="0"/>
-              </a:rPr>
-              <a:t>fraudulent activity</a:t>
-            </a:r>
-            <a:r>
-              <a:rPr lang="en-US" sz="1400" dirty="0" smtClean="0">
-                <a:latin typeface="Times New Roman" panose="02020603050405020304" pitchFamily="18" charset="0"/>
-                <a:cs typeface="Times New Roman" panose="02020603050405020304" pitchFamily="18" charset="0"/>
-              </a:rPr>
-              <a:t>. Example:  </a:t>
-            </a:r>
-            <a:r>
-              <a:rPr lang="en-US" sz="1400" dirty="0" smtClean="0">
-                <a:latin typeface="Times New Roman" panose="02020603050405020304" pitchFamily="18" charset="0"/>
-                <a:cs typeface="Times New Roman" panose="02020603050405020304" pitchFamily="18" charset="0"/>
-              </a:rPr>
-              <a:t> </a:t>
-            </a:r>
-            <a:endParaRPr lang="en-US" sz="1400" dirty="0" smtClean="0">
-              <a:latin typeface="Times New Roman" panose="02020603050405020304" pitchFamily="18" charset="0"/>
-              <a:cs typeface="Times New Roman" panose="02020603050405020304" pitchFamily="18" charset="0"/>
-            </a:endParaRPr>
+              <a:t>Vonage Alerts are generated upon discovery of calling patterns to undefined, blocked, or regions high in fraudulent activity. Example:   </a:t>
+            </a:r>
           </a:p>
           <a:p>
             <a:pPr marL="0" indent="0">
@@ -16828,26 +16974,8 @@
                 <a:latin typeface="Times New Roman" panose="02020603050405020304" pitchFamily="18" charset="0"/>
                 <a:cs typeface="Times New Roman" panose="02020603050405020304" pitchFamily="18" charset="0"/>
               </a:rPr>
-              <a:t>Spending Alerts are generated when charges </a:t>
-            </a:r>
-            <a:r>
-              <a:rPr lang="en-US" sz="1400" dirty="0" smtClean="0">
-                <a:latin typeface="Times New Roman" panose="02020603050405020304" pitchFamily="18" charset="0"/>
-                <a:cs typeface="Times New Roman" panose="02020603050405020304" pitchFamily="18" charset="0"/>
-              </a:rPr>
-              <a:t>exceed an account threshold. Example:  </a:t>
-            </a:r>
-            <a:r>
-              <a:rPr lang="en-US" sz="1400" dirty="0" smtClean="0">
-                <a:latin typeface="Times New Roman" panose="02020603050405020304" pitchFamily="18" charset="0"/>
-                <a:cs typeface="Times New Roman" panose="02020603050405020304" pitchFamily="18" charset="0"/>
-              </a:rPr>
-              <a:t> </a:t>
-            </a:r>
-            <a:endParaRPr lang="en-US" sz="1400" dirty="0" smtClean="0">
-              <a:latin typeface="Times New Roman" panose="02020603050405020304" pitchFamily="18" charset="0"/>
-              <a:cs typeface="Times New Roman" panose="02020603050405020304" pitchFamily="18" charset="0"/>
-            </a:endParaRPr>
+              <a:t>Spending Alerts are generated when charges exceed an account threshold. Example:   </a:t>
+            </a:r>
           </a:p>
           <a:p>
             <a:pPr marL="0" indent="0">
@@ -16992,306 +17120,11 @@
               <a:rPr lang="en-US" sz="4800" dirty="0" smtClean="0">
                 <a:latin typeface="Impact" panose="020B0806030902050204" pitchFamily="34" charset="0"/>
               </a:rPr>
-              <a:t>Investigation Steps</a:t>
+              <a:t>Fraud Template Example</a:t>
             </a:r>
             <a:endParaRPr lang="en-US" sz="4800" dirty="0">
               <a:latin typeface="Impact" panose="020B0806030902050204" pitchFamily="34" charset="0"/>
             </a:endParaRPr>
-          </a:p>
-        </p:txBody>
-      </p:sp>
-      <p:sp>
-        <p:nvSpPr>
-          <p:cNvPr id="3" name="Content Placeholder 2"/>
-          <p:cNvSpPr>
-            <a:spLocks noGrp="1"/>
-          </p:cNvSpPr>
-          <p:nvPr>
-            <p:ph idx="1"/>
-          </p:nvPr>
-        </p:nvSpPr>
-        <p:spPr/>
-        <p:txBody>
-          <a:bodyPr/>
-          <a:lstStyle/>
-          <a:p>
-            <a:pPr marL="342900" indent="-342900">
-              <a:buFont typeface="+mj-lt"/>
-              <a:buAutoNum type="arabicPeriod"/>
-            </a:pPr>
-            <a:r>
-              <a:rPr lang="en-US" sz="1600" dirty="0">
-                <a:latin typeface="Times New Roman" panose="02020603050405020304" pitchFamily="18" charset="0"/>
-                <a:cs typeface="Times New Roman" panose="02020603050405020304" pitchFamily="18" charset="0"/>
-              </a:rPr>
-              <a:t>After the Fraud alert comes to the On-Call phone forward that email to yourself in Outlook</a:t>
-            </a:r>
-            <a:r>
-              <a:rPr lang="en-US" sz="1600" dirty="0" smtClean="0">
-                <a:latin typeface="Times New Roman" panose="02020603050405020304" pitchFamily="18" charset="0"/>
-                <a:cs typeface="Times New Roman" panose="02020603050405020304" pitchFamily="18" charset="0"/>
-              </a:rPr>
-              <a:t>.</a:t>
-            </a:r>
-            <a:endParaRPr lang="en-US" sz="1600" dirty="0">
-              <a:latin typeface="Times New Roman" panose="02020603050405020304" pitchFamily="18" charset="0"/>
-              <a:cs typeface="Times New Roman" panose="02020603050405020304" pitchFamily="18" charset="0"/>
-            </a:endParaRPr>
-          </a:p>
-          <a:p>
-            <a:pPr marL="342900" indent="-342900">
-              <a:buFont typeface="+mj-lt"/>
-              <a:buAutoNum type="arabicPeriod"/>
-            </a:pPr>
-            <a:r>
-              <a:rPr lang="en-US" sz="1600" dirty="0">
-                <a:latin typeface="Times New Roman" panose="02020603050405020304" pitchFamily="18" charset="0"/>
-                <a:cs typeface="Times New Roman" panose="02020603050405020304" pitchFamily="18" charset="0"/>
-              </a:rPr>
-              <a:t>From Outlook “Reply All” (Potential Fraud &amp; CCare On-Call 1) with “Investigating”. Make sure your reply includes your Outlook signature</a:t>
-            </a:r>
-            <a:r>
-              <a:rPr lang="en-US" sz="1600" dirty="0" smtClean="0">
-                <a:latin typeface="Times New Roman" panose="02020603050405020304" pitchFamily="18" charset="0"/>
-                <a:cs typeface="Times New Roman" panose="02020603050405020304" pitchFamily="18" charset="0"/>
-              </a:rPr>
-              <a:t>.</a:t>
-            </a:r>
-            <a:endParaRPr lang="en-US" sz="1600" dirty="0">
-              <a:latin typeface="Times New Roman" panose="02020603050405020304" pitchFamily="18" charset="0"/>
-              <a:cs typeface="Times New Roman" panose="02020603050405020304" pitchFamily="18" charset="0"/>
-            </a:endParaRPr>
-          </a:p>
-          <a:p>
-            <a:pPr marL="342900" indent="-342900">
-              <a:buFont typeface="+mj-lt"/>
-              <a:buAutoNum type="arabicPeriod"/>
-            </a:pPr>
-            <a:r>
-              <a:rPr lang="en-US" sz="1600" dirty="0">
-                <a:latin typeface="Times New Roman" panose="02020603050405020304" pitchFamily="18" charset="0"/>
-                <a:cs typeface="Times New Roman" panose="02020603050405020304" pitchFamily="18" charset="0"/>
-              </a:rPr>
-              <a:t>Check the Account and see if a ticket was created in Salesforce if not create one. Insure you change case owner to On-Call and place your name in the Tier 2 Rep field</a:t>
-            </a:r>
-            <a:r>
-              <a:rPr lang="en-US" sz="1600" dirty="0" smtClean="0">
-                <a:latin typeface="Times New Roman" panose="02020603050405020304" pitchFamily="18" charset="0"/>
-                <a:cs typeface="Times New Roman" panose="02020603050405020304" pitchFamily="18" charset="0"/>
-              </a:rPr>
-              <a:t>.</a:t>
-            </a:r>
-            <a:endParaRPr lang="en-US" sz="1600" dirty="0">
-              <a:latin typeface="Times New Roman" panose="02020603050405020304" pitchFamily="18" charset="0"/>
-              <a:cs typeface="Times New Roman" panose="02020603050405020304" pitchFamily="18" charset="0"/>
-            </a:endParaRPr>
-          </a:p>
-          <a:p>
-            <a:pPr marL="342900" indent="-342900">
-              <a:buFont typeface="+mj-lt"/>
-              <a:buAutoNum type="arabicPeriod"/>
-            </a:pPr>
-            <a:r>
-              <a:rPr lang="en-US" sz="1600" dirty="0">
-                <a:latin typeface="Times New Roman" panose="02020603050405020304" pitchFamily="18" charset="0"/>
-                <a:cs typeface="Times New Roman" panose="02020603050405020304" pitchFamily="18" charset="0"/>
-              </a:rPr>
-              <a:t>Copy the </a:t>
-            </a:r>
-            <a:r>
-              <a:rPr lang="en-US" sz="1600" dirty="0" smtClean="0">
-                <a:latin typeface="Times New Roman" panose="02020603050405020304" pitchFamily="18" charset="0"/>
-                <a:cs typeface="Times New Roman" panose="02020603050405020304" pitchFamily="18" charset="0"/>
-              </a:rPr>
-              <a:t>message body of the </a:t>
-            </a:r>
-            <a:r>
-              <a:rPr lang="en-US" sz="1600" dirty="0">
-                <a:latin typeface="Times New Roman" panose="02020603050405020304" pitchFamily="18" charset="0"/>
-                <a:cs typeface="Times New Roman" panose="02020603050405020304" pitchFamily="18" charset="0"/>
-              </a:rPr>
-              <a:t>Alert and paste them into the Salesforce Description, be sure to include the type of Fraud Alert i.e.: Root, Domestic, Vonage, or Spending</a:t>
-            </a:r>
-            <a:r>
-              <a:rPr lang="en-US" sz="1600" dirty="0" smtClean="0">
-                <a:latin typeface="Times New Roman" panose="02020603050405020304" pitchFamily="18" charset="0"/>
-                <a:cs typeface="Times New Roman" panose="02020603050405020304" pitchFamily="18" charset="0"/>
-              </a:rPr>
-              <a:t>.</a:t>
-            </a:r>
-            <a:endParaRPr lang="en-US" sz="1600" dirty="0">
-              <a:latin typeface="Times New Roman" panose="02020603050405020304" pitchFamily="18" charset="0"/>
-              <a:cs typeface="Times New Roman" panose="02020603050405020304" pitchFamily="18" charset="0"/>
-            </a:endParaRPr>
-          </a:p>
-          <a:p>
-            <a:pPr marL="342900" indent="-342900">
-              <a:buFont typeface="+mj-lt"/>
-              <a:buAutoNum type="arabicPeriod"/>
-            </a:pPr>
-            <a:r>
-              <a:rPr lang="en-US" sz="1600" dirty="0">
-                <a:latin typeface="Times New Roman" panose="02020603050405020304" pitchFamily="18" charset="0"/>
-                <a:cs typeface="Times New Roman" panose="02020603050405020304" pitchFamily="18" charset="0"/>
-              </a:rPr>
-              <a:t>Thoroughly investigate the potential Fraud and make your determination whether it’s a False-Positive or Fraud</a:t>
-            </a:r>
-            <a:r>
-              <a:rPr lang="en-US" sz="1600" dirty="0" smtClean="0">
-                <a:latin typeface="Times New Roman" panose="02020603050405020304" pitchFamily="18" charset="0"/>
-                <a:cs typeface="Times New Roman" panose="02020603050405020304" pitchFamily="18" charset="0"/>
-              </a:rPr>
-              <a:t>.</a:t>
-            </a:r>
-            <a:endParaRPr lang="en-US" sz="1600" dirty="0">
-              <a:latin typeface="Times New Roman" panose="02020603050405020304" pitchFamily="18" charset="0"/>
-              <a:cs typeface="Times New Roman" panose="02020603050405020304" pitchFamily="18" charset="0"/>
-            </a:endParaRPr>
-          </a:p>
-          <a:p>
-            <a:pPr marL="342900" indent="-342900">
-              <a:buFont typeface="+mj-lt"/>
-              <a:buAutoNum type="arabicPeriod"/>
-            </a:pPr>
-            <a:r>
-              <a:rPr lang="en-US" sz="1600" dirty="0">
-                <a:latin typeface="Times New Roman" panose="02020603050405020304" pitchFamily="18" charset="0"/>
-                <a:cs typeface="Times New Roman" panose="02020603050405020304" pitchFamily="18" charset="0"/>
-              </a:rPr>
-              <a:t> From Outlook “Reply All” to the Alert with your investigation notes. (see examples below</a:t>
-            </a:r>
-            <a:r>
-              <a:rPr lang="en-US" sz="1600" dirty="0" smtClean="0">
-                <a:latin typeface="Times New Roman" panose="02020603050405020304" pitchFamily="18" charset="0"/>
-                <a:cs typeface="Times New Roman" panose="02020603050405020304" pitchFamily="18" charset="0"/>
-              </a:rPr>
-              <a:t>)</a:t>
-            </a:r>
-            <a:endParaRPr lang="en-US" sz="1600" dirty="0">
-              <a:latin typeface="Times New Roman" panose="02020603050405020304" pitchFamily="18" charset="0"/>
-              <a:cs typeface="Times New Roman" panose="02020603050405020304" pitchFamily="18" charset="0"/>
-            </a:endParaRPr>
-          </a:p>
-          <a:p>
-            <a:pPr marL="342900" indent="-342900">
-              <a:buFont typeface="+mj-lt"/>
-              <a:buAutoNum type="arabicPeriod"/>
-            </a:pPr>
-            <a:r>
-              <a:rPr lang="en-US" sz="1600" dirty="0">
-                <a:latin typeface="Times New Roman" panose="02020603050405020304" pitchFamily="18" charset="0"/>
-                <a:cs typeface="Times New Roman" panose="02020603050405020304" pitchFamily="18" charset="0"/>
-              </a:rPr>
-              <a:t>Update your salesforce ticket with your investigation notes in the “Log Call” section change Problem </a:t>
-            </a:r>
-            <a:r>
-              <a:rPr lang="en-US" sz="1600" dirty="0" smtClean="0">
-                <a:latin typeface="Times New Roman" panose="02020603050405020304" pitchFamily="18" charset="0"/>
-                <a:cs typeface="Times New Roman" panose="02020603050405020304" pitchFamily="18" charset="0"/>
-              </a:rPr>
-              <a:t>Code to “Fraud Alert” and Problem Code II to reflect </a:t>
-            </a:r>
-            <a:r>
-              <a:rPr lang="en-US" sz="1600" dirty="0">
-                <a:latin typeface="Times New Roman" panose="02020603050405020304" pitchFamily="18" charset="0"/>
-                <a:cs typeface="Times New Roman" panose="02020603050405020304" pitchFamily="18" charset="0"/>
-              </a:rPr>
-              <a:t>False-Positive or Fraud. Make sure case owner is set to On-Call and your name is in the Tier 2 Rep field or you will not be paid</a:t>
-            </a:r>
-            <a:r>
-              <a:rPr lang="en-US" sz="1600" dirty="0" smtClean="0">
-                <a:latin typeface="Times New Roman" panose="02020603050405020304" pitchFamily="18" charset="0"/>
-                <a:cs typeface="Times New Roman" panose="02020603050405020304" pitchFamily="18" charset="0"/>
-              </a:rPr>
-              <a:t>.</a:t>
-            </a:r>
-            <a:endParaRPr lang="en-US" sz="1600" dirty="0">
-              <a:latin typeface="Times New Roman" panose="02020603050405020304" pitchFamily="18" charset="0"/>
-              <a:cs typeface="Times New Roman" panose="02020603050405020304" pitchFamily="18" charset="0"/>
-            </a:endParaRPr>
-          </a:p>
-          <a:p>
-            <a:pPr marL="342900" indent="-342900">
-              <a:buFont typeface="+mj-lt"/>
-              <a:buAutoNum type="arabicPeriod"/>
-            </a:pPr>
-            <a:r>
-              <a:rPr lang="en-US" sz="1600" dirty="0">
-                <a:latin typeface="Times New Roman" panose="02020603050405020304" pitchFamily="18" charset="0"/>
-                <a:cs typeface="Times New Roman" panose="02020603050405020304" pitchFamily="18" charset="0"/>
-              </a:rPr>
-              <a:t>Close Ticket “Resolved</a:t>
-            </a:r>
-            <a:r>
-              <a:rPr lang="en-US" sz="1600" dirty="0" smtClean="0">
-                <a:latin typeface="Times New Roman" panose="02020603050405020304" pitchFamily="18" charset="0"/>
-                <a:cs typeface="Times New Roman" panose="02020603050405020304" pitchFamily="18" charset="0"/>
-              </a:rPr>
-              <a:t>”</a:t>
-            </a:r>
-            <a:endParaRPr lang="en-US" sz="1600" dirty="0">
-              <a:latin typeface="Times New Roman" panose="02020603050405020304" pitchFamily="18" charset="0"/>
-              <a:cs typeface="Times New Roman" panose="02020603050405020304" pitchFamily="18" charset="0"/>
-            </a:endParaRPr>
-          </a:p>
-          <a:p>
-            <a:pPr marL="342900" indent="-342900">
-              <a:buFont typeface="+mj-lt"/>
-              <a:buAutoNum type="arabicPeriod"/>
-            </a:pPr>
-            <a:r>
-              <a:rPr lang="en-US" sz="1600" dirty="0" smtClean="0">
-                <a:latin typeface="Times New Roman" panose="02020603050405020304" pitchFamily="18" charset="0"/>
-                <a:cs typeface="Times New Roman" panose="02020603050405020304" pitchFamily="18" charset="0"/>
-              </a:rPr>
-              <a:t>Send an </a:t>
-            </a:r>
-            <a:r>
-              <a:rPr lang="en-US" sz="1600" dirty="0">
-                <a:latin typeface="Times New Roman" panose="02020603050405020304" pitchFamily="18" charset="0"/>
-                <a:cs typeface="Times New Roman" panose="02020603050405020304" pitchFamily="18" charset="0"/>
-              </a:rPr>
-              <a:t>email to </a:t>
-            </a:r>
-            <a:r>
-              <a:rPr lang="en-US" sz="1600" dirty="0" smtClean="0">
-                <a:latin typeface="Times New Roman" panose="02020603050405020304" pitchFamily="18" charset="0"/>
-                <a:cs typeface="Times New Roman" panose="02020603050405020304" pitchFamily="18" charset="0"/>
-                <a:hlinkClick r:id="rId2"/>
-              </a:rPr>
-              <a:t>FraudandAbuseTeam-vb@vonage.com</a:t>
-            </a:r>
-            <a:r>
-              <a:rPr lang="en-US" sz="1600" dirty="0" smtClean="0">
-                <a:latin typeface="Times New Roman" panose="02020603050405020304" pitchFamily="18" charset="0"/>
-                <a:cs typeface="Times New Roman" panose="02020603050405020304" pitchFamily="18" charset="0"/>
-              </a:rPr>
-              <a:t> for </a:t>
-            </a:r>
-            <a:r>
-              <a:rPr lang="en-US" sz="1600" dirty="0">
-                <a:latin typeface="Times New Roman" panose="02020603050405020304" pitchFamily="18" charset="0"/>
-                <a:cs typeface="Times New Roman" panose="02020603050405020304" pitchFamily="18" charset="0"/>
-              </a:rPr>
-              <a:t>any actual Frauds </a:t>
-            </a:r>
-            <a:r>
-              <a:rPr lang="en-US" sz="1600" dirty="0" smtClean="0">
-                <a:latin typeface="Times New Roman" panose="02020603050405020304" pitchFamily="18" charset="0"/>
-                <a:cs typeface="Times New Roman" panose="02020603050405020304" pitchFamily="18" charset="0"/>
-              </a:rPr>
-              <a:t>at the </a:t>
-            </a:r>
-            <a:r>
-              <a:rPr lang="en-US" sz="1600" dirty="0">
-                <a:latin typeface="Times New Roman" panose="02020603050405020304" pitchFamily="18" charset="0"/>
-                <a:cs typeface="Times New Roman" panose="02020603050405020304" pitchFamily="18" charset="0"/>
-              </a:rPr>
-              <a:t>next day so the total charges can be calculated.</a:t>
-            </a:r>
-          </a:p>
-          <a:p>
-            <a:endParaRPr lang="en-US" dirty="0"/>
           </a:p>
         </p:txBody>
       </p:sp>
@@ -17332,10 +17165,209 @@
           </a:p>
         </p:txBody>
       </p:sp>
+      <p:pic>
+        <p:nvPicPr>
+          <p:cNvPr id="8" name="Picture 7"/>
+          <p:cNvPicPr>
+            <a:picLocks noChangeAspect="1"/>
+          </p:cNvPicPr>
+          <p:nvPr/>
+        </p:nvPicPr>
+        <p:blipFill>
+          <a:blip r:embed="rId2">
+            <a:extLst>
+              <a:ext uri="{28A0092B-C50C-407E-A947-70E740481C1C}">
+                <a14:useLocalDpi xmlns:a14="http://schemas.microsoft.com/office/drawing/2010/main" val="0"/>
+              </a:ext>
+            </a:extLst>
+          </a:blip>
+          <a:stretch>
+            <a:fillRect/>
+          </a:stretch>
+        </p:blipFill>
+        <p:spPr>
+          <a:xfrm>
+            <a:off x="4343400" y="1066800"/>
+            <a:ext cx="4724400" cy="5490168"/>
+          </a:xfrm>
+          <a:prstGeom prst="rect">
+            <a:avLst/>
+          </a:prstGeom>
+        </p:spPr>
+      </p:pic>
+      <p:sp>
+        <p:nvSpPr>
+          <p:cNvPr id="9" name="TextBox 8"/>
+          <p:cNvSpPr txBox="1"/>
+          <p:nvPr/>
+        </p:nvSpPr>
+        <p:spPr>
+          <a:xfrm>
+            <a:off x="304800" y="1262535"/>
+            <a:ext cx="4038600" cy="5293757"/>
+          </a:xfrm>
+          <a:prstGeom prst="rect">
+            <a:avLst/>
+          </a:prstGeom>
+          <a:noFill/>
+        </p:spPr>
+        <p:txBody>
+          <a:bodyPr wrap="square" rtlCol="0">
+            <a:spAutoFit/>
+          </a:bodyPr>
+          <a:lstStyle/>
+          <a:p>
+            <a:pPr marL="285750" indent="-285750">
+              <a:buFont typeface="Wingdings" panose="05000000000000000000" pitchFamily="2" charset="2"/>
+              <a:buChar char="Ø"/>
+            </a:pPr>
+            <a:r>
+              <a:rPr lang="en-US" sz="1400" dirty="0" smtClean="0">
+                <a:solidFill>
+                  <a:schemeClr val="bg2"/>
+                </a:solidFill>
+              </a:rPr>
+              <a:t>Change the Fraud Type according to the alert you receive, i.e. Root, Domestic, Vonage, or Spending</a:t>
+            </a:r>
+          </a:p>
+          <a:p>
+            <a:pPr marL="285750" indent="-285750">
+              <a:buFont typeface="Wingdings" panose="05000000000000000000" pitchFamily="2" charset="2"/>
+              <a:buChar char="Ø"/>
+            </a:pPr>
+            <a:endParaRPr lang="en-US" sz="1400" dirty="0">
+              <a:solidFill>
+                <a:schemeClr val="bg2"/>
+              </a:solidFill>
+            </a:endParaRPr>
+          </a:p>
+          <a:p>
+            <a:pPr marL="285750" indent="-285750">
+              <a:buFont typeface="Wingdings" panose="05000000000000000000" pitchFamily="2" charset="2"/>
+              <a:buChar char="Ø"/>
+            </a:pPr>
+            <a:r>
+              <a:rPr lang="en-US" sz="1400" dirty="0" smtClean="0">
+                <a:solidFill>
+                  <a:schemeClr val="bg2"/>
+                </a:solidFill>
+              </a:rPr>
+              <a:t>Make sure your previous call example is at least 2 weeks prior to the current date</a:t>
+            </a:r>
+          </a:p>
+          <a:p>
+            <a:pPr marL="285750" indent="-285750">
+              <a:buFont typeface="Wingdings" panose="05000000000000000000" pitchFamily="2" charset="2"/>
+              <a:buChar char="Ø"/>
+            </a:pPr>
+            <a:endParaRPr lang="en-US" sz="1400" dirty="0">
+              <a:solidFill>
+                <a:schemeClr val="bg2"/>
+              </a:solidFill>
+            </a:endParaRPr>
+          </a:p>
+          <a:p>
+            <a:pPr marL="285750" indent="-285750">
+              <a:buFont typeface="Wingdings" panose="05000000000000000000" pitchFamily="2" charset="2"/>
+              <a:buChar char="Ø"/>
+            </a:pPr>
+            <a:r>
+              <a:rPr lang="en-US" sz="1400" dirty="0" smtClean="0">
+                <a:solidFill>
+                  <a:schemeClr val="bg2"/>
+                </a:solidFill>
+              </a:rPr>
+              <a:t>Provide adequate explanation and supporting screenshots within the findings section</a:t>
+            </a:r>
+          </a:p>
+          <a:p>
+            <a:pPr marL="285750" indent="-285750">
+              <a:buFont typeface="Wingdings" panose="05000000000000000000" pitchFamily="2" charset="2"/>
+              <a:buChar char="Ø"/>
+            </a:pPr>
+            <a:endParaRPr lang="en-US" sz="1400" dirty="0">
+              <a:solidFill>
+                <a:schemeClr val="bg2"/>
+              </a:solidFill>
+            </a:endParaRPr>
+          </a:p>
+          <a:p>
+            <a:pPr marL="285750" indent="-285750">
+              <a:buFont typeface="Wingdings" panose="05000000000000000000" pitchFamily="2" charset="2"/>
+              <a:buChar char="Ø"/>
+            </a:pPr>
+            <a:r>
+              <a:rPr lang="en-US" sz="1400" dirty="0" smtClean="0">
+                <a:solidFill>
+                  <a:schemeClr val="bg2"/>
+                </a:solidFill>
+              </a:rPr>
+              <a:t>This template can also be used for investigations that you determine to be Fraud.</a:t>
+            </a:r>
+          </a:p>
+          <a:p>
+            <a:pPr marL="285750" indent="-285750">
+              <a:buFont typeface="Wingdings" panose="05000000000000000000" pitchFamily="2" charset="2"/>
+              <a:buChar char="Ø"/>
+            </a:pPr>
+            <a:endParaRPr lang="en-US" sz="1400" dirty="0">
+              <a:solidFill>
+                <a:schemeClr val="bg2"/>
+              </a:solidFill>
+            </a:endParaRPr>
+          </a:p>
+          <a:p>
+            <a:pPr marL="285750" indent="-285750">
+              <a:buFont typeface="Wingdings" panose="05000000000000000000" pitchFamily="2" charset="2"/>
+              <a:buChar char="Ø"/>
+            </a:pPr>
+            <a:r>
+              <a:rPr lang="en-US" sz="1400" dirty="0" smtClean="0">
+                <a:solidFill>
+                  <a:schemeClr val="bg2"/>
+                </a:solidFill>
+              </a:rPr>
+              <a:t>Using this template will ensure that you have a thorough investigation and are more likely to identify investigations correctly. </a:t>
+            </a:r>
+          </a:p>
+          <a:p>
+            <a:endParaRPr lang="en-US" sz="1400" dirty="0">
+              <a:solidFill>
+                <a:schemeClr val="bg2"/>
+              </a:solidFill>
+            </a:endParaRPr>
+          </a:p>
+          <a:p>
+            <a:r>
+              <a:rPr lang="en-US" sz="1400" b="1" dirty="0" smtClean="0">
+                <a:solidFill>
+                  <a:schemeClr val="bg2"/>
+                </a:solidFill>
+              </a:rPr>
+              <a:t>**Please note: </a:t>
+            </a:r>
+            <a:r>
+              <a:rPr lang="en-US" sz="1400" dirty="0" smtClean="0">
+                <a:solidFill>
+                  <a:schemeClr val="bg2"/>
+                </a:solidFill>
+              </a:rPr>
+              <a:t>if you do not use this template and the information you provide is not adequate we will take ownership of your on call case to do a proper investigation. This mean you will not get paid for that case. </a:t>
+            </a:r>
+          </a:p>
+          <a:p>
+            <a:pPr marL="285750" indent="-285750">
+              <a:buFont typeface="Wingdings" panose="05000000000000000000" pitchFamily="2" charset="2"/>
+              <a:buChar char="Ø"/>
+            </a:pPr>
+            <a:endParaRPr lang="en-US" dirty="0"/>
+          </a:p>
+        </p:txBody>
+      </p:sp>
     </p:spTree>
     <p:extLst>
       <p:ext uri="{BB962C8B-B14F-4D97-AF65-F5344CB8AC3E}">
-        <p14:creationId xmlns:p14="http://schemas.microsoft.com/office/powerpoint/2010/main" val="3464281621"/>
+        <p14:creationId xmlns:p14="http://schemas.microsoft.com/office/powerpoint/2010/main" val="182849286"/>
       </p:ext>
     </p:extLst>
   </p:cSld>
@@ -17371,7 +17403,7 @@
       </p:grpSpPr>
       <p:sp>
         <p:nvSpPr>
-          <p:cNvPr id="6" name="Title 5"/>
+          <p:cNvPr id="2" name="Title 1"/>
           <p:cNvSpPr>
             <a:spLocks noGrp="1"/>
           </p:cNvSpPr>
@@ -17385,69 +17417,309 @@
           <a:lstStyle/>
           <a:p>
             <a:r>
-              <a:rPr lang="en-US" dirty="0" smtClean="0"/>
-              <a:t>Begin Your Investigation </a:t>
-            </a:r>
-            <a:endParaRPr lang="en-US" dirty="0"/>
-          </a:p>
-        </p:txBody>
-      </p:sp>
-      <p:sp>
-        <p:nvSpPr>
-          <p:cNvPr id="7" name="Content Placeholder 6"/>
+              <a:rPr lang="en-US" sz="4800" dirty="0" smtClean="0">
+                <a:latin typeface="Impact" panose="020B0806030902050204" pitchFamily="34" charset="0"/>
+              </a:rPr>
+              <a:t>Investigation Steps</a:t>
+            </a:r>
+            <a:endParaRPr lang="en-US" sz="4800" dirty="0">
+              <a:latin typeface="Impact" panose="020B0806030902050204" pitchFamily="34" charset="0"/>
+            </a:endParaRPr>
+          </a:p>
+        </p:txBody>
+      </p:sp>
+      <p:sp>
+        <p:nvSpPr>
+          <p:cNvPr id="3" name="Content Placeholder 2"/>
           <p:cNvSpPr>
             <a:spLocks noGrp="1"/>
           </p:cNvSpPr>
           <p:nvPr>
-            <p:ph sz="half" idx="1"/>
-          </p:nvPr>
-        </p:nvSpPr>
-        <p:spPr>
-          <a:xfrm>
-            <a:off x="381001" y="1371600"/>
-            <a:ext cx="3505199" cy="4768850"/>
-          </a:xfrm>
-        </p:spPr>
+            <p:ph idx="1"/>
+          </p:nvPr>
+        </p:nvSpPr>
+        <p:spPr/>
         <p:txBody>
           <a:bodyPr/>
           <a:lstStyle/>
           <a:p>
-            <a:pPr>
-              <a:buFont typeface="Wingdings" panose="05000000000000000000" pitchFamily="2" charset="2"/>
-              <a:buChar char="Ø"/>
+            <a:pPr marL="342900" indent="-342900">
+              <a:buFont typeface="+mj-lt"/>
+              <a:buAutoNum type="arabicPeriod"/>
             </a:pPr>
             <a:r>
-              <a:rPr lang="en-US" sz="1600" dirty="0" smtClean="0"/>
-              <a:t>You will begin you investigation by looking at the account registration page.</a:t>
-            </a:r>
-          </a:p>
-          <a:p>
-            <a:pPr>
-              <a:buFont typeface="Wingdings" panose="05000000000000000000" pitchFamily="2" charset="2"/>
-              <a:buChar char="Ø"/>
+              <a:rPr lang="en-US" sz="1600" dirty="0">
+                <a:latin typeface="Times New Roman" panose="02020603050405020304" pitchFamily="18" charset="0"/>
+                <a:cs typeface="Times New Roman" panose="02020603050405020304" pitchFamily="18" charset="0"/>
+              </a:rPr>
+              <a:t>After the Fraud alert comes to the On-Call phone forward that email to yourself in Outlook</a:t>
+            </a:r>
+            <a:r>
+              <a:rPr lang="en-US" sz="1600" dirty="0" smtClean="0">
+                <a:latin typeface="Times New Roman" panose="02020603050405020304" pitchFamily="18" charset="0"/>
+                <a:cs typeface="Times New Roman" panose="02020603050405020304" pitchFamily="18" charset="0"/>
+              </a:rPr>
+              <a:t>.</a:t>
+            </a:r>
+            <a:endParaRPr lang="en-US" sz="1600" dirty="0">
+              <a:latin typeface="Times New Roman" panose="02020603050405020304" pitchFamily="18" charset="0"/>
+              <a:cs typeface="Times New Roman" panose="02020603050405020304" pitchFamily="18" charset="0"/>
+            </a:endParaRPr>
+          </a:p>
+          <a:p>
+            <a:pPr marL="342900" indent="-342900">
+              <a:buFont typeface="+mj-lt"/>
+              <a:buAutoNum type="arabicPeriod"/>
             </a:pPr>
             <a:r>
-              <a:rPr lang="en-US" sz="1600" dirty="0" smtClean="0"/>
-              <a:t>Compare the IP </a:t>
-            </a:r>
-            <a:r>
-              <a:rPr lang="en-US" sz="1600" dirty="0" smtClean="0"/>
-              <a:t>addresses of </a:t>
-            </a:r>
-            <a:r>
-              <a:rPr lang="en-US" sz="1600" dirty="0" smtClean="0"/>
-              <a:t>the registered devices with the alert.</a:t>
-            </a:r>
-          </a:p>
-          <a:p>
-            <a:pPr>
-              <a:buFont typeface="Wingdings" panose="05000000000000000000" pitchFamily="2" charset="2"/>
-              <a:buChar char="Ø"/>
+              <a:rPr lang="en-US" sz="1600" dirty="0">
+                <a:latin typeface="Times New Roman" panose="02020603050405020304" pitchFamily="18" charset="0"/>
+                <a:cs typeface="Times New Roman" panose="02020603050405020304" pitchFamily="18" charset="0"/>
+              </a:rPr>
+              <a:t>From Outlook “Reply All” (Potential Fraud &amp; CCare On-Call 1) with “Investigating”. Make sure your reply includes your Outlook signature</a:t>
+            </a:r>
+            <a:r>
+              <a:rPr lang="en-US" sz="1600" dirty="0" smtClean="0">
+                <a:latin typeface="Times New Roman" panose="02020603050405020304" pitchFamily="18" charset="0"/>
+                <a:cs typeface="Times New Roman" panose="02020603050405020304" pitchFamily="18" charset="0"/>
+              </a:rPr>
+              <a:t>.</a:t>
+            </a:r>
+            <a:endParaRPr lang="en-US" sz="1600" dirty="0">
+              <a:latin typeface="Times New Roman" panose="02020603050405020304" pitchFamily="18" charset="0"/>
+              <a:cs typeface="Times New Roman" panose="02020603050405020304" pitchFamily="18" charset="0"/>
+            </a:endParaRPr>
+          </a:p>
+          <a:p>
+            <a:pPr marL="342900" indent="-342900">
+              <a:buFont typeface="+mj-lt"/>
+              <a:buAutoNum type="arabicPeriod"/>
             </a:pPr>
             <a:r>
-              <a:rPr lang="en-US" sz="1600" dirty="0" smtClean="0"/>
-              <a:t>Look for duplicate SIP IDs and suspicious devices</a:t>
-            </a:r>
+              <a:rPr lang="en-US" sz="1600" dirty="0">
+                <a:latin typeface="Times New Roman" panose="02020603050405020304" pitchFamily="18" charset="0"/>
+                <a:cs typeface="Times New Roman" panose="02020603050405020304" pitchFamily="18" charset="0"/>
+              </a:rPr>
+              <a:t>Check the Account and see if a ticket was created in Salesforce if not create one. Insure you change case owner to On-Call and place your name in the Tier 2 Rep field</a:t>
+            </a:r>
+            <a:r>
+              <a:rPr lang="en-US" sz="1600" dirty="0" smtClean="0">
+                <a:latin typeface="Times New Roman" panose="02020603050405020304" pitchFamily="18" charset="0"/>
+                <a:cs typeface="Times New Roman" panose="02020603050405020304" pitchFamily="18" charset="0"/>
+              </a:rPr>
+              <a:t>.</a:t>
+            </a:r>
+            <a:endParaRPr lang="en-US" sz="1600" dirty="0">
+              <a:latin typeface="Times New Roman" panose="02020603050405020304" pitchFamily="18" charset="0"/>
+              <a:cs typeface="Times New Roman" panose="02020603050405020304" pitchFamily="18" charset="0"/>
+            </a:endParaRPr>
+          </a:p>
+          <a:p>
+            <a:pPr marL="342900" indent="-342900">
+              <a:buFont typeface="+mj-lt"/>
+              <a:buAutoNum type="arabicPeriod"/>
+            </a:pPr>
+            <a:r>
+              <a:rPr lang="en-US" sz="1600" dirty="0">
+                <a:latin typeface="Times New Roman" panose="02020603050405020304" pitchFamily="18" charset="0"/>
+                <a:cs typeface="Times New Roman" panose="02020603050405020304" pitchFamily="18" charset="0"/>
+              </a:rPr>
+              <a:t>Copy the </a:t>
+            </a:r>
+            <a:r>
+              <a:rPr lang="en-US" sz="1600" dirty="0" smtClean="0">
+                <a:latin typeface="Times New Roman" panose="02020603050405020304" pitchFamily="18" charset="0"/>
+                <a:cs typeface="Times New Roman" panose="02020603050405020304" pitchFamily="18" charset="0"/>
+              </a:rPr>
+              <a:t>message body of the </a:t>
+            </a:r>
+            <a:r>
+              <a:rPr lang="en-US" sz="1600" dirty="0">
+                <a:latin typeface="Times New Roman" panose="02020603050405020304" pitchFamily="18" charset="0"/>
+                <a:cs typeface="Times New Roman" panose="02020603050405020304" pitchFamily="18" charset="0"/>
+              </a:rPr>
+              <a:t>Alert and paste them into the Salesforce Description, be sure to include the type of Fraud Alert i.e.: Root, Domestic, Vonage, or Spending</a:t>
+            </a:r>
+            <a:r>
+              <a:rPr lang="en-US" sz="1600" dirty="0" smtClean="0">
+                <a:latin typeface="Times New Roman" panose="02020603050405020304" pitchFamily="18" charset="0"/>
+                <a:cs typeface="Times New Roman" panose="02020603050405020304" pitchFamily="18" charset="0"/>
+              </a:rPr>
+              <a:t>.</a:t>
+            </a:r>
+            <a:endParaRPr lang="en-US" sz="1600" dirty="0">
+              <a:latin typeface="Times New Roman" panose="02020603050405020304" pitchFamily="18" charset="0"/>
+              <a:cs typeface="Times New Roman" panose="02020603050405020304" pitchFamily="18" charset="0"/>
+            </a:endParaRPr>
+          </a:p>
+          <a:p>
+            <a:pPr marL="342900" indent="-342900">
+              <a:buFont typeface="+mj-lt"/>
+              <a:buAutoNum type="arabicPeriod"/>
+            </a:pPr>
+            <a:r>
+              <a:rPr lang="en-US" sz="1600" dirty="0">
+                <a:latin typeface="Times New Roman" panose="02020603050405020304" pitchFamily="18" charset="0"/>
+                <a:cs typeface="Times New Roman" panose="02020603050405020304" pitchFamily="18" charset="0"/>
+              </a:rPr>
+              <a:t>Thoroughly investigate the potential Fraud and make your determination whether it’s a False-Positive or Fraud</a:t>
+            </a:r>
+            <a:r>
+              <a:rPr lang="en-US" sz="1600" dirty="0" smtClean="0">
+                <a:latin typeface="Times New Roman" panose="02020603050405020304" pitchFamily="18" charset="0"/>
+                <a:cs typeface="Times New Roman" panose="02020603050405020304" pitchFamily="18" charset="0"/>
+              </a:rPr>
+              <a:t>.</a:t>
+            </a:r>
+            <a:endParaRPr lang="en-US" sz="1600" dirty="0">
+              <a:latin typeface="Times New Roman" panose="02020603050405020304" pitchFamily="18" charset="0"/>
+              <a:cs typeface="Times New Roman" panose="02020603050405020304" pitchFamily="18" charset="0"/>
+            </a:endParaRPr>
+          </a:p>
+          <a:p>
+            <a:pPr marL="342900" indent="-342900">
+              <a:buFont typeface="+mj-lt"/>
+              <a:buAutoNum type="arabicPeriod"/>
+            </a:pPr>
+            <a:r>
+              <a:rPr lang="en-US" sz="1600" dirty="0">
+                <a:latin typeface="Times New Roman" panose="02020603050405020304" pitchFamily="18" charset="0"/>
+                <a:cs typeface="Times New Roman" panose="02020603050405020304" pitchFamily="18" charset="0"/>
+              </a:rPr>
+              <a:t> From Outlook “Reply All” to the Alert with your investigation notes. (see examples below</a:t>
+            </a:r>
+            <a:r>
+              <a:rPr lang="en-US" sz="1600" dirty="0" smtClean="0">
+                <a:latin typeface="Times New Roman" panose="02020603050405020304" pitchFamily="18" charset="0"/>
+                <a:cs typeface="Times New Roman" panose="02020603050405020304" pitchFamily="18" charset="0"/>
+              </a:rPr>
+              <a:t>)</a:t>
+            </a:r>
+            <a:endParaRPr lang="en-US" sz="1600" dirty="0">
+              <a:latin typeface="Times New Roman" panose="02020603050405020304" pitchFamily="18" charset="0"/>
+              <a:cs typeface="Times New Roman" panose="02020603050405020304" pitchFamily="18" charset="0"/>
+            </a:endParaRPr>
+          </a:p>
+          <a:p>
+            <a:pPr marL="342900" indent="-342900">
+              <a:buFont typeface="+mj-lt"/>
+              <a:buAutoNum type="arabicPeriod"/>
+            </a:pPr>
+            <a:r>
+              <a:rPr lang="en-US" sz="1600" dirty="0">
+                <a:latin typeface="Times New Roman" panose="02020603050405020304" pitchFamily="18" charset="0"/>
+                <a:cs typeface="Times New Roman" panose="02020603050405020304" pitchFamily="18" charset="0"/>
+              </a:rPr>
+              <a:t>Update your salesforce ticket with your investigation notes in the “Log Call” section change Problem </a:t>
+            </a:r>
+            <a:r>
+              <a:rPr lang="en-US" sz="1600" dirty="0" smtClean="0">
+                <a:latin typeface="Times New Roman" panose="02020603050405020304" pitchFamily="18" charset="0"/>
+                <a:cs typeface="Times New Roman" panose="02020603050405020304" pitchFamily="18" charset="0"/>
+              </a:rPr>
+              <a:t>Code to “Fraud Alert” and Problem Code II to reflect </a:t>
+            </a:r>
+            <a:r>
+              <a:rPr lang="en-US" sz="1600" dirty="0">
+                <a:latin typeface="Times New Roman" panose="02020603050405020304" pitchFamily="18" charset="0"/>
+                <a:cs typeface="Times New Roman" panose="02020603050405020304" pitchFamily="18" charset="0"/>
+              </a:rPr>
+              <a:t>False-Positive or Fraud. Make sure case owner is set to On-Call and your name is in the Tier 2 Rep field or you will not be paid</a:t>
+            </a:r>
+            <a:r>
+              <a:rPr lang="en-US" sz="1600" dirty="0" smtClean="0">
+                <a:latin typeface="Times New Roman" panose="02020603050405020304" pitchFamily="18" charset="0"/>
+                <a:cs typeface="Times New Roman" panose="02020603050405020304" pitchFamily="18" charset="0"/>
+              </a:rPr>
+              <a:t>.</a:t>
+            </a:r>
+            <a:endParaRPr lang="en-US" sz="1600" dirty="0">
+              <a:latin typeface="Times New Roman" panose="02020603050405020304" pitchFamily="18" charset="0"/>
+              <a:cs typeface="Times New Roman" panose="02020603050405020304" pitchFamily="18" charset="0"/>
+            </a:endParaRPr>
+          </a:p>
+          <a:p>
+            <a:pPr marL="342900" indent="-342900">
+              <a:buFont typeface="+mj-lt"/>
+              <a:buAutoNum type="arabicPeriod"/>
+            </a:pPr>
+            <a:r>
+              <a:rPr lang="en-US" sz="1600" dirty="0">
+                <a:latin typeface="Times New Roman" panose="02020603050405020304" pitchFamily="18" charset="0"/>
+                <a:cs typeface="Times New Roman" panose="02020603050405020304" pitchFamily="18" charset="0"/>
+              </a:rPr>
+              <a:t>Close Ticket “Resolved</a:t>
+            </a:r>
+            <a:r>
+              <a:rPr lang="en-US" sz="1600" dirty="0" smtClean="0">
+                <a:latin typeface="Times New Roman" panose="02020603050405020304" pitchFamily="18" charset="0"/>
+                <a:cs typeface="Times New Roman" panose="02020603050405020304" pitchFamily="18" charset="0"/>
+              </a:rPr>
+              <a:t>”</a:t>
+            </a:r>
+            <a:endParaRPr lang="en-US" sz="1600" dirty="0">
+              <a:latin typeface="Times New Roman" panose="02020603050405020304" pitchFamily="18" charset="0"/>
+              <a:cs typeface="Times New Roman" panose="02020603050405020304" pitchFamily="18" charset="0"/>
+            </a:endParaRPr>
+          </a:p>
+          <a:p>
+            <a:pPr marL="342900" indent="-342900">
+              <a:buFont typeface="+mj-lt"/>
+              <a:buAutoNum type="arabicPeriod"/>
+            </a:pPr>
+            <a:r>
+              <a:rPr lang="en-US" sz="1600" dirty="0" smtClean="0">
+                <a:latin typeface="Times New Roman" panose="02020603050405020304" pitchFamily="18" charset="0"/>
+                <a:cs typeface="Times New Roman" panose="02020603050405020304" pitchFamily="18" charset="0"/>
+              </a:rPr>
+              <a:t>Send an </a:t>
+            </a:r>
+            <a:r>
+              <a:rPr lang="en-US" sz="1600" dirty="0">
+                <a:latin typeface="Times New Roman" panose="02020603050405020304" pitchFamily="18" charset="0"/>
+                <a:cs typeface="Times New Roman" panose="02020603050405020304" pitchFamily="18" charset="0"/>
+              </a:rPr>
+              <a:t>email to </a:t>
+            </a:r>
+            <a:r>
+              <a:rPr lang="en-US" sz="1600" dirty="0" smtClean="0">
+                <a:latin typeface="Times New Roman" panose="02020603050405020304" pitchFamily="18" charset="0"/>
+                <a:cs typeface="Times New Roman" panose="02020603050405020304" pitchFamily="18" charset="0"/>
+                <a:hlinkClick r:id="rId2"/>
+              </a:rPr>
+              <a:t>FraudandAbuseTeam-vb@vonage.com</a:t>
+            </a:r>
+            <a:r>
+              <a:rPr lang="en-US" sz="1600" dirty="0" smtClean="0">
+                <a:latin typeface="Times New Roman" panose="02020603050405020304" pitchFamily="18" charset="0"/>
+                <a:cs typeface="Times New Roman" panose="02020603050405020304" pitchFamily="18" charset="0"/>
+              </a:rPr>
+              <a:t> for </a:t>
+            </a:r>
+            <a:r>
+              <a:rPr lang="en-US" sz="1600" dirty="0">
+                <a:latin typeface="Times New Roman" panose="02020603050405020304" pitchFamily="18" charset="0"/>
+                <a:cs typeface="Times New Roman" panose="02020603050405020304" pitchFamily="18" charset="0"/>
+              </a:rPr>
+              <a:t>any actual Frauds </a:t>
+            </a:r>
+            <a:r>
+              <a:rPr lang="en-US" sz="1600" dirty="0" smtClean="0">
+                <a:latin typeface="Times New Roman" panose="02020603050405020304" pitchFamily="18" charset="0"/>
+                <a:cs typeface="Times New Roman" panose="02020603050405020304" pitchFamily="18" charset="0"/>
+              </a:rPr>
+              <a:t>at the </a:t>
+            </a:r>
+            <a:r>
+              <a:rPr lang="en-US" sz="1600" dirty="0">
+                <a:latin typeface="Times New Roman" panose="02020603050405020304" pitchFamily="18" charset="0"/>
+                <a:cs typeface="Times New Roman" panose="02020603050405020304" pitchFamily="18" charset="0"/>
+              </a:rPr>
+              <a:t>next day so the total charges can be calculated.</a:t>
+            </a:r>
+          </a:p>
+          <a:p>
+            <a:endParaRPr lang="en-US" dirty="0"/>
           </a:p>
         </p:txBody>
       </p:sp>
@@ -17469,7 +17741,7 @@
             <a:pPr>
               <a:defRPr/>
             </a:pPr>
-            <a:fld id="{D3208C8F-5341-4944-8C08-C55337151DB1}" type="slidenum">
+            <a:fld id="{16514749-0C09-4910-A1F5-A5A3B603506F}" type="slidenum">
               <a:rPr lang="en-US" smtClean="0">
                 <a:solidFill>
                   <a:srgbClr val="FFFFFF"/>
@@ -17480,7 +17752,7 @@
               </a:pPr>
               <a:t>9</a:t>
             </a:fld>
-            <a:endParaRPr lang="en-US" dirty="0">
+            <a:endParaRPr lang="en-US">
               <a:solidFill>
                 <a:srgbClr val="FFFFFF"/>
               </a:solidFill>
@@ -17488,48 +17760,10 @@
           </a:p>
         </p:txBody>
       </p:sp>
-      <p:pic>
-        <p:nvPicPr>
-          <p:cNvPr id="14" name="Content Placeholder 13"/>
-          <p:cNvPicPr>
-            <a:picLocks noGrp="1" noChangeAspect="1"/>
-          </p:cNvPicPr>
-          <p:nvPr>
-            <p:ph sz="half" idx="2"/>
-          </p:nvPr>
-        </p:nvPicPr>
-        <p:blipFill>
-          <a:blip r:embed="rId2" cstate="print">
-            <a:extLst>
-              <a:ext uri="{BEBA8EAE-BF5A-486C-A8C5-ECC9F3942E4B}">
-                <a14:imgProps xmlns:a14="http://schemas.microsoft.com/office/drawing/2010/main">
-                  <a14:imgLayer r:embed="rId3">
-                    <a14:imgEffect>
-                      <a14:sharpenSoften amount="50000"/>
-                    </a14:imgEffect>
-                  </a14:imgLayer>
-                </a14:imgProps>
-              </a:ext>
-              <a:ext uri="{28A0092B-C50C-407E-A947-70E740481C1C}">
-                <a14:useLocalDpi xmlns:a14="http://schemas.microsoft.com/office/drawing/2010/main" val="0"/>
-              </a:ext>
-            </a:extLst>
-          </a:blip>
-          <a:stretch>
-            <a:fillRect/>
-          </a:stretch>
-        </p:blipFill>
-        <p:spPr>
-          <a:xfrm>
-            <a:off x="3886200" y="1447800"/>
-            <a:ext cx="4908550" cy="4724399"/>
-          </a:xfrm>
-        </p:spPr>
-      </p:pic>
     </p:spTree>
     <p:extLst>
       <p:ext uri="{BB962C8B-B14F-4D97-AF65-F5344CB8AC3E}">
-        <p14:creationId xmlns:p14="http://schemas.microsoft.com/office/powerpoint/2010/main" val="1031350540"/>
+        <p14:creationId xmlns:p14="http://schemas.microsoft.com/office/powerpoint/2010/main" val="3464281621"/>
       </p:ext>
     </p:extLst>
   </p:cSld>

</xml_diff>

<commit_message>
Modified wording and added examples
</commit_message>
<xml_diff>
--- a/On-CallFraudProcedures.pptx
+++ b/On-CallFraudProcedures.pptx
@@ -18,8 +18,8 @@
     <p:sldId id="295" r:id="rId9"/>
     <p:sldId id="296" r:id="rId10"/>
     <p:sldId id="297" r:id="rId11"/>
-    <p:sldId id="298" r:id="rId12"/>
-    <p:sldId id="285" r:id="rId13"/>
+    <p:sldId id="285" r:id="rId12"/>
+    <p:sldId id="298" r:id="rId13"/>
     <p:sldId id="288" r:id="rId14"/>
     <p:sldId id="289" r:id="rId15"/>
     <p:sldId id="290" r:id="rId16"/>
@@ -14813,13 +14813,8 @@
             </a:pPr>
             <a:r>
               <a:rPr lang="en-US" sz="1600" dirty="0" smtClean="0"/>
-              <a:t>Compare the IP addresses of the registered devices with the alert</a:t>
-            </a:r>
-            <a:r>
-              <a:rPr lang="en-US" sz="1600" dirty="0" smtClean="0"/>
-              <a:t>.</a:t>
-            </a:r>
-            <a:endParaRPr lang="en-US" sz="1600" dirty="0" smtClean="0"/>
+              <a:t>Compare the IP addresses of the registered devices with the alert.</a:t>
+            </a:r>
           </a:p>
           <a:p>
             <a:pPr>
@@ -15178,14 +15173,48 @@
                 <a:latin typeface="Times New Roman" panose="02020603050405020304" pitchFamily="18" charset="0"/>
                 <a:cs typeface="Times New Roman" panose="02020603050405020304" pitchFamily="18" charset="0"/>
               </a:rPr>
-              <a:t>Your next step is to bring up the log analyzer for the </a:t>
-            </a:r>
+              <a:t>Your next step is to bring up the log analyzer for the call triggering the alert</a:t>
+            </a:r>
+          </a:p>
+          <a:p>
+            <a:pPr>
+              <a:buFont typeface="Wingdings" panose="05000000000000000000" pitchFamily="2" charset="2"/>
+              <a:buChar char="Ø"/>
+            </a:pPr>
             <a:r>
               <a:rPr lang="en-US" sz="1600" dirty="0" smtClean="0">
                 <a:latin typeface="Times New Roman" panose="02020603050405020304" pitchFamily="18" charset="0"/>
                 <a:cs typeface="Times New Roman" panose="02020603050405020304" pitchFamily="18" charset="0"/>
               </a:rPr>
-              <a:t>call triggering the alert</a:t>
+              <a:t> Make note of the User Agent </a:t>
+            </a:r>
+            <a:r>
+              <a:rPr lang="en-US" sz="1600" dirty="0" smtClean="0">
+                <a:latin typeface="Times New Roman" panose="02020603050405020304" pitchFamily="18" charset="0"/>
+                <a:cs typeface="Times New Roman" panose="02020603050405020304" pitchFamily="18" charset="0"/>
+              </a:rPr>
+              <a:t>and Initiator Address which </a:t>
+            </a:r>
+            <a:r>
+              <a:rPr lang="en-US" sz="1600" dirty="0" smtClean="0">
+                <a:latin typeface="Times New Roman" panose="02020603050405020304" pitchFamily="18" charset="0"/>
+                <a:cs typeface="Times New Roman" panose="02020603050405020304" pitchFamily="18" charset="0"/>
+              </a:rPr>
+              <a:t>will tell you </a:t>
+            </a:r>
+            <a:r>
+              <a:rPr lang="en-US" sz="1600" dirty="0" smtClean="0">
+                <a:latin typeface="Times New Roman" panose="02020603050405020304" pitchFamily="18" charset="0"/>
+                <a:cs typeface="Times New Roman" panose="02020603050405020304" pitchFamily="18" charset="0"/>
+              </a:rPr>
+              <a:t>the device used to place the call and where the </a:t>
+            </a:r>
+            <a:r>
+              <a:rPr lang="en-US" sz="1600" dirty="0" smtClean="0">
+                <a:latin typeface="Times New Roman" panose="02020603050405020304" pitchFamily="18" charset="0"/>
+                <a:cs typeface="Times New Roman" panose="02020603050405020304" pitchFamily="18" charset="0"/>
+              </a:rPr>
+              <a:t>calls sourced from.</a:t>
             </a:r>
             <a:endParaRPr lang="en-US" sz="1600" dirty="0" smtClean="0">
               <a:latin typeface="Times New Roman" panose="02020603050405020304" pitchFamily="18" charset="0"/>
@@ -15202,34 +15231,35 @@
                 <a:latin typeface="Times New Roman" panose="02020603050405020304" pitchFamily="18" charset="0"/>
                 <a:cs typeface="Times New Roman" panose="02020603050405020304" pitchFamily="18" charset="0"/>
               </a:rPr>
-              <a:t> </a:t>
+              <a:t>Make </a:t>
             </a:r>
             <a:r>
               <a:rPr lang="en-US" sz="1600" dirty="0" smtClean="0">
                 <a:latin typeface="Times New Roman" panose="02020603050405020304" pitchFamily="18" charset="0"/>
                 <a:cs typeface="Times New Roman" panose="02020603050405020304" pitchFamily="18" charset="0"/>
               </a:rPr>
-              <a:t>Make note of the User Agent </a:t>
+              <a:t>sure </a:t>
             </a:r>
             <a:r>
               <a:rPr lang="en-US" sz="1600" dirty="0" smtClean="0">
                 <a:latin typeface="Times New Roman" panose="02020603050405020304" pitchFamily="18" charset="0"/>
                 <a:cs typeface="Times New Roman" panose="02020603050405020304" pitchFamily="18" charset="0"/>
               </a:rPr>
-              <a:t>which will tell you the device that place the calls, and the Initiator Address which will tell you from where the device was when the calls were placed</a:t>
-            </a:r>
-          </a:p>
-          <a:p>
-            <a:pPr>
-              <a:buFont typeface="Wingdings" panose="05000000000000000000" pitchFamily="2" charset="2"/>
-              <a:buChar char="Ø"/>
-            </a:pPr>
+              <a:t>this information is copied and pasted </a:t>
+            </a:r>
             <a:r>
               <a:rPr lang="en-US" sz="1600" dirty="0" smtClean="0">
                 <a:latin typeface="Times New Roman" panose="02020603050405020304" pitchFamily="18" charset="0"/>
                 <a:cs typeface="Times New Roman" panose="02020603050405020304" pitchFamily="18" charset="0"/>
               </a:rPr>
-              <a:t>Make sure this information is copied and pasted as per the Fraud Template</a:t>
+              <a:t>into the </a:t>
+            </a:r>
+            <a:r>
+              <a:rPr lang="en-US" sz="1600" dirty="0" smtClean="0">
+                <a:latin typeface="Times New Roman" panose="02020603050405020304" pitchFamily="18" charset="0"/>
+                <a:cs typeface="Times New Roman" panose="02020603050405020304" pitchFamily="18" charset="0"/>
+              </a:rPr>
+              <a:t>Fraud Template</a:t>
             </a:r>
             <a:endParaRPr lang="en-US" sz="1600" dirty="0">
               <a:latin typeface="Times New Roman" panose="02020603050405020304" pitchFamily="18" charset="0"/>
@@ -15384,7 +15414,21 @@
                 <a:latin typeface="Times New Roman" panose="02020603050405020304" pitchFamily="18" charset="0"/>
                 <a:cs typeface="Times New Roman" panose="02020603050405020304" pitchFamily="18" charset="0"/>
               </a:rPr>
-              <a:t>Use a IP address look up tool (like infosniper.net) to look up the IP address of the </a:t>
+              <a:t>Use a IP address look up tool (like </a:t>
+            </a:r>
+            <a:r>
+              <a:rPr lang="en-US" sz="1600" dirty="0">
+                <a:latin typeface="Times New Roman" panose="02020603050405020304" pitchFamily="18" charset="0"/>
+                <a:cs typeface="Times New Roman" panose="02020603050405020304" pitchFamily="18" charset="0"/>
+              </a:rPr>
+              <a:t>infosniper.net or iplocation.net) </a:t>
+            </a:r>
+            <a:r>
+              <a:rPr lang="en-US" sz="1600" dirty="0" smtClean="0">
+                <a:latin typeface="Times New Roman" panose="02020603050405020304" pitchFamily="18" charset="0"/>
+                <a:cs typeface="Times New Roman" panose="02020603050405020304" pitchFamily="18" charset="0"/>
+              </a:rPr>
+              <a:t>to look up the IP address of the </a:t>
             </a:r>
             <a:r>
               <a:rPr lang="en-US" sz="1600" dirty="0">
@@ -15398,7 +15442,14 @@
                 <a:latin typeface="Times New Roman" panose="02020603050405020304" pitchFamily="18" charset="0"/>
                 <a:cs typeface="Times New Roman" panose="02020603050405020304" pitchFamily="18" charset="0"/>
               </a:rPr>
-              <a:t>Agent pay close attention to where these calls were place from. </a:t>
+              <a:t>Agent. Pay </a:t>
+            </a:r>
+            <a:r>
+              <a:rPr lang="en-US" sz="1600" dirty="0" smtClean="0">
+                <a:latin typeface="Times New Roman" panose="02020603050405020304" pitchFamily="18" charset="0"/>
+                <a:cs typeface="Times New Roman" panose="02020603050405020304" pitchFamily="18" charset="0"/>
+              </a:rPr>
+              <a:t>close attention to where these calls were place from. </a:t>
             </a:r>
           </a:p>
           <a:p>
@@ -15465,7 +15516,91 @@
                 <a:latin typeface="Times New Roman" panose="02020603050405020304" pitchFamily="18" charset="0"/>
                 <a:cs typeface="Times New Roman" panose="02020603050405020304" pitchFamily="18" charset="0"/>
               </a:rPr>
-              <a:t>Agent IP address . Look for any signs of High latency, Jitter, or Packet Loss.</a:t>
+              <a:t>Agent IP </a:t>
+            </a:r>
+            <a:r>
+              <a:rPr lang="en-US" sz="1600" dirty="0" smtClean="0">
+                <a:latin typeface="Times New Roman" panose="02020603050405020304" pitchFamily="18" charset="0"/>
+                <a:cs typeface="Times New Roman" panose="02020603050405020304" pitchFamily="18" charset="0"/>
+              </a:rPr>
+              <a:t>address. </a:t>
+            </a:r>
+            <a:r>
+              <a:rPr lang="en-US" sz="1600" dirty="0" smtClean="0">
+                <a:latin typeface="Times New Roman" panose="02020603050405020304" pitchFamily="18" charset="0"/>
+                <a:cs typeface="Times New Roman" panose="02020603050405020304" pitchFamily="18" charset="0"/>
+              </a:rPr>
+              <a:t>Look for </a:t>
+            </a:r>
+            <a:r>
+              <a:rPr lang="en-US" sz="1600" dirty="0" smtClean="0">
+                <a:latin typeface="Times New Roman" panose="02020603050405020304" pitchFamily="18" charset="0"/>
+                <a:cs typeface="Times New Roman" panose="02020603050405020304" pitchFamily="18" charset="0"/>
+              </a:rPr>
+              <a:t>signs </a:t>
+            </a:r>
+            <a:r>
+              <a:rPr lang="en-US" sz="1600" dirty="0" smtClean="0">
+                <a:latin typeface="Times New Roman" panose="02020603050405020304" pitchFamily="18" charset="0"/>
+                <a:cs typeface="Times New Roman" panose="02020603050405020304" pitchFamily="18" charset="0"/>
+              </a:rPr>
+              <a:t>of </a:t>
+            </a:r>
+            <a:r>
+              <a:rPr lang="en-US" sz="1600" dirty="0" smtClean="0">
+                <a:latin typeface="Times New Roman" panose="02020603050405020304" pitchFamily="18" charset="0"/>
+                <a:cs typeface="Times New Roman" panose="02020603050405020304" pitchFamily="18" charset="0"/>
+              </a:rPr>
+              <a:t>high </a:t>
+            </a:r>
+            <a:r>
+              <a:rPr lang="en-US" sz="1600" dirty="0" smtClean="0">
+                <a:latin typeface="Times New Roman" panose="02020603050405020304" pitchFamily="18" charset="0"/>
+                <a:cs typeface="Times New Roman" panose="02020603050405020304" pitchFamily="18" charset="0"/>
+              </a:rPr>
+              <a:t>latency, </a:t>
+            </a:r>
+            <a:r>
+              <a:rPr lang="en-US" sz="1600" dirty="0" smtClean="0">
+                <a:latin typeface="Times New Roman" panose="02020603050405020304" pitchFamily="18" charset="0"/>
+                <a:cs typeface="Times New Roman" panose="02020603050405020304" pitchFamily="18" charset="0"/>
+              </a:rPr>
+              <a:t>jitter</a:t>
+            </a:r>
+            <a:r>
+              <a:rPr lang="en-US" sz="1600" dirty="0" smtClean="0">
+                <a:latin typeface="Times New Roman" panose="02020603050405020304" pitchFamily="18" charset="0"/>
+                <a:cs typeface="Times New Roman" panose="02020603050405020304" pitchFamily="18" charset="0"/>
+              </a:rPr>
+              <a:t>, or </a:t>
+            </a:r>
+            <a:r>
+              <a:rPr lang="en-US" sz="1600" dirty="0" smtClean="0">
+                <a:latin typeface="Times New Roman" panose="02020603050405020304" pitchFamily="18" charset="0"/>
+                <a:cs typeface="Times New Roman" panose="02020603050405020304" pitchFamily="18" charset="0"/>
+              </a:rPr>
+              <a:t>packet </a:t>
+            </a:r>
+            <a:r>
+              <a:rPr lang="en-US" sz="1600" dirty="0">
+                <a:latin typeface="Times New Roman" panose="02020603050405020304" pitchFamily="18" charset="0"/>
+                <a:cs typeface="Times New Roman" panose="02020603050405020304" pitchFamily="18" charset="0"/>
+              </a:rPr>
+              <a:t>l</a:t>
+            </a:r>
+            <a:r>
+              <a:rPr lang="en-US" sz="1600" dirty="0" smtClean="0">
+                <a:latin typeface="Times New Roman" panose="02020603050405020304" pitchFamily="18" charset="0"/>
+                <a:cs typeface="Times New Roman" panose="02020603050405020304" pitchFamily="18" charset="0"/>
+              </a:rPr>
+              <a:t>oss</a:t>
+            </a:r>
+            <a:r>
+              <a:rPr lang="en-US" sz="1600" dirty="0" smtClean="0">
+                <a:latin typeface="Times New Roman" panose="02020603050405020304" pitchFamily="18" charset="0"/>
+                <a:cs typeface="Times New Roman" panose="02020603050405020304" pitchFamily="18" charset="0"/>
+              </a:rPr>
+              <a:t>.</a:t>
             </a:r>
           </a:p>
         </p:txBody>
@@ -16224,21 +16359,7 @@
                 <a:latin typeface="Times New Roman" panose="02020603050405020304" pitchFamily="18" charset="0"/>
                 <a:cs typeface="Times New Roman" panose="02020603050405020304" pitchFamily="18" charset="0"/>
               </a:rPr>
-              <a:t>Carrier Alert which usually has very little info and commonly consists of calls to blacklisted </a:t>
-            </a:r>
-            <a:r>
-              <a:rPr lang="en-US" sz="1400" dirty="0" smtClean="0">
-                <a:latin typeface="Times New Roman" panose="02020603050405020304" pitchFamily="18" charset="0"/>
-                <a:cs typeface="Times New Roman" panose="02020603050405020304" pitchFamily="18" charset="0"/>
-              </a:rPr>
-              <a:t>destinations or </a:t>
-            </a:r>
-            <a:r>
-              <a:rPr lang="en-US" sz="1400" dirty="0" smtClean="0">
-                <a:latin typeface="Times New Roman" panose="02020603050405020304" pitchFamily="18" charset="0"/>
-                <a:cs typeface="Times New Roman" panose="02020603050405020304" pitchFamily="18" charset="0"/>
-              </a:rPr>
-              <a:t>numbers.</a:t>
+              <a:t>Carrier Alert which usually has very little info and commonly consists of calls to blacklisted destinations or numbers.</a:t>
             </a:r>
           </a:p>
           <a:p>
@@ -17120,11 +17241,313 @@
               <a:rPr lang="en-US" sz="4800" dirty="0" smtClean="0">
                 <a:latin typeface="Impact" panose="020B0806030902050204" pitchFamily="34" charset="0"/>
               </a:rPr>
-              <a:t>Fraud Template Example</a:t>
+              <a:t>Investigation Steps</a:t>
             </a:r>
             <a:endParaRPr lang="en-US" sz="4800" dirty="0">
               <a:latin typeface="Impact" panose="020B0806030902050204" pitchFamily="34" charset="0"/>
             </a:endParaRPr>
+          </a:p>
+        </p:txBody>
+      </p:sp>
+      <p:sp>
+        <p:nvSpPr>
+          <p:cNvPr id="3" name="Content Placeholder 2"/>
+          <p:cNvSpPr>
+            <a:spLocks noGrp="1"/>
+          </p:cNvSpPr>
+          <p:nvPr>
+            <p:ph idx="1"/>
+          </p:nvPr>
+        </p:nvSpPr>
+        <p:spPr/>
+        <p:txBody>
+          <a:bodyPr/>
+          <a:lstStyle/>
+          <a:p>
+            <a:pPr marL="342900" indent="-342900">
+              <a:buFont typeface="+mj-lt"/>
+              <a:buAutoNum type="arabicPeriod"/>
+            </a:pPr>
+            <a:r>
+              <a:rPr lang="en-US" sz="1600" dirty="0">
+                <a:latin typeface="Times New Roman" panose="02020603050405020304" pitchFamily="18" charset="0"/>
+                <a:cs typeface="Times New Roman" panose="02020603050405020304" pitchFamily="18" charset="0"/>
+              </a:rPr>
+              <a:t>After the Fraud alert comes to the On-Call phone forward that email to yourself in Outlook</a:t>
+            </a:r>
+            <a:r>
+              <a:rPr lang="en-US" sz="1600" dirty="0" smtClean="0">
+                <a:latin typeface="Times New Roman" panose="02020603050405020304" pitchFamily="18" charset="0"/>
+                <a:cs typeface="Times New Roman" panose="02020603050405020304" pitchFamily="18" charset="0"/>
+              </a:rPr>
+              <a:t>.</a:t>
+            </a:r>
+            <a:endParaRPr lang="en-US" sz="1600" dirty="0">
+              <a:latin typeface="Times New Roman" panose="02020603050405020304" pitchFamily="18" charset="0"/>
+              <a:cs typeface="Times New Roman" panose="02020603050405020304" pitchFamily="18" charset="0"/>
+            </a:endParaRPr>
+          </a:p>
+          <a:p>
+            <a:pPr marL="342900" indent="-342900">
+              <a:buFont typeface="+mj-lt"/>
+              <a:buAutoNum type="arabicPeriod"/>
+            </a:pPr>
+            <a:r>
+              <a:rPr lang="en-US" sz="1600" dirty="0">
+                <a:latin typeface="Times New Roman" panose="02020603050405020304" pitchFamily="18" charset="0"/>
+                <a:cs typeface="Times New Roman" panose="02020603050405020304" pitchFamily="18" charset="0"/>
+              </a:rPr>
+              <a:t>From Outlook “Reply All” (Potential Fraud &amp; CCare On-Call 1) with “Investigating”. Make sure your reply includes your Outlook signature</a:t>
+            </a:r>
+            <a:r>
+              <a:rPr lang="en-US" sz="1600" dirty="0" smtClean="0">
+                <a:latin typeface="Times New Roman" panose="02020603050405020304" pitchFamily="18" charset="0"/>
+                <a:cs typeface="Times New Roman" panose="02020603050405020304" pitchFamily="18" charset="0"/>
+              </a:rPr>
+              <a:t>.</a:t>
+            </a:r>
+            <a:endParaRPr lang="en-US" sz="1600" dirty="0">
+              <a:latin typeface="Times New Roman" panose="02020603050405020304" pitchFamily="18" charset="0"/>
+              <a:cs typeface="Times New Roman" panose="02020603050405020304" pitchFamily="18" charset="0"/>
+            </a:endParaRPr>
+          </a:p>
+          <a:p>
+            <a:pPr marL="342900" indent="-342900">
+              <a:buFont typeface="+mj-lt"/>
+              <a:buAutoNum type="arabicPeriod"/>
+            </a:pPr>
+            <a:r>
+              <a:rPr lang="en-US" sz="1600" dirty="0">
+                <a:latin typeface="Times New Roman" panose="02020603050405020304" pitchFamily="18" charset="0"/>
+                <a:cs typeface="Times New Roman" panose="02020603050405020304" pitchFamily="18" charset="0"/>
+              </a:rPr>
+              <a:t>Check the Account and see if a ticket was created in Salesforce if not create one. Insure you change case owner to On-Call and place your name in the Tier 2 Rep field</a:t>
+            </a:r>
+            <a:r>
+              <a:rPr lang="en-US" sz="1600" dirty="0" smtClean="0">
+                <a:latin typeface="Times New Roman" panose="02020603050405020304" pitchFamily="18" charset="0"/>
+                <a:cs typeface="Times New Roman" panose="02020603050405020304" pitchFamily="18" charset="0"/>
+              </a:rPr>
+              <a:t>.</a:t>
+            </a:r>
+            <a:endParaRPr lang="en-US" sz="1600" dirty="0">
+              <a:latin typeface="Times New Roman" panose="02020603050405020304" pitchFamily="18" charset="0"/>
+              <a:cs typeface="Times New Roman" panose="02020603050405020304" pitchFamily="18" charset="0"/>
+            </a:endParaRPr>
+          </a:p>
+          <a:p>
+            <a:pPr marL="342900" indent="-342900">
+              <a:buFont typeface="+mj-lt"/>
+              <a:buAutoNum type="arabicPeriod"/>
+            </a:pPr>
+            <a:r>
+              <a:rPr lang="en-US" sz="1600" dirty="0">
+                <a:latin typeface="Times New Roman" panose="02020603050405020304" pitchFamily="18" charset="0"/>
+                <a:cs typeface="Times New Roman" panose="02020603050405020304" pitchFamily="18" charset="0"/>
+              </a:rPr>
+              <a:t>Copy the </a:t>
+            </a:r>
+            <a:r>
+              <a:rPr lang="en-US" sz="1600" dirty="0" smtClean="0">
+                <a:latin typeface="Times New Roman" panose="02020603050405020304" pitchFamily="18" charset="0"/>
+                <a:cs typeface="Times New Roman" panose="02020603050405020304" pitchFamily="18" charset="0"/>
+              </a:rPr>
+              <a:t>message body of the </a:t>
+            </a:r>
+            <a:r>
+              <a:rPr lang="en-US" sz="1600" dirty="0">
+                <a:latin typeface="Times New Roman" panose="02020603050405020304" pitchFamily="18" charset="0"/>
+                <a:cs typeface="Times New Roman" panose="02020603050405020304" pitchFamily="18" charset="0"/>
+              </a:rPr>
+              <a:t>Alert and paste them into the Salesforce Description, be sure to include the type of Fraud Alert i.e.: Root, Domestic, Vonage, or </a:t>
+            </a:r>
+            <a:r>
+              <a:rPr lang="en-US" sz="1600" dirty="0" smtClean="0">
+                <a:latin typeface="Times New Roman" panose="02020603050405020304" pitchFamily="18" charset="0"/>
+                <a:cs typeface="Times New Roman" panose="02020603050405020304" pitchFamily="18" charset="0"/>
+              </a:rPr>
+              <a:t>Spending</a:t>
+            </a:r>
+            <a:r>
+              <a:rPr lang="en-US" sz="1600" dirty="0" smtClean="0">
+                <a:latin typeface="Times New Roman" panose="02020603050405020304" pitchFamily="18" charset="0"/>
+                <a:cs typeface="Times New Roman" panose="02020603050405020304" pitchFamily="18" charset="0"/>
+              </a:rPr>
+              <a:t>.</a:t>
+            </a:r>
+            <a:endParaRPr lang="en-US" sz="1600" dirty="0">
+              <a:latin typeface="Times New Roman" panose="02020603050405020304" pitchFamily="18" charset="0"/>
+              <a:cs typeface="Times New Roman" panose="02020603050405020304" pitchFamily="18" charset="0"/>
+            </a:endParaRPr>
+          </a:p>
+          <a:p>
+            <a:pPr marL="342900" indent="-342900">
+              <a:buFont typeface="+mj-lt"/>
+              <a:buAutoNum type="arabicPeriod"/>
+            </a:pPr>
+            <a:r>
+              <a:rPr lang="en-US" sz="1600" dirty="0">
+                <a:latin typeface="Times New Roman" panose="02020603050405020304" pitchFamily="18" charset="0"/>
+                <a:cs typeface="Times New Roman" panose="02020603050405020304" pitchFamily="18" charset="0"/>
+              </a:rPr>
+              <a:t>Thoroughly investigate the potential Fraud and make your determination whether it’s a False-Positive or Fraud</a:t>
+            </a:r>
+            <a:r>
+              <a:rPr lang="en-US" sz="1600" dirty="0" smtClean="0">
+                <a:latin typeface="Times New Roman" panose="02020603050405020304" pitchFamily="18" charset="0"/>
+                <a:cs typeface="Times New Roman" panose="02020603050405020304" pitchFamily="18" charset="0"/>
+              </a:rPr>
+              <a:t>.</a:t>
+            </a:r>
+            <a:endParaRPr lang="en-US" sz="1600" dirty="0">
+              <a:latin typeface="Times New Roman" panose="02020603050405020304" pitchFamily="18" charset="0"/>
+              <a:cs typeface="Times New Roman" panose="02020603050405020304" pitchFamily="18" charset="0"/>
+            </a:endParaRPr>
+          </a:p>
+          <a:p>
+            <a:pPr marL="342900" indent="-342900">
+              <a:buFont typeface="+mj-lt"/>
+              <a:buAutoNum type="arabicPeriod"/>
+            </a:pPr>
+            <a:r>
+              <a:rPr lang="en-US" sz="1600" dirty="0">
+                <a:latin typeface="Times New Roman" panose="02020603050405020304" pitchFamily="18" charset="0"/>
+                <a:cs typeface="Times New Roman" panose="02020603050405020304" pitchFamily="18" charset="0"/>
+              </a:rPr>
+              <a:t> From Outlook “Reply All” to the Alert with your investigation notes. (see examples below</a:t>
+            </a:r>
+            <a:r>
+              <a:rPr lang="en-US" sz="1600" dirty="0" smtClean="0">
+                <a:latin typeface="Times New Roman" panose="02020603050405020304" pitchFamily="18" charset="0"/>
+                <a:cs typeface="Times New Roman" panose="02020603050405020304" pitchFamily="18" charset="0"/>
+              </a:rPr>
+              <a:t>)</a:t>
+            </a:r>
+            <a:endParaRPr lang="en-US" sz="1600" dirty="0">
+              <a:latin typeface="Times New Roman" panose="02020603050405020304" pitchFamily="18" charset="0"/>
+              <a:cs typeface="Times New Roman" panose="02020603050405020304" pitchFamily="18" charset="0"/>
+            </a:endParaRPr>
+          </a:p>
+          <a:p>
+            <a:pPr marL="342900" indent="-342900">
+              <a:buFont typeface="+mj-lt"/>
+              <a:buAutoNum type="arabicPeriod"/>
+            </a:pPr>
+            <a:r>
+              <a:rPr lang="en-US" sz="1600" dirty="0">
+                <a:latin typeface="Times New Roman" panose="02020603050405020304" pitchFamily="18" charset="0"/>
+                <a:cs typeface="Times New Roman" panose="02020603050405020304" pitchFamily="18" charset="0"/>
+              </a:rPr>
+              <a:t>Update your salesforce ticket with your investigation notes in the “Log Call” section change Problem </a:t>
+            </a:r>
+            <a:r>
+              <a:rPr lang="en-US" sz="1600" dirty="0" smtClean="0">
+                <a:latin typeface="Times New Roman" panose="02020603050405020304" pitchFamily="18" charset="0"/>
+                <a:cs typeface="Times New Roman" panose="02020603050405020304" pitchFamily="18" charset="0"/>
+              </a:rPr>
+              <a:t>Code to “Fraud Alert” and Problem Code II to reflect </a:t>
+            </a:r>
+            <a:r>
+              <a:rPr lang="en-US" sz="1600" dirty="0">
+                <a:latin typeface="Times New Roman" panose="02020603050405020304" pitchFamily="18" charset="0"/>
+                <a:cs typeface="Times New Roman" panose="02020603050405020304" pitchFamily="18" charset="0"/>
+              </a:rPr>
+              <a:t>False-Positive or Fraud. Make sure case owner is set to On-Call and your name is in the Tier 2 Rep field or you will not be paid</a:t>
+            </a:r>
+            <a:r>
+              <a:rPr lang="en-US" sz="1600" dirty="0" smtClean="0">
+                <a:latin typeface="Times New Roman" panose="02020603050405020304" pitchFamily="18" charset="0"/>
+                <a:cs typeface="Times New Roman" panose="02020603050405020304" pitchFamily="18" charset="0"/>
+              </a:rPr>
+              <a:t>.</a:t>
+            </a:r>
+            <a:endParaRPr lang="en-US" sz="1600" dirty="0">
+              <a:latin typeface="Times New Roman" panose="02020603050405020304" pitchFamily="18" charset="0"/>
+              <a:cs typeface="Times New Roman" panose="02020603050405020304" pitchFamily="18" charset="0"/>
+            </a:endParaRPr>
+          </a:p>
+          <a:p>
+            <a:pPr marL="342900" indent="-342900">
+              <a:buFont typeface="+mj-lt"/>
+              <a:buAutoNum type="arabicPeriod"/>
+            </a:pPr>
+            <a:r>
+              <a:rPr lang="en-US" sz="1600" dirty="0">
+                <a:latin typeface="Times New Roman" panose="02020603050405020304" pitchFamily="18" charset="0"/>
+                <a:cs typeface="Times New Roman" panose="02020603050405020304" pitchFamily="18" charset="0"/>
+              </a:rPr>
+              <a:t>Close Ticket “Resolved</a:t>
+            </a:r>
+            <a:r>
+              <a:rPr lang="en-US" sz="1600" dirty="0" smtClean="0">
+                <a:latin typeface="Times New Roman" panose="02020603050405020304" pitchFamily="18" charset="0"/>
+                <a:cs typeface="Times New Roman" panose="02020603050405020304" pitchFamily="18" charset="0"/>
+              </a:rPr>
+              <a:t>”</a:t>
+            </a:r>
+            <a:endParaRPr lang="en-US" sz="1600" dirty="0">
+              <a:latin typeface="Times New Roman" panose="02020603050405020304" pitchFamily="18" charset="0"/>
+              <a:cs typeface="Times New Roman" panose="02020603050405020304" pitchFamily="18" charset="0"/>
+            </a:endParaRPr>
+          </a:p>
+          <a:p>
+            <a:pPr marL="342900" indent="-342900">
+              <a:buFont typeface="+mj-lt"/>
+              <a:buAutoNum type="arabicPeriod"/>
+            </a:pPr>
+            <a:r>
+              <a:rPr lang="en-US" sz="1600" dirty="0" smtClean="0">
+                <a:latin typeface="Times New Roman" panose="02020603050405020304" pitchFamily="18" charset="0"/>
+                <a:cs typeface="Times New Roman" panose="02020603050405020304" pitchFamily="18" charset="0"/>
+              </a:rPr>
+              <a:t>Send an </a:t>
+            </a:r>
+            <a:r>
+              <a:rPr lang="en-US" sz="1600" dirty="0">
+                <a:latin typeface="Times New Roman" panose="02020603050405020304" pitchFamily="18" charset="0"/>
+                <a:cs typeface="Times New Roman" panose="02020603050405020304" pitchFamily="18" charset="0"/>
+              </a:rPr>
+              <a:t>email to </a:t>
+            </a:r>
+            <a:r>
+              <a:rPr lang="en-US" sz="1600" dirty="0" smtClean="0">
+                <a:latin typeface="Times New Roman" panose="02020603050405020304" pitchFamily="18" charset="0"/>
+                <a:cs typeface="Times New Roman" panose="02020603050405020304" pitchFamily="18" charset="0"/>
+                <a:hlinkClick r:id="rId2"/>
+              </a:rPr>
+              <a:t>FraudandAbuseTeam-vb@vonage.com</a:t>
+            </a:r>
+            <a:r>
+              <a:rPr lang="en-US" sz="1600" dirty="0" smtClean="0">
+                <a:latin typeface="Times New Roman" panose="02020603050405020304" pitchFamily="18" charset="0"/>
+                <a:cs typeface="Times New Roman" panose="02020603050405020304" pitchFamily="18" charset="0"/>
+              </a:rPr>
+              <a:t> for </a:t>
+            </a:r>
+            <a:r>
+              <a:rPr lang="en-US" sz="1600" dirty="0">
+                <a:latin typeface="Times New Roman" panose="02020603050405020304" pitchFamily="18" charset="0"/>
+                <a:cs typeface="Times New Roman" panose="02020603050405020304" pitchFamily="18" charset="0"/>
+              </a:rPr>
+              <a:t>any actual Frauds </a:t>
+            </a:r>
+            <a:r>
+              <a:rPr lang="en-US" sz="1600" dirty="0" smtClean="0">
+                <a:latin typeface="Times New Roman" panose="02020603050405020304" pitchFamily="18" charset="0"/>
+                <a:cs typeface="Times New Roman" panose="02020603050405020304" pitchFamily="18" charset="0"/>
+              </a:rPr>
+              <a:t>at the </a:t>
+            </a:r>
+            <a:r>
+              <a:rPr lang="en-US" sz="1600" dirty="0">
+                <a:latin typeface="Times New Roman" panose="02020603050405020304" pitchFamily="18" charset="0"/>
+                <a:cs typeface="Times New Roman" panose="02020603050405020304" pitchFamily="18" charset="0"/>
+              </a:rPr>
+              <a:t>next day so the total charges can be calculated.</a:t>
+            </a:r>
+          </a:p>
+          <a:p>
+            <a:endParaRPr lang="en-US" dirty="0"/>
           </a:p>
         </p:txBody>
       </p:sp>
@@ -17165,209 +17588,10 @@
           </a:p>
         </p:txBody>
       </p:sp>
-      <p:pic>
-        <p:nvPicPr>
-          <p:cNvPr id="8" name="Picture 7"/>
-          <p:cNvPicPr>
-            <a:picLocks noChangeAspect="1"/>
-          </p:cNvPicPr>
-          <p:nvPr/>
-        </p:nvPicPr>
-        <p:blipFill>
-          <a:blip r:embed="rId2">
-            <a:extLst>
-              <a:ext uri="{28A0092B-C50C-407E-A947-70E740481C1C}">
-                <a14:useLocalDpi xmlns:a14="http://schemas.microsoft.com/office/drawing/2010/main" val="0"/>
-              </a:ext>
-            </a:extLst>
-          </a:blip>
-          <a:stretch>
-            <a:fillRect/>
-          </a:stretch>
-        </p:blipFill>
-        <p:spPr>
-          <a:xfrm>
-            <a:off x="4343400" y="1066800"/>
-            <a:ext cx="4724400" cy="5490168"/>
-          </a:xfrm>
-          <a:prstGeom prst="rect">
-            <a:avLst/>
-          </a:prstGeom>
-        </p:spPr>
-      </p:pic>
-      <p:sp>
-        <p:nvSpPr>
-          <p:cNvPr id="9" name="TextBox 8"/>
-          <p:cNvSpPr txBox="1"/>
-          <p:nvPr/>
-        </p:nvSpPr>
-        <p:spPr>
-          <a:xfrm>
-            <a:off x="304800" y="1262535"/>
-            <a:ext cx="4038600" cy="5293757"/>
-          </a:xfrm>
-          <a:prstGeom prst="rect">
-            <a:avLst/>
-          </a:prstGeom>
-          <a:noFill/>
-        </p:spPr>
-        <p:txBody>
-          <a:bodyPr wrap="square" rtlCol="0">
-            <a:spAutoFit/>
-          </a:bodyPr>
-          <a:lstStyle/>
-          <a:p>
-            <a:pPr marL="285750" indent="-285750">
-              <a:buFont typeface="Wingdings" panose="05000000000000000000" pitchFamily="2" charset="2"/>
-              <a:buChar char="Ø"/>
-            </a:pPr>
-            <a:r>
-              <a:rPr lang="en-US" sz="1400" dirty="0" smtClean="0">
-                <a:solidFill>
-                  <a:schemeClr val="bg2"/>
-                </a:solidFill>
-              </a:rPr>
-              <a:t>Change the Fraud Type according to the alert you receive, i.e. Root, Domestic, Vonage, or Spending</a:t>
-            </a:r>
-          </a:p>
-          <a:p>
-            <a:pPr marL="285750" indent="-285750">
-              <a:buFont typeface="Wingdings" panose="05000000000000000000" pitchFamily="2" charset="2"/>
-              <a:buChar char="Ø"/>
-            </a:pPr>
-            <a:endParaRPr lang="en-US" sz="1400" dirty="0">
-              <a:solidFill>
-                <a:schemeClr val="bg2"/>
-              </a:solidFill>
-            </a:endParaRPr>
-          </a:p>
-          <a:p>
-            <a:pPr marL="285750" indent="-285750">
-              <a:buFont typeface="Wingdings" panose="05000000000000000000" pitchFamily="2" charset="2"/>
-              <a:buChar char="Ø"/>
-            </a:pPr>
-            <a:r>
-              <a:rPr lang="en-US" sz="1400" dirty="0" smtClean="0">
-                <a:solidFill>
-                  <a:schemeClr val="bg2"/>
-                </a:solidFill>
-              </a:rPr>
-              <a:t>Make sure your previous call example is at least 2 weeks prior to the current date</a:t>
-            </a:r>
-          </a:p>
-          <a:p>
-            <a:pPr marL="285750" indent="-285750">
-              <a:buFont typeface="Wingdings" panose="05000000000000000000" pitchFamily="2" charset="2"/>
-              <a:buChar char="Ø"/>
-            </a:pPr>
-            <a:endParaRPr lang="en-US" sz="1400" dirty="0">
-              <a:solidFill>
-                <a:schemeClr val="bg2"/>
-              </a:solidFill>
-            </a:endParaRPr>
-          </a:p>
-          <a:p>
-            <a:pPr marL="285750" indent="-285750">
-              <a:buFont typeface="Wingdings" panose="05000000000000000000" pitchFamily="2" charset="2"/>
-              <a:buChar char="Ø"/>
-            </a:pPr>
-            <a:r>
-              <a:rPr lang="en-US" sz="1400" dirty="0" smtClean="0">
-                <a:solidFill>
-                  <a:schemeClr val="bg2"/>
-                </a:solidFill>
-              </a:rPr>
-              <a:t>Provide adequate explanation and supporting screenshots within the findings section</a:t>
-            </a:r>
-          </a:p>
-          <a:p>
-            <a:pPr marL="285750" indent="-285750">
-              <a:buFont typeface="Wingdings" panose="05000000000000000000" pitchFamily="2" charset="2"/>
-              <a:buChar char="Ø"/>
-            </a:pPr>
-            <a:endParaRPr lang="en-US" sz="1400" dirty="0">
-              <a:solidFill>
-                <a:schemeClr val="bg2"/>
-              </a:solidFill>
-            </a:endParaRPr>
-          </a:p>
-          <a:p>
-            <a:pPr marL="285750" indent="-285750">
-              <a:buFont typeface="Wingdings" panose="05000000000000000000" pitchFamily="2" charset="2"/>
-              <a:buChar char="Ø"/>
-            </a:pPr>
-            <a:r>
-              <a:rPr lang="en-US" sz="1400" dirty="0" smtClean="0">
-                <a:solidFill>
-                  <a:schemeClr val="bg2"/>
-                </a:solidFill>
-              </a:rPr>
-              <a:t>This template can also be used for investigations that you determine to be Fraud.</a:t>
-            </a:r>
-          </a:p>
-          <a:p>
-            <a:pPr marL="285750" indent="-285750">
-              <a:buFont typeface="Wingdings" panose="05000000000000000000" pitchFamily="2" charset="2"/>
-              <a:buChar char="Ø"/>
-            </a:pPr>
-            <a:endParaRPr lang="en-US" sz="1400" dirty="0">
-              <a:solidFill>
-                <a:schemeClr val="bg2"/>
-              </a:solidFill>
-            </a:endParaRPr>
-          </a:p>
-          <a:p>
-            <a:pPr marL="285750" indent="-285750">
-              <a:buFont typeface="Wingdings" panose="05000000000000000000" pitchFamily="2" charset="2"/>
-              <a:buChar char="Ø"/>
-            </a:pPr>
-            <a:r>
-              <a:rPr lang="en-US" sz="1400" dirty="0" smtClean="0">
-                <a:solidFill>
-                  <a:schemeClr val="bg2"/>
-                </a:solidFill>
-              </a:rPr>
-              <a:t>Using this template will ensure that you have a thorough investigation and are more likely to identify investigations correctly. </a:t>
-            </a:r>
-          </a:p>
-          <a:p>
-            <a:endParaRPr lang="en-US" sz="1400" dirty="0">
-              <a:solidFill>
-                <a:schemeClr val="bg2"/>
-              </a:solidFill>
-            </a:endParaRPr>
-          </a:p>
-          <a:p>
-            <a:r>
-              <a:rPr lang="en-US" sz="1400" b="1" dirty="0" smtClean="0">
-                <a:solidFill>
-                  <a:schemeClr val="bg2"/>
-                </a:solidFill>
-              </a:rPr>
-              <a:t>**Please note: </a:t>
-            </a:r>
-            <a:r>
-              <a:rPr lang="en-US" sz="1400" dirty="0" smtClean="0">
-                <a:solidFill>
-                  <a:schemeClr val="bg2"/>
-                </a:solidFill>
-              </a:rPr>
-              <a:t>if you do not use this template and the information you provide is not adequate we will take ownership of your on call case to do a proper investigation. This mean you will not get paid for that case. </a:t>
-            </a:r>
-          </a:p>
-          <a:p>
-            <a:pPr marL="285750" indent="-285750">
-              <a:buFont typeface="Wingdings" panose="05000000000000000000" pitchFamily="2" charset="2"/>
-              <a:buChar char="Ø"/>
-            </a:pPr>
-            <a:endParaRPr lang="en-US" dirty="0"/>
-          </a:p>
-        </p:txBody>
-      </p:sp>
     </p:spTree>
     <p:extLst>
       <p:ext uri="{BB962C8B-B14F-4D97-AF65-F5344CB8AC3E}">
-        <p14:creationId xmlns:p14="http://schemas.microsoft.com/office/powerpoint/2010/main" val="182849286"/>
+        <p14:creationId xmlns:p14="http://schemas.microsoft.com/office/powerpoint/2010/main" val="3464281621"/>
       </p:ext>
     </p:extLst>
   </p:cSld>
@@ -17420,306 +17644,11 @@
               <a:rPr lang="en-US" sz="4800" dirty="0" smtClean="0">
                 <a:latin typeface="Impact" panose="020B0806030902050204" pitchFamily="34" charset="0"/>
               </a:rPr>
-              <a:t>Investigation Steps</a:t>
+              <a:t>Fraud Template Example</a:t>
             </a:r>
             <a:endParaRPr lang="en-US" sz="4800" dirty="0">
               <a:latin typeface="Impact" panose="020B0806030902050204" pitchFamily="34" charset="0"/>
             </a:endParaRPr>
-          </a:p>
-        </p:txBody>
-      </p:sp>
-      <p:sp>
-        <p:nvSpPr>
-          <p:cNvPr id="3" name="Content Placeholder 2"/>
-          <p:cNvSpPr>
-            <a:spLocks noGrp="1"/>
-          </p:cNvSpPr>
-          <p:nvPr>
-            <p:ph idx="1"/>
-          </p:nvPr>
-        </p:nvSpPr>
-        <p:spPr/>
-        <p:txBody>
-          <a:bodyPr/>
-          <a:lstStyle/>
-          <a:p>
-            <a:pPr marL="342900" indent="-342900">
-              <a:buFont typeface="+mj-lt"/>
-              <a:buAutoNum type="arabicPeriod"/>
-            </a:pPr>
-            <a:r>
-              <a:rPr lang="en-US" sz="1600" dirty="0">
-                <a:latin typeface="Times New Roman" panose="02020603050405020304" pitchFamily="18" charset="0"/>
-                <a:cs typeface="Times New Roman" panose="02020603050405020304" pitchFamily="18" charset="0"/>
-              </a:rPr>
-              <a:t>After the Fraud alert comes to the On-Call phone forward that email to yourself in Outlook</a:t>
-            </a:r>
-            <a:r>
-              <a:rPr lang="en-US" sz="1600" dirty="0" smtClean="0">
-                <a:latin typeface="Times New Roman" panose="02020603050405020304" pitchFamily="18" charset="0"/>
-                <a:cs typeface="Times New Roman" panose="02020603050405020304" pitchFamily="18" charset="0"/>
-              </a:rPr>
-              <a:t>.</a:t>
-            </a:r>
-            <a:endParaRPr lang="en-US" sz="1600" dirty="0">
-              <a:latin typeface="Times New Roman" panose="02020603050405020304" pitchFamily="18" charset="0"/>
-              <a:cs typeface="Times New Roman" panose="02020603050405020304" pitchFamily="18" charset="0"/>
-            </a:endParaRPr>
-          </a:p>
-          <a:p>
-            <a:pPr marL="342900" indent="-342900">
-              <a:buFont typeface="+mj-lt"/>
-              <a:buAutoNum type="arabicPeriod"/>
-            </a:pPr>
-            <a:r>
-              <a:rPr lang="en-US" sz="1600" dirty="0">
-                <a:latin typeface="Times New Roman" panose="02020603050405020304" pitchFamily="18" charset="0"/>
-                <a:cs typeface="Times New Roman" panose="02020603050405020304" pitchFamily="18" charset="0"/>
-              </a:rPr>
-              <a:t>From Outlook “Reply All” (Potential Fraud &amp; CCare On-Call 1) with “Investigating”. Make sure your reply includes your Outlook signature</a:t>
-            </a:r>
-            <a:r>
-              <a:rPr lang="en-US" sz="1600" dirty="0" smtClean="0">
-                <a:latin typeface="Times New Roman" panose="02020603050405020304" pitchFamily="18" charset="0"/>
-                <a:cs typeface="Times New Roman" panose="02020603050405020304" pitchFamily="18" charset="0"/>
-              </a:rPr>
-              <a:t>.</a:t>
-            </a:r>
-            <a:endParaRPr lang="en-US" sz="1600" dirty="0">
-              <a:latin typeface="Times New Roman" panose="02020603050405020304" pitchFamily="18" charset="0"/>
-              <a:cs typeface="Times New Roman" panose="02020603050405020304" pitchFamily="18" charset="0"/>
-            </a:endParaRPr>
-          </a:p>
-          <a:p>
-            <a:pPr marL="342900" indent="-342900">
-              <a:buFont typeface="+mj-lt"/>
-              <a:buAutoNum type="arabicPeriod"/>
-            </a:pPr>
-            <a:r>
-              <a:rPr lang="en-US" sz="1600" dirty="0">
-                <a:latin typeface="Times New Roman" panose="02020603050405020304" pitchFamily="18" charset="0"/>
-                <a:cs typeface="Times New Roman" panose="02020603050405020304" pitchFamily="18" charset="0"/>
-              </a:rPr>
-              <a:t>Check the Account and see if a ticket was created in Salesforce if not create one. Insure you change case owner to On-Call and place your name in the Tier 2 Rep field</a:t>
-            </a:r>
-            <a:r>
-              <a:rPr lang="en-US" sz="1600" dirty="0" smtClean="0">
-                <a:latin typeface="Times New Roman" panose="02020603050405020304" pitchFamily="18" charset="0"/>
-                <a:cs typeface="Times New Roman" panose="02020603050405020304" pitchFamily="18" charset="0"/>
-              </a:rPr>
-              <a:t>.</a:t>
-            </a:r>
-            <a:endParaRPr lang="en-US" sz="1600" dirty="0">
-              <a:latin typeface="Times New Roman" panose="02020603050405020304" pitchFamily="18" charset="0"/>
-              <a:cs typeface="Times New Roman" panose="02020603050405020304" pitchFamily="18" charset="0"/>
-            </a:endParaRPr>
-          </a:p>
-          <a:p>
-            <a:pPr marL="342900" indent="-342900">
-              <a:buFont typeface="+mj-lt"/>
-              <a:buAutoNum type="arabicPeriod"/>
-            </a:pPr>
-            <a:r>
-              <a:rPr lang="en-US" sz="1600" dirty="0">
-                <a:latin typeface="Times New Roman" panose="02020603050405020304" pitchFamily="18" charset="0"/>
-                <a:cs typeface="Times New Roman" panose="02020603050405020304" pitchFamily="18" charset="0"/>
-              </a:rPr>
-              <a:t>Copy the </a:t>
-            </a:r>
-            <a:r>
-              <a:rPr lang="en-US" sz="1600" dirty="0" smtClean="0">
-                <a:latin typeface="Times New Roman" panose="02020603050405020304" pitchFamily="18" charset="0"/>
-                <a:cs typeface="Times New Roman" panose="02020603050405020304" pitchFamily="18" charset="0"/>
-              </a:rPr>
-              <a:t>message body of the </a:t>
-            </a:r>
-            <a:r>
-              <a:rPr lang="en-US" sz="1600" dirty="0">
-                <a:latin typeface="Times New Roman" panose="02020603050405020304" pitchFamily="18" charset="0"/>
-                <a:cs typeface="Times New Roman" panose="02020603050405020304" pitchFamily="18" charset="0"/>
-              </a:rPr>
-              <a:t>Alert and paste them into the Salesforce Description, be sure to include the type of Fraud Alert i.e.: Root, Domestic, Vonage, or Spending</a:t>
-            </a:r>
-            <a:r>
-              <a:rPr lang="en-US" sz="1600" dirty="0" smtClean="0">
-                <a:latin typeface="Times New Roman" panose="02020603050405020304" pitchFamily="18" charset="0"/>
-                <a:cs typeface="Times New Roman" panose="02020603050405020304" pitchFamily="18" charset="0"/>
-              </a:rPr>
-              <a:t>.</a:t>
-            </a:r>
-            <a:endParaRPr lang="en-US" sz="1600" dirty="0">
-              <a:latin typeface="Times New Roman" panose="02020603050405020304" pitchFamily="18" charset="0"/>
-              <a:cs typeface="Times New Roman" panose="02020603050405020304" pitchFamily="18" charset="0"/>
-            </a:endParaRPr>
-          </a:p>
-          <a:p>
-            <a:pPr marL="342900" indent="-342900">
-              <a:buFont typeface="+mj-lt"/>
-              <a:buAutoNum type="arabicPeriod"/>
-            </a:pPr>
-            <a:r>
-              <a:rPr lang="en-US" sz="1600" dirty="0">
-                <a:latin typeface="Times New Roman" panose="02020603050405020304" pitchFamily="18" charset="0"/>
-                <a:cs typeface="Times New Roman" panose="02020603050405020304" pitchFamily="18" charset="0"/>
-              </a:rPr>
-              <a:t>Thoroughly investigate the potential Fraud and make your determination whether it’s a False-Positive or Fraud</a:t>
-            </a:r>
-            <a:r>
-              <a:rPr lang="en-US" sz="1600" dirty="0" smtClean="0">
-                <a:latin typeface="Times New Roman" panose="02020603050405020304" pitchFamily="18" charset="0"/>
-                <a:cs typeface="Times New Roman" panose="02020603050405020304" pitchFamily="18" charset="0"/>
-              </a:rPr>
-              <a:t>.</a:t>
-            </a:r>
-            <a:endParaRPr lang="en-US" sz="1600" dirty="0">
-              <a:latin typeface="Times New Roman" panose="02020603050405020304" pitchFamily="18" charset="0"/>
-              <a:cs typeface="Times New Roman" panose="02020603050405020304" pitchFamily="18" charset="0"/>
-            </a:endParaRPr>
-          </a:p>
-          <a:p>
-            <a:pPr marL="342900" indent="-342900">
-              <a:buFont typeface="+mj-lt"/>
-              <a:buAutoNum type="arabicPeriod"/>
-            </a:pPr>
-            <a:r>
-              <a:rPr lang="en-US" sz="1600" dirty="0">
-                <a:latin typeface="Times New Roman" panose="02020603050405020304" pitchFamily="18" charset="0"/>
-                <a:cs typeface="Times New Roman" panose="02020603050405020304" pitchFamily="18" charset="0"/>
-              </a:rPr>
-              <a:t> From Outlook “Reply All” to the Alert with your investigation notes. (see examples below</a:t>
-            </a:r>
-            <a:r>
-              <a:rPr lang="en-US" sz="1600" dirty="0" smtClean="0">
-                <a:latin typeface="Times New Roman" panose="02020603050405020304" pitchFamily="18" charset="0"/>
-                <a:cs typeface="Times New Roman" panose="02020603050405020304" pitchFamily="18" charset="0"/>
-              </a:rPr>
-              <a:t>)</a:t>
-            </a:r>
-            <a:endParaRPr lang="en-US" sz="1600" dirty="0">
-              <a:latin typeface="Times New Roman" panose="02020603050405020304" pitchFamily="18" charset="0"/>
-              <a:cs typeface="Times New Roman" panose="02020603050405020304" pitchFamily="18" charset="0"/>
-            </a:endParaRPr>
-          </a:p>
-          <a:p>
-            <a:pPr marL="342900" indent="-342900">
-              <a:buFont typeface="+mj-lt"/>
-              <a:buAutoNum type="arabicPeriod"/>
-            </a:pPr>
-            <a:r>
-              <a:rPr lang="en-US" sz="1600" dirty="0">
-                <a:latin typeface="Times New Roman" panose="02020603050405020304" pitchFamily="18" charset="0"/>
-                <a:cs typeface="Times New Roman" panose="02020603050405020304" pitchFamily="18" charset="0"/>
-              </a:rPr>
-              <a:t>Update your salesforce ticket with your investigation notes in the “Log Call” section change Problem </a:t>
-            </a:r>
-            <a:r>
-              <a:rPr lang="en-US" sz="1600" dirty="0" smtClean="0">
-                <a:latin typeface="Times New Roman" panose="02020603050405020304" pitchFamily="18" charset="0"/>
-                <a:cs typeface="Times New Roman" panose="02020603050405020304" pitchFamily="18" charset="0"/>
-              </a:rPr>
-              <a:t>Code to “Fraud Alert” and Problem Code II to reflect </a:t>
-            </a:r>
-            <a:r>
-              <a:rPr lang="en-US" sz="1600" dirty="0">
-                <a:latin typeface="Times New Roman" panose="02020603050405020304" pitchFamily="18" charset="0"/>
-                <a:cs typeface="Times New Roman" panose="02020603050405020304" pitchFamily="18" charset="0"/>
-              </a:rPr>
-              <a:t>False-Positive or Fraud. Make sure case owner is set to On-Call and your name is in the Tier 2 Rep field or you will not be paid</a:t>
-            </a:r>
-            <a:r>
-              <a:rPr lang="en-US" sz="1600" dirty="0" smtClean="0">
-                <a:latin typeface="Times New Roman" panose="02020603050405020304" pitchFamily="18" charset="0"/>
-                <a:cs typeface="Times New Roman" panose="02020603050405020304" pitchFamily="18" charset="0"/>
-              </a:rPr>
-              <a:t>.</a:t>
-            </a:r>
-            <a:endParaRPr lang="en-US" sz="1600" dirty="0">
-              <a:latin typeface="Times New Roman" panose="02020603050405020304" pitchFamily="18" charset="0"/>
-              <a:cs typeface="Times New Roman" panose="02020603050405020304" pitchFamily="18" charset="0"/>
-            </a:endParaRPr>
-          </a:p>
-          <a:p>
-            <a:pPr marL="342900" indent="-342900">
-              <a:buFont typeface="+mj-lt"/>
-              <a:buAutoNum type="arabicPeriod"/>
-            </a:pPr>
-            <a:r>
-              <a:rPr lang="en-US" sz="1600" dirty="0">
-                <a:latin typeface="Times New Roman" panose="02020603050405020304" pitchFamily="18" charset="0"/>
-                <a:cs typeface="Times New Roman" panose="02020603050405020304" pitchFamily="18" charset="0"/>
-              </a:rPr>
-              <a:t>Close Ticket “Resolved</a:t>
-            </a:r>
-            <a:r>
-              <a:rPr lang="en-US" sz="1600" dirty="0" smtClean="0">
-                <a:latin typeface="Times New Roman" panose="02020603050405020304" pitchFamily="18" charset="0"/>
-                <a:cs typeface="Times New Roman" panose="02020603050405020304" pitchFamily="18" charset="0"/>
-              </a:rPr>
-              <a:t>”</a:t>
-            </a:r>
-            <a:endParaRPr lang="en-US" sz="1600" dirty="0">
-              <a:latin typeface="Times New Roman" panose="02020603050405020304" pitchFamily="18" charset="0"/>
-              <a:cs typeface="Times New Roman" panose="02020603050405020304" pitchFamily="18" charset="0"/>
-            </a:endParaRPr>
-          </a:p>
-          <a:p>
-            <a:pPr marL="342900" indent="-342900">
-              <a:buFont typeface="+mj-lt"/>
-              <a:buAutoNum type="arabicPeriod"/>
-            </a:pPr>
-            <a:r>
-              <a:rPr lang="en-US" sz="1600" dirty="0" smtClean="0">
-                <a:latin typeface="Times New Roman" panose="02020603050405020304" pitchFamily="18" charset="0"/>
-                <a:cs typeface="Times New Roman" panose="02020603050405020304" pitchFamily="18" charset="0"/>
-              </a:rPr>
-              <a:t>Send an </a:t>
-            </a:r>
-            <a:r>
-              <a:rPr lang="en-US" sz="1600" dirty="0">
-                <a:latin typeface="Times New Roman" panose="02020603050405020304" pitchFamily="18" charset="0"/>
-                <a:cs typeface="Times New Roman" panose="02020603050405020304" pitchFamily="18" charset="0"/>
-              </a:rPr>
-              <a:t>email to </a:t>
-            </a:r>
-            <a:r>
-              <a:rPr lang="en-US" sz="1600" dirty="0" smtClean="0">
-                <a:latin typeface="Times New Roman" panose="02020603050405020304" pitchFamily="18" charset="0"/>
-                <a:cs typeface="Times New Roman" panose="02020603050405020304" pitchFamily="18" charset="0"/>
-                <a:hlinkClick r:id="rId2"/>
-              </a:rPr>
-              <a:t>FraudandAbuseTeam-vb@vonage.com</a:t>
-            </a:r>
-            <a:r>
-              <a:rPr lang="en-US" sz="1600" dirty="0" smtClean="0">
-                <a:latin typeface="Times New Roman" panose="02020603050405020304" pitchFamily="18" charset="0"/>
-                <a:cs typeface="Times New Roman" panose="02020603050405020304" pitchFamily="18" charset="0"/>
-              </a:rPr>
-              <a:t> for </a:t>
-            </a:r>
-            <a:r>
-              <a:rPr lang="en-US" sz="1600" dirty="0">
-                <a:latin typeface="Times New Roman" panose="02020603050405020304" pitchFamily="18" charset="0"/>
-                <a:cs typeface="Times New Roman" panose="02020603050405020304" pitchFamily="18" charset="0"/>
-              </a:rPr>
-              <a:t>any actual Frauds </a:t>
-            </a:r>
-            <a:r>
-              <a:rPr lang="en-US" sz="1600" dirty="0" smtClean="0">
-                <a:latin typeface="Times New Roman" panose="02020603050405020304" pitchFamily="18" charset="0"/>
-                <a:cs typeface="Times New Roman" panose="02020603050405020304" pitchFamily="18" charset="0"/>
-              </a:rPr>
-              <a:t>at the </a:t>
-            </a:r>
-            <a:r>
-              <a:rPr lang="en-US" sz="1600" dirty="0">
-                <a:latin typeface="Times New Roman" panose="02020603050405020304" pitchFamily="18" charset="0"/>
-                <a:cs typeface="Times New Roman" panose="02020603050405020304" pitchFamily="18" charset="0"/>
-              </a:rPr>
-              <a:t>next day so the total charges can be calculated.</a:t>
-            </a:r>
-          </a:p>
-          <a:p>
-            <a:endParaRPr lang="en-US" dirty="0"/>
           </a:p>
         </p:txBody>
       </p:sp>
@@ -17760,10 +17689,257 @@
           </a:p>
         </p:txBody>
       </p:sp>
+      <p:pic>
+        <p:nvPicPr>
+          <p:cNvPr id="8" name="Picture 7"/>
+          <p:cNvPicPr>
+            <a:picLocks noChangeAspect="1"/>
+          </p:cNvPicPr>
+          <p:nvPr/>
+        </p:nvPicPr>
+        <p:blipFill>
+          <a:blip r:embed="rId2">
+            <a:extLst>
+              <a:ext uri="{28A0092B-C50C-407E-A947-70E740481C1C}">
+                <a14:useLocalDpi xmlns:a14="http://schemas.microsoft.com/office/drawing/2010/main" val="0"/>
+              </a:ext>
+            </a:extLst>
+          </a:blip>
+          <a:stretch>
+            <a:fillRect/>
+          </a:stretch>
+        </p:blipFill>
+        <p:spPr>
+          <a:xfrm>
+            <a:off x="4343400" y="1066800"/>
+            <a:ext cx="4724400" cy="5490168"/>
+          </a:xfrm>
+          <a:prstGeom prst="rect">
+            <a:avLst/>
+          </a:prstGeom>
+        </p:spPr>
+      </p:pic>
+      <p:sp>
+        <p:nvSpPr>
+          <p:cNvPr id="9" name="TextBox 8"/>
+          <p:cNvSpPr txBox="1"/>
+          <p:nvPr/>
+        </p:nvSpPr>
+        <p:spPr>
+          <a:xfrm>
+            <a:off x="304800" y="1262535"/>
+            <a:ext cx="4038600" cy="5293757"/>
+          </a:xfrm>
+          <a:prstGeom prst="rect">
+            <a:avLst/>
+          </a:prstGeom>
+          <a:noFill/>
+        </p:spPr>
+        <p:txBody>
+          <a:bodyPr wrap="square" rtlCol="0">
+            <a:spAutoFit/>
+          </a:bodyPr>
+          <a:lstStyle/>
+          <a:p>
+            <a:pPr marL="285750" indent="-285750">
+              <a:buFont typeface="Wingdings" panose="05000000000000000000" pitchFamily="2" charset="2"/>
+              <a:buChar char="Ø"/>
+            </a:pPr>
+            <a:r>
+              <a:rPr lang="en-US" sz="1400" dirty="0" smtClean="0">
+                <a:solidFill>
+                  <a:schemeClr val="bg2"/>
+                </a:solidFill>
+              </a:rPr>
+              <a:t>Change the Fraud Type according to the alert you receive, i.e. Root, Domestic, Vonage, or Spending</a:t>
+            </a:r>
+          </a:p>
+          <a:p>
+            <a:pPr marL="285750" indent="-285750">
+              <a:buFont typeface="Wingdings" panose="05000000000000000000" pitchFamily="2" charset="2"/>
+              <a:buChar char="Ø"/>
+            </a:pPr>
+            <a:endParaRPr lang="en-US" sz="1400" dirty="0">
+              <a:solidFill>
+                <a:schemeClr val="bg2"/>
+              </a:solidFill>
+            </a:endParaRPr>
+          </a:p>
+          <a:p>
+            <a:pPr marL="285750" indent="-285750">
+              <a:buFont typeface="Wingdings" panose="05000000000000000000" pitchFamily="2" charset="2"/>
+              <a:buChar char="Ø"/>
+            </a:pPr>
+            <a:r>
+              <a:rPr lang="en-US" sz="1400" dirty="0" smtClean="0">
+                <a:solidFill>
+                  <a:schemeClr val="bg2"/>
+                </a:solidFill>
+              </a:rPr>
+              <a:t>Make sure your previous call example is at least 2 weeks prior to the current date</a:t>
+            </a:r>
+          </a:p>
+          <a:p>
+            <a:pPr marL="285750" indent="-285750">
+              <a:buFont typeface="Wingdings" panose="05000000000000000000" pitchFamily="2" charset="2"/>
+              <a:buChar char="Ø"/>
+            </a:pPr>
+            <a:endParaRPr lang="en-US" sz="1400" dirty="0">
+              <a:solidFill>
+                <a:schemeClr val="bg2"/>
+              </a:solidFill>
+            </a:endParaRPr>
+          </a:p>
+          <a:p>
+            <a:pPr marL="285750" indent="-285750">
+              <a:buFont typeface="Wingdings" panose="05000000000000000000" pitchFamily="2" charset="2"/>
+              <a:buChar char="Ø"/>
+            </a:pPr>
+            <a:r>
+              <a:rPr lang="en-US" sz="1400" dirty="0" smtClean="0">
+                <a:solidFill>
+                  <a:schemeClr val="bg2"/>
+                </a:solidFill>
+              </a:rPr>
+              <a:t>Provide adequate explanation and supporting screenshots within the findings section</a:t>
+            </a:r>
+          </a:p>
+          <a:p>
+            <a:pPr marL="285750" indent="-285750">
+              <a:buFont typeface="Wingdings" panose="05000000000000000000" pitchFamily="2" charset="2"/>
+              <a:buChar char="Ø"/>
+            </a:pPr>
+            <a:endParaRPr lang="en-US" sz="1400" dirty="0">
+              <a:solidFill>
+                <a:schemeClr val="bg2"/>
+              </a:solidFill>
+            </a:endParaRPr>
+          </a:p>
+          <a:p>
+            <a:pPr marL="285750" indent="-285750">
+              <a:buFont typeface="Wingdings" panose="05000000000000000000" pitchFamily="2" charset="2"/>
+              <a:buChar char="Ø"/>
+            </a:pPr>
+            <a:r>
+              <a:rPr lang="en-US" sz="1400" dirty="0" smtClean="0">
+                <a:solidFill>
+                  <a:schemeClr val="bg2"/>
+                </a:solidFill>
+              </a:rPr>
+              <a:t>This template can also be used for investigations that you determine to be Fraud.</a:t>
+            </a:r>
+          </a:p>
+          <a:p>
+            <a:pPr marL="285750" indent="-285750">
+              <a:buFont typeface="Wingdings" panose="05000000000000000000" pitchFamily="2" charset="2"/>
+              <a:buChar char="Ø"/>
+            </a:pPr>
+            <a:endParaRPr lang="en-US" sz="1400" dirty="0">
+              <a:solidFill>
+                <a:schemeClr val="bg2"/>
+              </a:solidFill>
+            </a:endParaRPr>
+          </a:p>
+          <a:p>
+            <a:pPr marL="285750" indent="-285750">
+              <a:buFont typeface="Wingdings" panose="05000000000000000000" pitchFamily="2" charset="2"/>
+              <a:buChar char="Ø"/>
+            </a:pPr>
+            <a:r>
+              <a:rPr lang="en-US" sz="1400" dirty="0" smtClean="0">
+                <a:solidFill>
+                  <a:schemeClr val="bg2"/>
+                </a:solidFill>
+              </a:rPr>
+              <a:t>Using this template </a:t>
+            </a:r>
+            <a:r>
+              <a:rPr lang="en-US" sz="1400" dirty="0" smtClean="0">
+                <a:solidFill>
+                  <a:schemeClr val="bg2"/>
+                </a:solidFill>
+              </a:rPr>
+              <a:t>ensures </a:t>
+            </a:r>
+            <a:r>
+              <a:rPr lang="en-US" sz="1400" dirty="0" smtClean="0">
+                <a:solidFill>
+                  <a:schemeClr val="bg2"/>
+                </a:solidFill>
+              </a:rPr>
+              <a:t>that you have </a:t>
+            </a:r>
+            <a:r>
+              <a:rPr lang="en-US" sz="1400" dirty="0" smtClean="0">
+                <a:solidFill>
+                  <a:schemeClr val="bg2"/>
+                </a:solidFill>
+              </a:rPr>
+              <a:t>gathered sufficient </a:t>
+            </a:r>
+            <a:r>
+              <a:rPr lang="en-US" sz="1400" dirty="0" smtClean="0">
+                <a:solidFill>
+                  <a:schemeClr val="bg2"/>
+                </a:solidFill>
+              </a:rPr>
+              <a:t>data </a:t>
+            </a:r>
+            <a:r>
+              <a:rPr lang="en-US" sz="1400" dirty="0" smtClean="0">
+                <a:solidFill>
+                  <a:schemeClr val="bg2"/>
+                </a:solidFill>
+              </a:rPr>
+              <a:t>and </a:t>
+            </a:r>
+            <a:r>
+              <a:rPr lang="en-US" sz="1400" dirty="0" smtClean="0">
+                <a:solidFill>
+                  <a:schemeClr val="bg2"/>
+                </a:solidFill>
+              </a:rPr>
+              <a:t>are more likely to identify investigations correctly. </a:t>
+            </a:r>
+          </a:p>
+          <a:p>
+            <a:endParaRPr lang="en-US" sz="1400" dirty="0">
+              <a:solidFill>
+                <a:schemeClr val="bg2"/>
+              </a:solidFill>
+            </a:endParaRPr>
+          </a:p>
+          <a:p>
+            <a:r>
+              <a:rPr lang="en-US" sz="1400" b="1" dirty="0" smtClean="0">
+                <a:solidFill>
+                  <a:schemeClr val="bg2"/>
+                </a:solidFill>
+              </a:rPr>
+              <a:t>**Please note: </a:t>
+            </a:r>
+            <a:r>
+              <a:rPr lang="en-US" sz="1400" dirty="0" smtClean="0">
+                <a:solidFill>
+                  <a:schemeClr val="bg2"/>
+                </a:solidFill>
+              </a:rPr>
+              <a:t>if you do not use this template and the information you provide is not adequate we will take ownership of your on call case to do a proper investigation. This mean you will not get paid for that case. </a:t>
+            </a:r>
+          </a:p>
+          <a:p>
+            <a:pPr marL="285750" indent="-285750">
+              <a:buFont typeface="Wingdings" panose="05000000000000000000" pitchFamily="2" charset="2"/>
+              <a:buChar char="Ø"/>
+            </a:pPr>
+            <a:endParaRPr lang="en-US" dirty="0"/>
+          </a:p>
+        </p:txBody>
+      </p:sp>
     </p:spTree>
     <p:extLst>
       <p:ext uri="{BB962C8B-B14F-4D97-AF65-F5344CB8AC3E}">
-        <p14:creationId xmlns:p14="http://schemas.microsoft.com/office/powerpoint/2010/main" val="3464281621"/>
+        <p14:creationId xmlns:p14="http://schemas.microsoft.com/office/powerpoint/2010/main" val="182849286"/>
       </p:ext>
     </p:extLst>
   </p:cSld>

</xml_diff>